<commit_message>
set up Functional Test projects
</commit_message>
<xml_diff>
--- a/doc/test/AutoCrop.pptx
+++ b/doc/test/AutoCrop.pptx
@@ -14,7 +14,7 @@
     <p:sldId id="256" r:id="rId5"/>
     <p:sldId id="292" r:id="rId6"/>
     <p:sldId id="293" r:id="rId7"/>
-    <p:sldId id="300" r:id="rId8"/>
+    <p:sldId id="303" r:id="rId8"/>
     <p:sldId id="296" r:id="rId9"/>
     <p:sldId id="301" r:id="rId10"/>
     <p:sldId id="302" r:id="rId11"/>
@@ -130,7 +130,7 @@
             <p14:sldId id="256"/>
             <p14:sldId id="292"/>
             <p14:sldId id="293"/>
-            <p14:sldId id="300"/>
+            <p14:sldId id="303"/>
             <p14:sldId id="296"/>
             <p14:sldId id="301"/>
             <p14:sldId id="302"/>
@@ -239,7 +239,7 @@
           <a:p>
             <a:fld id="{26004F41-C1A1-4B0D-9EEE-5E3F0E5BC108}" type="datetimeFigureOut">
               <a:rPr lang="en-SG" smtClean="0"/>
-              <a:t>26/3/2014</a:t>
+              <a:t>2/6/2015</a:t>
             </a:fld>
             <a:endParaRPr lang="en-SG"/>
           </a:p>
@@ -904,7 +904,7 @@
           <a:p>
             <a:fld id="{699DC775-C286-4358-8C92-D7E584E969B3}" type="datetimeFigureOut">
               <a:rPr lang="en-US" smtClean="0"/>
-              <a:t>3/26/2014</a:t>
+              <a:t>6/2/2015</a:t>
             </a:fld>
             <a:endParaRPr lang="en-US"/>
           </a:p>
@@ -1074,7 +1074,7 @@
           <a:p>
             <a:fld id="{699DC775-C286-4358-8C92-D7E584E969B3}" type="datetimeFigureOut">
               <a:rPr lang="en-US" smtClean="0"/>
-              <a:t>3/26/2014</a:t>
+              <a:t>6/2/2015</a:t>
             </a:fld>
             <a:endParaRPr lang="en-US"/>
           </a:p>
@@ -1254,7 +1254,7 @@
           <a:p>
             <a:fld id="{699DC775-C286-4358-8C92-D7E584E969B3}" type="datetimeFigureOut">
               <a:rPr lang="en-US" smtClean="0"/>
-              <a:t>3/26/2014</a:t>
+              <a:t>6/2/2015</a:t>
             </a:fld>
             <a:endParaRPr lang="en-US"/>
           </a:p>
@@ -1496,7 +1496,7 @@
           <a:p>
             <a:fld id="{699DC775-C286-4358-8C92-D7E584E969B3}" type="datetimeFigureOut">
               <a:rPr lang="en-US" smtClean="0"/>
-              <a:t>3/26/2014</a:t>
+              <a:t>6/2/2015</a:t>
             </a:fld>
             <a:endParaRPr lang="en-US"/>
           </a:p>
@@ -1666,7 +1666,7 @@
           <a:p>
             <a:fld id="{699DC775-C286-4358-8C92-D7E584E969B3}" type="datetimeFigureOut">
               <a:rPr lang="en-US" smtClean="0"/>
-              <a:t>3/26/2014</a:t>
+              <a:t>6/2/2015</a:t>
             </a:fld>
             <a:endParaRPr lang="en-US"/>
           </a:p>
@@ -1912,7 +1912,7 @@
           <a:p>
             <a:fld id="{699DC775-C286-4358-8C92-D7E584E969B3}" type="datetimeFigureOut">
               <a:rPr lang="en-US" smtClean="0"/>
-              <a:t>3/26/2014</a:t>
+              <a:t>6/2/2015</a:t>
             </a:fld>
             <a:endParaRPr lang="en-US"/>
           </a:p>
@@ -2200,7 +2200,7 @@
           <a:p>
             <a:fld id="{699DC775-C286-4358-8C92-D7E584E969B3}" type="datetimeFigureOut">
               <a:rPr lang="en-US" smtClean="0"/>
-              <a:t>3/26/2014</a:t>
+              <a:t>6/2/2015</a:t>
             </a:fld>
             <a:endParaRPr lang="en-US"/>
           </a:p>
@@ -2622,7 +2622,7 @@
           <a:p>
             <a:fld id="{699DC775-C286-4358-8C92-D7E584E969B3}" type="datetimeFigureOut">
               <a:rPr lang="en-US" smtClean="0"/>
-              <a:t>3/26/2014</a:t>
+              <a:t>6/2/2015</a:t>
             </a:fld>
             <a:endParaRPr lang="en-US"/>
           </a:p>
@@ -2740,7 +2740,7 @@
           <a:p>
             <a:fld id="{699DC775-C286-4358-8C92-D7E584E969B3}" type="datetimeFigureOut">
               <a:rPr lang="en-US" smtClean="0"/>
-              <a:t>3/26/2014</a:t>
+              <a:t>6/2/2015</a:t>
             </a:fld>
             <a:endParaRPr lang="en-US"/>
           </a:p>
@@ -2835,7 +2835,7 @@
           <a:p>
             <a:fld id="{699DC775-C286-4358-8C92-D7E584E969B3}" type="datetimeFigureOut">
               <a:rPr lang="en-US" smtClean="0"/>
-              <a:t>3/26/2014</a:t>
+              <a:t>6/2/2015</a:t>
             </a:fld>
             <a:endParaRPr lang="en-US"/>
           </a:p>
@@ -3112,7 +3112,7 @@
           <a:p>
             <a:fld id="{699DC775-C286-4358-8C92-D7E584E969B3}" type="datetimeFigureOut">
               <a:rPr lang="en-US" smtClean="0"/>
-              <a:t>3/26/2014</a:t>
+              <a:t>6/2/2015</a:t>
             </a:fld>
             <a:endParaRPr lang="en-US"/>
           </a:p>
@@ -3282,7 +3282,7 @@
           <a:p>
             <a:fld id="{699DC775-C286-4358-8C92-D7E584E969B3}" type="datetimeFigureOut">
               <a:rPr lang="en-US" smtClean="0"/>
-              <a:t>3/26/2014</a:t>
+              <a:t>6/2/2015</a:t>
             </a:fld>
             <a:endParaRPr lang="en-US"/>
           </a:p>
@@ -3535,7 +3535,7 @@
           <a:p>
             <a:fld id="{699DC775-C286-4358-8C92-D7E584E969B3}" type="datetimeFigureOut">
               <a:rPr lang="en-US" smtClean="0"/>
-              <a:t>3/26/2014</a:t>
+              <a:t>6/2/2015</a:t>
             </a:fld>
             <a:endParaRPr lang="en-US"/>
           </a:p>
@@ -3705,7 +3705,7 @@
           <a:p>
             <a:fld id="{699DC775-C286-4358-8C92-D7E584E969B3}" type="datetimeFigureOut">
               <a:rPr lang="en-US" smtClean="0"/>
-              <a:t>3/26/2014</a:t>
+              <a:t>6/2/2015</a:t>
             </a:fld>
             <a:endParaRPr lang="en-US"/>
           </a:p>
@@ -3885,7 +3885,7 @@
           <a:p>
             <a:fld id="{699DC775-C286-4358-8C92-D7E584E969B3}" type="datetimeFigureOut">
               <a:rPr lang="en-US" smtClean="0"/>
-              <a:t>3/26/2014</a:t>
+              <a:t>6/2/2015</a:t>
             </a:fld>
             <a:endParaRPr lang="en-US"/>
           </a:p>
@@ -4135,7 +4135,7 @@
           <a:p>
             <a:fld id="{699DC775-C286-4358-8C92-D7E584E969B3}" type="datetimeFigureOut">
               <a:rPr lang="en-US" smtClean="0"/>
-              <a:t>3/26/2014</a:t>
+              <a:t>6/2/2015</a:t>
             </a:fld>
             <a:endParaRPr lang="en-US"/>
           </a:p>
@@ -4313,7 +4313,7 @@
           <a:p>
             <a:fld id="{699DC775-C286-4358-8C92-D7E584E969B3}" type="datetimeFigureOut">
               <a:rPr lang="en-US" smtClean="0"/>
-              <a:t>3/26/2014</a:t>
+              <a:t>6/2/2015</a:t>
             </a:fld>
             <a:endParaRPr lang="en-US"/>
           </a:p>
@@ -4567,7 +4567,7 @@
           <a:p>
             <a:fld id="{699DC775-C286-4358-8C92-D7E584E969B3}" type="datetimeFigureOut">
               <a:rPr lang="en-US" smtClean="0"/>
-              <a:t>3/26/2014</a:t>
+              <a:t>6/2/2015</a:t>
             </a:fld>
             <a:endParaRPr lang="en-US"/>
           </a:p>
@@ -4863,7 +4863,7 @@
           <a:p>
             <a:fld id="{699DC775-C286-4358-8C92-D7E584E969B3}" type="datetimeFigureOut">
               <a:rPr lang="en-US" smtClean="0"/>
-              <a:t>3/26/2014</a:t>
+              <a:t>6/2/2015</a:t>
             </a:fld>
             <a:endParaRPr lang="en-US"/>
           </a:p>
@@ -5293,7 +5293,7 @@
           <a:p>
             <a:fld id="{699DC775-C286-4358-8C92-D7E584E969B3}" type="datetimeFigureOut">
               <a:rPr lang="en-US" smtClean="0"/>
-              <a:t>3/26/2014</a:t>
+              <a:t>6/2/2015</a:t>
             </a:fld>
             <a:endParaRPr lang="en-US"/>
           </a:p>
@@ -5419,7 +5419,7 @@
           <a:p>
             <a:fld id="{699DC775-C286-4358-8C92-D7E584E969B3}" type="datetimeFigureOut">
               <a:rPr lang="en-US" smtClean="0"/>
-              <a:t>3/26/2014</a:t>
+              <a:t>6/2/2015</a:t>
             </a:fld>
             <a:endParaRPr lang="en-US"/>
           </a:p>
@@ -5522,7 +5522,7 @@
           <a:p>
             <a:fld id="{699DC775-C286-4358-8C92-D7E584E969B3}" type="datetimeFigureOut">
               <a:rPr lang="en-US" smtClean="0"/>
-              <a:t>3/26/2014</a:t>
+              <a:t>6/2/2015</a:t>
             </a:fld>
             <a:endParaRPr lang="en-US"/>
           </a:p>
@@ -5768,7 +5768,7 @@
           <a:p>
             <a:fld id="{699DC775-C286-4358-8C92-D7E584E969B3}" type="datetimeFigureOut">
               <a:rPr lang="en-US" smtClean="0"/>
-              <a:t>3/26/2014</a:t>
+              <a:t>6/2/2015</a:t>
             </a:fld>
             <a:endParaRPr lang="en-US"/>
           </a:p>
@@ -6053,7 +6053,7 @@
           <a:p>
             <a:fld id="{699DC775-C286-4358-8C92-D7E584E969B3}" type="datetimeFigureOut">
               <a:rPr lang="en-US" smtClean="0"/>
-              <a:t>3/26/2014</a:t>
+              <a:t>6/2/2015</a:t>
             </a:fld>
             <a:endParaRPr lang="en-US"/>
           </a:p>
@@ -6314,7 +6314,7 @@
           <a:p>
             <a:fld id="{699DC775-C286-4358-8C92-D7E584E969B3}" type="datetimeFigureOut">
               <a:rPr lang="en-US" smtClean="0"/>
-              <a:t>3/26/2014</a:t>
+              <a:t>6/2/2015</a:t>
             </a:fld>
             <a:endParaRPr lang="en-US"/>
           </a:p>
@@ -6492,7 +6492,7 @@
           <a:p>
             <a:fld id="{699DC775-C286-4358-8C92-D7E584E969B3}" type="datetimeFigureOut">
               <a:rPr lang="en-US" smtClean="0"/>
-              <a:t>3/26/2014</a:t>
+              <a:t>6/2/2015</a:t>
             </a:fld>
             <a:endParaRPr lang="en-US"/>
           </a:p>
@@ -6680,7 +6680,7 @@
           <a:p>
             <a:fld id="{699DC775-C286-4358-8C92-D7E584E969B3}" type="datetimeFigureOut">
               <a:rPr lang="en-US" smtClean="0"/>
-              <a:t>3/26/2014</a:t>
+              <a:t>6/2/2015</a:t>
             </a:fld>
             <a:endParaRPr lang="en-US"/>
           </a:p>
@@ -6968,7 +6968,7 @@
           <a:p>
             <a:fld id="{699DC775-C286-4358-8C92-D7E584E969B3}" type="datetimeFigureOut">
               <a:rPr lang="en-US" smtClean="0"/>
-              <a:t>3/26/2014</a:t>
+              <a:t>6/2/2015</a:t>
             </a:fld>
             <a:endParaRPr lang="en-US"/>
           </a:p>
@@ -7390,7 +7390,7 @@
           <a:p>
             <a:fld id="{699DC775-C286-4358-8C92-D7E584E969B3}" type="datetimeFigureOut">
               <a:rPr lang="en-US" smtClean="0"/>
-              <a:t>3/26/2014</a:t>
+              <a:t>6/2/2015</a:t>
             </a:fld>
             <a:endParaRPr lang="en-US"/>
           </a:p>
@@ -7508,7 +7508,7 @@
           <a:p>
             <a:fld id="{699DC775-C286-4358-8C92-D7E584E969B3}" type="datetimeFigureOut">
               <a:rPr lang="en-US" smtClean="0"/>
-              <a:t>3/26/2014</a:t>
+              <a:t>6/2/2015</a:t>
             </a:fld>
             <a:endParaRPr lang="en-US"/>
           </a:p>
@@ -7603,7 +7603,7 @@
           <a:p>
             <a:fld id="{699DC775-C286-4358-8C92-D7E584E969B3}" type="datetimeFigureOut">
               <a:rPr lang="en-US" smtClean="0"/>
-              <a:t>3/26/2014</a:t>
+              <a:t>6/2/2015</a:t>
             </a:fld>
             <a:endParaRPr lang="en-US"/>
           </a:p>
@@ -7880,7 +7880,7 @@
           <a:p>
             <a:fld id="{699DC775-C286-4358-8C92-D7E584E969B3}" type="datetimeFigureOut">
               <a:rPr lang="en-US" smtClean="0"/>
-              <a:t>3/26/2014</a:t>
+              <a:t>6/2/2015</a:t>
             </a:fld>
             <a:endParaRPr lang="en-US"/>
           </a:p>
@@ -8133,7 +8133,7 @@
           <a:p>
             <a:fld id="{699DC775-C286-4358-8C92-D7E584E969B3}" type="datetimeFigureOut">
               <a:rPr lang="en-US" smtClean="0"/>
-              <a:t>3/26/2014</a:t>
+              <a:t>6/2/2015</a:t>
             </a:fld>
             <a:endParaRPr lang="en-US"/>
           </a:p>
@@ -8346,7 +8346,7 @@
           <a:p>
             <a:fld id="{699DC775-C286-4358-8C92-D7E584E969B3}" type="datetimeFigureOut">
               <a:rPr lang="en-US" smtClean="0"/>
-              <a:t>3/26/2014</a:t>
+              <a:t>6/2/2015</a:t>
             </a:fld>
             <a:endParaRPr lang="en-US"/>
           </a:p>
@@ -8861,7 +8861,7 @@
           <a:p>
             <a:fld id="{699DC775-C286-4358-8C92-D7E584E969B3}" type="datetimeFigureOut">
               <a:rPr lang="en-US" smtClean="0"/>
-              <a:t>3/26/2014</a:t>
+              <a:t>6/2/2015</a:t>
             </a:fld>
             <a:endParaRPr lang="en-US"/>
           </a:p>
@@ -9374,7 +9374,7 @@
           <a:p>
             <a:fld id="{699DC775-C286-4358-8C92-D7E584E969B3}" type="datetimeFigureOut">
               <a:rPr lang="en-US" smtClean="0"/>
-              <a:t>3/26/2014</a:t>
+              <a:t>6/2/2015</a:t>
             </a:fld>
             <a:endParaRPr lang="en-US"/>
           </a:p>
@@ -10250,7 +10250,7 @@
       </p:pic>
       <p:sp>
         <p:nvSpPr>
-          <p:cNvPr id="6" name="ffs"/>
+          <p:cNvPr id="6" name="selectMe"/>
           <p:cNvSpPr/>
           <p:nvPr/>
         </p:nvSpPr>
@@ -11655,7 +11655,7 @@
       </p:pic>
       <p:sp>
         <p:nvSpPr>
-          <p:cNvPr id="8" name="faf74b29-bedf-4b5e-8961-148ae764946d"/>
+          <p:cNvPr id="8" name="selectMe8083645d-7fe3-4e4b-b5a8-fab178731a0btemp_Copy17f06524-3a84-4b03-87b5-cc170aae78c9"/>
           <p:cNvSpPr/>
           <p:nvPr/>
         </p:nvSpPr>
@@ -13050,7 +13050,7 @@
     </p:spTree>
     <p:extLst>
       <p:ext uri="{BB962C8B-B14F-4D97-AF65-F5344CB8AC3E}">
-        <p14:creationId xmlns:p14="http://schemas.microsoft.com/office/powerpoint/2010/main" val="3531573949"/>
+        <p14:creationId xmlns:p14="http://schemas.microsoft.com/office/powerpoint/2010/main" val="753954827"/>
       </p:ext>
     </p:extLst>
   </p:cSld>

</xml_diff>

<commit_message>
#971 Update test and remove unused code
</commit_message>
<xml_diff>
--- a/doc/test/AutoCrop.pptx
+++ b/doc/test/AutoCrop.pptx
@@ -7,7 +7,7 @@
     <p:sldMasterId id="2147483672" r:id="rId3"/>
   </p:sldMasterIdLst>
   <p:notesMasterIdLst>
-    <p:notesMasterId r:id="rId13"/>
+    <p:notesMasterId r:id="rId16"/>
   </p:notesMasterIdLst>
   <p:sldIdLst>
     <p:sldId id="287" r:id="rId4"/>
@@ -18,7 +18,10 @@
     <p:sldId id="296" r:id="rId9"/>
     <p:sldId id="301" r:id="rId10"/>
     <p:sldId id="304" r:id="rId11"/>
-    <p:sldId id="274" r:id="rId12"/>
+    <p:sldId id="305" r:id="rId12"/>
+    <p:sldId id="306" r:id="rId13"/>
+    <p:sldId id="307" r:id="rId14"/>
+    <p:sldId id="274" r:id="rId15"/>
   </p:sldIdLst>
   <p:sldSz cx="9144000" cy="6858000" type="screen4x3"/>
   <p:notesSz cx="6858000" cy="9144000"/>
@@ -134,6 +137,9 @@
             <p14:sldId id="296"/>
             <p14:sldId id="301"/>
             <p14:sldId id="304"/>
+            <p14:sldId id="305"/>
+            <p14:sldId id="306"/>
+            <p14:sldId id="307"/>
             <p14:sldId id="274"/>
           </p14:sldIdLst>
         </p14:section>
@@ -239,7 +245,7 @@
           <a:p>
             <a:fld id="{26004F41-C1A1-4B0D-9EEE-5E3F0E5BC108}" type="datetimeFigureOut">
               <a:rPr lang="en-SG" smtClean="0"/>
-              <a:t>6/6/2015</a:t>
+              <a:t>16/5/2016</a:t>
             </a:fld>
             <a:endParaRPr lang="en-SG"/>
           </a:p>
@@ -904,7 +910,7 @@
           <a:p>
             <a:fld id="{699DC775-C286-4358-8C92-D7E584E969B3}" type="datetimeFigureOut">
               <a:rPr lang="en-US" smtClean="0"/>
-              <a:t>6/6/2015</a:t>
+              <a:t>2016/05/16</a:t>
             </a:fld>
             <a:endParaRPr lang="en-US"/>
           </a:p>
@@ -1074,7 +1080,7 @@
           <a:p>
             <a:fld id="{699DC775-C286-4358-8C92-D7E584E969B3}" type="datetimeFigureOut">
               <a:rPr lang="en-US" smtClean="0"/>
-              <a:t>6/6/2015</a:t>
+              <a:t>2016/05/16</a:t>
             </a:fld>
             <a:endParaRPr lang="en-US"/>
           </a:p>
@@ -1254,7 +1260,7 @@
           <a:p>
             <a:fld id="{699DC775-C286-4358-8C92-D7E584E969B3}" type="datetimeFigureOut">
               <a:rPr lang="en-US" smtClean="0"/>
-              <a:t>6/6/2015</a:t>
+              <a:t>2016/05/16</a:t>
             </a:fld>
             <a:endParaRPr lang="en-US"/>
           </a:p>
@@ -1496,7 +1502,7 @@
           <a:p>
             <a:fld id="{699DC775-C286-4358-8C92-D7E584E969B3}" type="datetimeFigureOut">
               <a:rPr lang="en-US" smtClean="0"/>
-              <a:t>6/6/2015</a:t>
+              <a:t>2016/05/16</a:t>
             </a:fld>
             <a:endParaRPr lang="en-US"/>
           </a:p>
@@ -1666,7 +1672,7 @@
           <a:p>
             <a:fld id="{699DC775-C286-4358-8C92-D7E584E969B3}" type="datetimeFigureOut">
               <a:rPr lang="en-US" smtClean="0"/>
-              <a:t>6/6/2015</a:t>
+              <a:t>2016/05/16</a:t>
             </a:fld>
             <a:endParaRPr lang="en-US"/>
           </a:p>
@@ -1912,7 +1918,7 @@
           <a:p>
             <a:fld id="{699DC775-C286-4358-8C92-D7E584E969B3}" type="datetimeFigureOut">
               <a:rPr lang="en-US" smtClean="0"/>
-              <a:t>6/6/2015</a:t>
+              <a:t>2016/05/16</a:t>
             </a:fld>
             <a:endParaRPr lang="en-US"/>
           </a:p>
@@ -2200,7 +2206,7 @@
           <a:p>
             <a:fld id="{699DC775-C286-4358-8C92-D7E584E969B3}" type="datetimeFigureOut">
               <a:rPr lang="en-US" smtClean="0"/>
-              <a:t>6/6/2015</a:t>
+              <a:t>2016/05/16</a:t>
             </a:fld>
             <a:endParaRPr lang="en-US"/>
           </a:p>
@@ -2622,7 +2628,7 @@
           <a:p>
             <a:fld id="{699DC775-C286-4358-8C92-D7E584E969B3}" type="datetimeFigureOut">
               <a:rPr lang="en-US" smtClean="0"/>
-              <a:t>6/6/2015</a:t>
+              <a:t>2016/05/16</a:t>
             </a:fld>
             <a:endParaRPr lang="en-US"/>
           </a:p>
@@ -2740,7 +2746,7 @@
           <a:p>
             <a:fld id="{699DC775-C286-4358-8C92-D7E584E969B3}" type="datetimeFigureOut">
               <a:rPr lang="en-US" smtClean="0"/>
-              <a:t>6/6/2015</a:t>
+              <a:t>2016/05/16</a:t>
             </a:fld>
             <a:endParaRPr lang="en-US"/>
           </a:p>
@@ -2835,7 +2841,7 @@
           <a:p>
             <a:fld id="{699DC775-C286-4358-8C92-D7E584E969B3}" type="datetimeFigureOut">
               <a:rPr lang="en-US" smtClean="0"/>
-              <a:t>6/6/2015</a:t>
+              <a:t>2016/05/16</a:t>
             </a:fld>
             <a:endParaRPr lang="en-US"/>
           </a:p>
@@ -3112,7 +3118,7 @@
           <a:p>
             <a:fld id="{699DC775-C286-4358-8C92-D7E584E969B3}" type="datetimeFigureOut">
               <a:rPr lang="en-US" smtClean="0"/>
-              <a:t>6/6/2015</a:t>
+              <a:t>2016/05/16</a:t>
             </a:fld>
             <a:endParaRPr lang="en-US"/>
           </a:p>
@@ -3282,7 +3288,7 @@
           <a:p>
             <a:fld id="{699DC775-C286-4358-8C92-D7E584E969B3}" type="datetimeFigureOut">
               <a:rPr lang="en-US" smtClean="0"/>
-              <a:t>6/6/2015</a:t>
+              <a:t>2016/05/16</a:t>
             </a:fld>
             <a:endParaRPr lang="en-US"/>
           </a:p>
@@ -3535,7 +3541,7 @@
           <a:p>
             <a:fld id="{699DC775-C286-4358-8C92-D7E584E969B3}" type="datetimeFigureOut">
               <a:rPr lang="en-US" smtClean="0"/>
-              <a:t>6/6/2015</a:t>
+              <a:t>2016/05/16</a:t>
             </a:fld>
             <a:endParaRPr lang="en-US"/>
           </a:p>
@@ -3705,7 +3711,7 @@
           <a:p>
             <a:fld id="{699DC775-C286-4358-8C92-D7E584E969B3}" type="datetimeFigureOut">
               <a:rPr lang="en-US" smtClean="0"/>
-              <a:t>6/6/2015</a:t>
+              <a:t>2016/05/16</a:t>
             </a:fld>
             <a:endParaRPr lang="en-US"/>
           </a:p>
@@ -3885,7 +3891,7 @@
           <a:p>
             <a:fld id="{699DC775-C286-4358-8C92-D7E584E969B3}" type="datetimeFigureOut">
               <a:rPr lang="en-US" smtClean="0"/>
-              <a:t>6/6/2015</a:t>
+              <a:t>2016/05/16</a:t>
             </a:fld>
             <a:endParaRPr lang="en-US"/>
           </a:p>
@@ -4135,7 +4141,7 @@
           <a:p>
             <a:fld id="{699DC775-C286-4358-8C92-D7E584E969B3}" type="datetimeFigureOut">
               <a:rPr lang="en-US" smtClean="0"/>
-              <a:t>6/6/2015</a:t>
+              <a:t>2016/05/16</a:t>
             </a:fld>
             <a:endParaRPr lang="en-US"/>
           </a:p>
@@ -4313,7 +4319,7 @@
           <a:p>
             <a:fld id="{699DC775-C286-4358-8C92-D7E584E969B3}" type="datetimeFigureOut">
               <a:rPr lang="en-US" smtClean="0"/>
-              <a:t>6/6/2015</a:t>
+              <a:t>2016/05/16</a:t>
             </a:fld>
             <a:endParaRPr lang="en-US"/>
           </a:p>
@@ -4567,7 +4573,7 @@
           <a:p>
             <a:fld id="{699DC775-C286-4358-8C92-D7E584E969B3}" type="datetimeFigureOut">
               <a:rPr lang="en-US" smtClean="0"/>
-              <a:t>6/6/2015</a:t>
+              <a:t>2016/05/16</a:t>
             </a:fld>
             <a:endParaRPr lang="en-US"/>
           </a:p>
@@ -4863,7 +4869,7 @@
           <a:p>
             <a:fld id="{699DC775-C286-4358-8C92-D7E584E969B3}" type="datetimeFigureOut">
               <a:rPr lang="en-US" smtClean="0"/>
-              <a:t>6/6/2015</a:t>
+              <a:t>2016/05/16</a:t>
             </a:fld>
             <a:endParaRPr lang="en-US"/>
           </a:p>
@@ -5293,7 +5299,7 @@
           <a:p>
             <a:fld id="{699DC775-C286-4358-8C92-D7E584E969B3}" type="datetimeFigureOut">
               <a:rPr lang="en-US" smtClean="0"/>
-              <a:t>6/6/2015</a:t>
+              <a:t>2016/05/16</a:t>
             </a:fld>
             <a:endParaRPr lang="en-US"/>
           </a:p>
@@ -5419,7 +5425,7 @@
           <a:p>
             <a:fld id="{699DC775-C286-4358-8C92-D7E584E969B3}" type="datetimeFigureOut">
               <a:rPr lang="en-US" smtClean="0"/>
-              <a:t>6/6/2015</a:t>
+              <a:t>2016/05/16</a:t>
             </a:fld>
             <a:endParaRPr lang="en-US"/>
           </a:p>
@@ -5522,7 +5528,7 @@
           <a:p>
             <a:fld id="{699DC775-C286-4358-8C92-D7E584E969B3}" type="datetimeFigureOut">
               <a:rPr lang="en-US" smtClean="0"/>
-              <a:t>6/6/2015</a:t>
+              <a:t>2016/05/16</a:t>
             </a:fld>
             <a:endParaRPr lang="en-US"/>
           </a:p>
@@ -5768,7 +5774,7 @@
           <a:p>
             <a:fld id="{699DC775-C286-4358-8C92-D7E584E969B3}" type="datetimeFigureOut">
               <a:rPr lang="en-US" smtClean="0"/>
-              <a:t>6/6/2015</a:t>
+              <a:t>2016/05/16</a:t>
             </a:fld>
             <a:endParaRPr lang="en-US"/>
           </a:p>
@@ -6053,7 +6059,7 @@
           <a:p>
             <a:fld id="{699DC775-C286-4358-8C92-D7E584E969B3}" type="datetimeFigureOut">
               <a:rPr lang="en-US" smtClean="0"/>
-              <a:t>6/6/2015</a:t>
+              <a:t>2016/05/16</a:t>
             </a:fld>
             <a:endParaRPr lang="en-US"/>
           </a:p>
@@ -6314,7 +6320,7 @@
           <a:p>
             <a:fld id="{699DC775-C286-4358-8C92-D7E584E969B3}" type="datetimeFigureOut">
               <a:rPr lang="en-US" smtClean="0"/>
-              <a:t>6/6/2015</a:t>
+              <a:t>2016/05/16</a:t>
             </a:fld>
             <a:endParaRPr lang="en-US"/>
           </a:p>
@@ -6492,7 +6498,7 @@
           <a:p>
             <a:fld id="{699DC775-C286-4358-8C92-D7E584E969B3}" type="datetimeFigureOut">
               <a:rPr lang="en-US" smtClean="0"/>
-              <a:t>6/6/2015</a:t>
+              <a:t>2016/05/16</a:t>
             </a:fld>
             <a:endParaRPr lang="en-US"/>
           </a:p>
@@ -6680,7 +6686,7 @@
           <a:p>
             <a:fld id="{699DC775-C286-4358-8C92-D7E584E969B3}" type="datetimeFigureOut">
               <a:rPr lang="en-US" smtClean="0"/>
-              <a:t>6/6/2015</a:t>
+              <a:t>2016/05/16</a:t>
             </a:fld>
             <a:endParaRPr lang="en-US"/>
           </a:p>
@@ -6968,7 +6974,7 @@
           <a:p>
             <a:fld id="{699DC775-C286-4358-8C92-D7E584E969B3}" type="datetimeFigureOut">
               <a:rPr lang="en-US" smtClean="0"/>
-              <a:t>6/6/2015</a:t>
+              <a:t>2016/05/16</a:t>
             </a:fld>
             <a:endParaRPr lang="en-US"/>
           </a:p>
@@ -7390,7 +7396,7 @@
           <a:p>
             <a:fld id="{699DC775-C286-4358-8C92-D7E584E969B3}" type="datetimeFigureOut">
               <a:rPr lang="en-US" smtClean="0"/>
-              <a:t>6/6/2015</a:t>
+              <a:t>2016/05/16</a:t>
             </a:fld>
             <a:endParaRPr lang="en-US"/>
           </a:p>
@@ -7508,7 +7514,7 @@
           <a:p>
             <a:fld id="{699DC775-C286-4358-8C92-D7E584E969B3}" type="datetimeFigureOut">
               <a:rPr lang="en-US" smtClean="0"/>
-              <a:t>6/6/2015</a:t>
+              <a:t>2016/05/16</a:t>
             </a:fld>
             <a:endParaRPr lang="en-US"/>
           </a:p>
@@ -7603,7 +7609,7 @@
           <a:p>
             <a:fld id="{699DC775-C286-4358-8C92-D7E584E969B3}" type="datetimeFigureOut">
               <a:rPr lang="en-US" smtClean="0"/>
-              <a:t>6/6/2015</a:t>
+              <a:t>2016/05/16</a:t>
             </a:fld>
             <a:endParaRPr lang="en-US"/>
           </a:p>
@@ -7880,7 +7886,7 @@
           <a:p>
             <a:fld id="{699DC775-C286-4358-8C92-D7E584E969B3}" type="datetimeFigureOut">
               <a:rPr lang="en-US" smtClean="0"/>
-              <a:t>6/6/2015</a:t>
+              <a:t>2016/05/16</a:t>
             </a:fld>
             <a:endParaRPr lang="en-US"/>
           </a:p>
@@ -8133,7 +8139,7 @@
           <a:p>
             <a:fld id="{699DC775-C286-4358-8C92-D7E584E969B3}" type="datetimeFigureOut">
               <a:rPr lang="en-US" smtClean="0"/>
-              <a:t>6/6/2015</a:t>
+              <a:t>2016/05/16</a:t>
             </a:fld>
             <a:endParaRPr lang="en-US"/>
           </a:p>
@@ -8346,7 +8352,7 @@
           <a:p>
             <a:fld id="{699DC775-C286-4358-8C92-D7E584E969B3}" type="datetimeFigureOut">
               <a:rPr lang="en-US" smtClean="0"/>
-              <a:t>6/6/2015</a:t>
+              <a:t>2016/05/16</a:t>
             </a:fld>
             <a:endParaRPr lang="en-US"/>
           </a:p>
@@ -8861,7 +8867,7 @@
           <a:p>
             <a:fld id="{699DC775-C286-4358-8C92-D7E584E969B3}" type="datetimeFigureOut">
               <a:rPr lang="en-US" smtClean="0"/>
-              <a:t>6/6/2015</a:t>
+              <a:t>2016/05/16</a:t>
             </a:fld>
             <a:endParaRPr lang="en-US"/>
           </a:p>
@@ -9374,7 +9380,7 @@
           <a:p>
             <a:fld id="{699DC775-C286-4358-8C92-D7E584E969B3}" type="datetimeFigureOut">
               <a:rPr lang="en-US" smtClean="0"/>
-              <a:t>6/6/2015</a:t>
+              <a:t>2016/05/16</a:t>
             </a:fld>
             <a:endParaRPr lang="en-US"/>
           </a:p>
@@ -9926,6 +9932,2949 @@
   <p:clrMapOvr>
     <a:masterClrMapping/>
   </p:clrMapOvr>
+</p:sld>
+</file>
+
+<file path=ppt/slides/slide10.xml><?xml version="1.0" encoding="utf-8"?>
+<p:sld xmlns:a="http://schemas.openxmlformats.org/drawingml/2006/main" xmlns:r="http://schemas.openxmlformats.org/officeDocument/2006/relationships" xmlns:p="http://schemas.openxmlformats.org/presentationml/2006/main">
+  <p:cSld>
+    <p:spTree>
+      <p:nvGrpSpPr>
+        <p:cNvPr id="1" name=""/>
+        <p:cNvGrpSpPr/>
+        <p:nvPr/>
+      </p:nvGrpSpPr>
+      <p:grpSpPr>
+        <a:xfrm>
+          <a:off x="0" y="0"/>
+          <a:ext cx="0" cy="0"/>
+          <a:chOff x="0" y="0"/>
+          <a:chExt cx="0" cy="0"/>
+        </a:xfrm>
+      </p:grpSpPr>
+      <p:pic>
+        <p:nvPicPr>
+          <p:cNvPr id="4" name="pic"/>
+          <p:cNvPicPr>
+            <a:picLocks noGrp="1" noChangeAspect="1"/>
+          </p:cNvPicPr>
+          <p:nvPr>
+            <p:ph idx="1"/>
+          </p:nvPr>
+        </p:nvPicPr>
+        <p:blipFill>
+          <a:blip r:embed="rId2">
+            <a:extLst>
+              <a:ext uri="{28A0092B-C50C-407E-A947-70E740481C1C}">
+                <a14:useLocalDpi xmlns:a14="http://schemas.microsoft.com/office/drawing/2010/main" val="0"/>
+              </a:ext>
+            </a:extLst>
+          </a:blip>
+          <a:stretch>
+            <a:fillRect/>
+          </a:stretch>
+        </p:blipFill>
+        <p:spPr>
+          <a:xfrm>
+            <a:off x="2514600" y="1219200"/>
+            <a:ext cx="4395876" cy="4351338"/>
+          </a:xfrm>
+        </p:spPr>
+      </p:pic>
+      <p:sp>
+        <p:nvSpPr>
+          <p:cNvPr id="6" name="selectMe"/>
+          <p:cNvSpPr/>
+          <p:nvPr/>
+        </p:nvSpPr>
+        <p:spPr>
+          <a:xfrm rot="705292">
+            <a:off x="2514600" y="1219200"/>
+            <a:ext cx="4094440" cy="4254500"/>
+          </a:xfrm>
+          <a:custGeom>
+            <a:avLst/>
+            <a:gdLst>
+              <a:gd name="connsiteX0" fmla="*/ 1968500 w 4094440"/>
+              <a:gd name="connsiteY0" fmla="*/ 139700 h 4254500"/>
+              <a:gd name="connsiteX1" fmla="*/ 1968500 w 4094440"/>
+              <a:gd name="connsiteY1" fmla="*/ 139700 h 4254500"/>
+              <a:gd name="connsiteX2" fmla="*/ 1854200 w 4094440"/>
+              <a:gd name="connsiteY2" fmla="*/ 152400 h 4254500"/>
+              <a:gd name="connsiteX3" fmla="*/ 1714500 w 4094440"/>
+              <a:gd name="connsiteY3" fmla="*/ 177800 h 4254500"/>
+              <a:gd name="connsiteX4" fmla="*/ 1638300 w 4094440"/>
+              <a:gd name="connsiteY4" fmla="*/ 203200 h 4254500"/>
+              <a:gd name="connsiteX5" fmla="*/ 1600200 w 4094440"/>
+              <a:gd name="connsiteY5" fmla="*/ 215900 h 4254500"/>
+              <a:gd name="connsiteX6" fmla="*/ 1524000 w 4094440"/>
+              <a:gd name="connsiteY6" fmla="*/ 254000 h 4254500"/>
+              <a:gd name="connsiteX7" fmla="*/ 1409700 w 4094440"/>
+              <a:gd name="connsiteY7" fmla="*/ 304800 h 4254500"/>
+              <a:gd name="connsiteX8" fmla="*/ 1282700 w 4094440"/>
+              <a:gd name="connsiteY8" fmla="*/ 330200 h 4254500"/>
+              <a:gd name="connsiteX9" fmla="*/ 1168400 w 4094440"/>
+              <a:gd name="connsiteY9" fmla="*/ 355600 h 4254500"/>
+              <a:gd name="connsiteX10" fmla="*/ 1079500 w 4094440"/>
+              <a:gd name="connsiteY10" fmla="*/ 368300 h 4254500"/>
+              <a:gd name="connsiteX11" fmla="*/ 1003300 w 4094440"/>
+              <a:gd name="connsiteY11" fmla="*/ 406400 h 4254500"/>
+              <a:gd name="connsiteX12" fmla="*/ 965200 w 4094440"/>
+              <a:gd name="connsiteY12" fmla="*/ 444500 h 4254500"/>
+              <a:gd name="connsiteX13" fmla="*/ 889000 w 4094440"/>
+              <a:gd name="connsiteY13" fmla="*/ 508000 h 4254500"/>
+              <a:gd name="connsiteX14" fmla="*/ 863600 w 4094440"/>
+              <a:gd name="connsiteY14" fmla="*/ 546100 h 4254500"/>
+              <a:gd name="connsiteX15" fmla="*/ 787400 w 4094440"/>
+              <a:gd name="connsiteY15" fmla="*/ 622300 h 4254500"/>
+              <a:gd name="connsiteX16" fmla="*/ 711200 w 4094440"/>
+              <a:gd name="connsiteY16" fmla="*/ 673100 h 4254500"/>
+              <a:gd name="connsiteX17" fmla="*/ 685800 w 4094440"/>
+              <a:gd name="connsiteY17" fmla="*/ 723900 h 4254500"/>
+              <a:gd name="connsiteX18" fmla="*/ 635000 w 4094440"/>
+              <a:gd name="connsiteY18" fmla="*/ 800100 h 4254500"/>
+              <a:gd name="connsiteX19" fmla="*/ 584200 w 4094440"/>
+              <a:gd name="connsiteY19" fmla="*/ 876300 h 4254500"/>
+              <a:gd name="connsiteX20" fmla="*/ 520700 w 4094440"/>
+              <a:gd name="connsiteY20" fmla="*/ 990600 h 4254500"/>
+              <a:gd name="connsiteX21" fmla="*/ 482600 w 4094440"/>
+              <a:gd name="connsiteY21" fmla="*/ 1016000 h 4254500"/>
+              <a:gd name="connsiteX22" fmla="*/ 457200 w 4094440"/>
+              <a:gd name="connsiteY22" fmla="*/ 1092200 h 4254500"/>
+              <a:gd name="connsiteX23" fmla="*/ 431800 w 4094440"/>
+              <a:gd name="connsiteY23" fmla="*/ 1130300 h 4254500"/>
+              <a:gd name="connsiteX24" fmla="*/ 419100 w 4094440"/>
+              <a:gd name="connsiteY24" fmla="*/ 1168400 h 4254500"/>
+              <a:gd name="connsiteX25" fmla="*/ 368300 w 4094440"/>
+              <a:gd name="connsiteY25" fmla="*/ 1244600 h 4254500"/>
+              <a:gd name="connsiteX26" fmla="*/ 342900 w 4094440"/>
+              <a:gd name="connsiteY26" fmla="*/ 1282700 h 4254500"/>
+              <a:gd name="connsiteX27" fmla="*/ 292100 w 4094440"/>
+              <a:gd name="connsiteY27" fmla="*/ 1397000 h 4254500"/>
+              <a:gd name="connsiteX28" fmla="*/ 266700 w 4094440"/>
+              <a:gd name="connsiteY28" fmla="*/ 1485900 h 4254500"/>
+              <a:gd name="connsiteX29" fmla="*/ 215900 w 4094440"/>
+              <a:gd name="connsiteY29" fmla="*/ 1574800 h 4254500"/>
+              <a:gd name="connsiteX30" fmla="*/ 177800 w 4094440"/>
+              <a:gd name="connsiteY30" fmla="*/ 1701800 h 4254500"/>
+              <a:gd name="connsiteX31" fmla="*/ 165100 w 4094440"/>
+              <a:gd name="connsiteY31" fmla="*/ 1739900 h 4254500"/>
+              <a:gd name="connsiteX32" fmla="*/ 152400 w 4094440"/>
+              <a:gd name="connsiteY32" fmla="*/ 1803400 h 4254500"/>
+              <a:gd name="connsiteX33" fmla="*/ 127000 w 4094440"/>
+              <a:gd name="connsiteY33" fmla="*/ 1854200 h 4254500"/>
+              <a:gd name="connsiteX34" fmla="*/ 114300 w 4094440"/>
+              <a:gd name="connsiteY34" fmla="*/ 1905000 h 4254500"/>
+              <a:gd name="connsiteX35" fmla="*/ 88900 w 4094440"/>
+              <a:gd name="connsiteY35" fmla="*/ 1993900 h 4254500"/>
+              <a:gd name="connsiteX36" fmla="*/ 76200 w 4094440"/>
+              <a:gd name="connsiteY36" fmla="*/ 2057400 h 4254500"/>
+              <a:gd name="connsiteX37" fmla="*/ 38100 w 4094440"/>
+              <a:gd name="connsiteY37" fmla="*/ 2197100 h 4254500"/>
+              <a:gd name="connsiteX38" fmla="*/ 25400 w 4094440"/>
+              <a:gd name="connsiteY38" fmla="*/ 2298700 h 4254500"/>
+              <a:gd name="connsiteX39" fmla="*/ 12700 w 4094440"/>
+              <a:gd name="connsiteY39" fmla="*/ 2527300 h 4254500"/>
+              <a:gd name="connsiteX40" fmla="*/ 0 w 4094440"/>
+              <a:gd name="connsiteY40" fmla="*/ 2705100 h 4254500"/>
+              <a:gd name="connsiteX41" fmla="*/ 12700 w 4094440"/>
+              <a:gd name="connsiteY41" fmla="*/ 3086100 h 4254500"/>
+              <a:gd name="connsiteX42" fmla="*/ 50800 w 4094440"/>
+              <a:gd name="connsiteY42" fmla="*/ 3225800 h 4254500"/>
+              <a:gd name="connsiteX43" fmla="*/ 88900 w 4094440"/>
+              <a:gd name="connsiteY43" fmla="*/ 3352800 h 4254500"/>
+              <a:gd name="connsiteX44" fmla="*/ 114300 w 4094440"/>
+              <a:gd name="connsiteY44" fmla="*/ 3390900 h 4254500"/>
+              <a:gd name="connsiteX45" fmla="*/ 139700 w 4094440"/>
+              <a:gd name="connsiteY45" fmla="*/ 3479800 h 4254500"/>
+              <a:gd name="connsiteX46" fmla="*/ 190500 w 4094440"/>
+              <a:gd name="connsiteY46" fmla="*/ 3606800 h 4254500"/>
+              <a:gd name="connsiteX47" fmla="*/ 215900 w 4094440"/>
+              <a:gd name="connsiteY47" fmla="*/ 3708400 h 4254500"/>
+              <a:gd name="connsiteX48" fmla="*/ 241300 w 4094440"/>
+              <a:gd name="connsiteY48" fmla="*/ 3797300 h 4254500"/>
+              <a:gd name="connsiteX49" fmla="*/ 266700 w 4094440"/>
+              <a:gd name="connsiteY49" fmla="*/ 3835400 h 4254500"/>
+              <a:gd name="connsiteX50" fmla="*/ 292100 w 4094440"/>
+              <a:gd name="connsiteY50" fmla="*/ 3911600 h 4254500"/>
+              <a:gd name="connsiteX51" fmla="*/ 342900 w 4094440"/>
+              <a:gd name="connsiteY51" fmla="*/ 3987800 h 4254500"/>
+              <a:gd name="connsiteX52" fmla="*/ 381000 w 4094440"/>
+              <a:gd name="connsiteY52" fmla="*/ 4064000 h 4254500"/>
+              <a:gd name="connsiteX53" fmla="*/ 419100 w 4094440"/>
+              <a:gd name="connsiteY53" fmla="*/ 4076700 h 4254500"/>
+              <a:gd name="connsiteX54" fmla="*/ 457200 w 4094440"/>
+              <a:gd name="connsiteY54" fmla="*/ 4102100 h 4254500"/>
+              <a:gd name="connsiteX55" fmla="*/ 1155700 w 4094440"/>
+              <a:gd name="connsiteY55" fmla="*/ 4127500 h 4254500"/>
+              <a:gd name="connsiteX56" fmla="*/ 1219200 w 4094440"/>
+              <a:gd name="connsiteY56" fmla="*/ 4140200 h 4254500"/>
+              <a:gd name="connsiteX57" fmla="*/ 1295400 w 4094440"/>
+              <a:gd name="connsiteY57" fmla="*/ 4152900 h 4254500"/>
+              <a:gd name="connsiteX58" fmla="*/ 1422400 w 4094440"/>
+              <a:gd name="connsiteY58" fmla="*/ 4203700 h 4254500"/>
+              <a:gd name="connsiteX59" fmla="*/ 1562100 w 4094440"/>
+              <a:gd name="connsiteY59" fmla="*/ 4229100 h 4254500"/>
+              <a:gd name="connsiteX60" fmla="*/ 2273300 w 4094440"/>
+              <a:gd name="connsiteY60" fmla="*/ 4229100 h 4254500"/>
+              <a:gd name="connsiteX61" fmla="*/ 2311400 w 4094440"/>
+              <a:gd name="connsiteY61" fmla="*/ 4241800 h 4254500"/>
+              <a:gd name="connsiteX62" fmla="*/ 2387600 w 4094440"/>
+              <a:gd name="connsiteY62" fmla="*/ 4254500 h 4254500"/>
+              <a:gd name="connsiteX63" fmla="*/ 2971800 w 4094440"/>
+              <a:gd name="connsiteY63" fmla="*/ 4241800 h 4254500"/>
+              <a:gd name="connsiteX64" fmla="*/ 3022600 w 4094440"/>
+              <a:gd name="connsiteY64" fmla="*/ 4229100 h 4254500"/>
+              <a:gd name="connsiteX65" fmla="*/ 3441700 w 4094440"/>
+              <a:gd name="connsiteY65" fmla="*/ 4216400 h 4254500"/>
+              <a:gd name="connsiteX66" fmla="*/ 3530600 w 4094440"/>
+              <a:gd name="connsiteY66" fmla="*/ 4140200 h 4254500"/>
+              <a:gd name="connsiteX67" fmla="*/ 3568700 w 4094440"/>
+              <a:gd name="connsiteY67" fmla="*/ 4076700 h 4254500"/>
+              <a:gd name="connsiteX68" fmla="*/ 3619500 w 4094440"/>
+              <a:gd name="connsiteY68" fmla="*/ 4000500 h 4254500"/>
+              <a:gd name="connsiteX69" fmla="*/ 3695700 w 4094440"/>
+              <a:gd name="connsiteY69" fmla="*/ 3860800 h 4254500"/>
+              <a:gd name="connsiteX70" fmla="*/ 3708400 w 4094440"/>
+              <a:gd name="connsiteY70" fmla="*/ 3810000 h 4254500"/>
+              <a:gd name="connsiteX71" fmla="*/ 3733800 w 4094440"/>
+              <a:gd name="connsiteY71" fmla="*/ 3771900 h 4254500"/>
+              <a:gd name="connsiteX72" fmla="*/ 3746500 w 4094440"/>
+              <a:gd name="connsiteY72" fmla="*/ 3695700 h 4254500"/>
+              <a:gd name="connsiteX73" fmla="*/ 3771900 w 4094440"/>
+              <a:gd name="connsiteY73" fmla="*/ 3644900 h 4254500"/>
+              <a:gd name="connsiteX74" fmla="*/ 3784600 w 4094440"/>
+              <a:gd name="connsiteY74" fmla="*/ 3606800 h 4254500"/>
+              <a:gd name="connsiteX75" fmla="*/ 3810000 w 4094440"/>
+              <a:gd name="connsiteY75" fmla="*/ 3556000 h 4254500"/>
+              <a:gd name="connsiteX76" fmla="*/ 3835400 w 4094440"/>
+              <a:gd name="connsiteY76" fmla="*/ 3479800 h 4254500"/>
+              <a:gd name="connsiteX77" fmla="*/ 3898900 w 4094440"/>
+              <a:gd name="connsiteY77" fmla="*/ 3365500 h 4254500"/>
+              <a:gd name="connsiteX78" fmla="*/ 3937000 w 4094440"/>
+              <a:gd name="connsiteY78" fmla="*/ 3314700 h 4254500"/>
+              <a:gd name="connsiteX79" fmla="*/ 3975100 w 4094440"/>
+              <a:gd name="connsiteY79" fmla="*/ 3238500 h 4254500"/>
+              <a:gd name="connsiteX80" fmla="*/ 4013200 w 4094440"/>
+              <a:gd name="connsiteY80" fmla="*/ 3124200 h 4254500"/>
+              <a:gd name="connsiteX81" fmla="*/ 4064000 w 4094440"/>
+              <a:gd name="connsiteY81" fmla="*/ 3009900 h 4254500"/>
+              <a:gd name="connsiteX82" fmla="*/ 4076700 w 4094440"/>
+              <a:gd name="connsiteY82" fmla="*/ 2603500 h 4254500"/>
+              <a:gd name="connsiteX83" fmla="*/ 4064000 w 4094440"/>
+              <a:gd name="connsiteY83" fmla="*/ 2260600 h 4254500"/>
+              <a:gd name="connsiteX84" fmla="*/ 4038600 w 4094440"/>
+              <a:gd name="connsiteY84" fmla="*/ 2222500 h 4254500"/>
+              <a:gd name="connsiteX85" fmla="*/ 4013200 w 4094440"/>
+              <a:gd name="connsiteY85" fmla="*/ 2146300 h 4254500"/>
+              <a:gd name="connsiteX86" fmla="*/ 4000500 w 4094440"/>
+              <a:gd name="connsiteY86" fmla="*/ 2095500 h 4254500"/>
+              <a:gd name="connsiteX87" fmla="*/ 3949700 w 4094440"/>
+              <a:gd name="connsiteY87" fmla="*/ 2019300 h 4254500"/>
+              <a:gd name="connsiteX88" fmla="*/ 3924300 w 4094440"/>
+              <a:gd name="connsiteY88" fmla="*/ 1943100 h 4254500"/>
+              <a:gd name="connsiteX89" fmla="*/ 3898900 w 4094440"/>
+              <a:gd name="connsiteY89" fmla="*/ 1905000 h 4254500"/>
+              <a:gd name="connsiteX90" fmla="*/ 3873500 w 4094440"/>
+              <a:gd name="connsiteY90" fmla="*/ 1828800 h 4254500"/>
+              <a:gd name="connsiteX91" fmla="*/ 3835400 w 4094440"/>
+              <a:gd name="connsiteY91" fmla="*/ 1727200 h 4254500"/>
+              <a:gd name="connsiteX92" fmla="*/ 3822700 w 4094440"/>
+              <a:gd name="connsiteY92" fmla="*/ 1689100 h 4254500"/>
+              <a:gd name="connsiteX93" fmla="*/ 3797300 w 4094440"/>
+              <a:gd name="connsiteY93" fmla="*/ 1625600 h 4254500"/>
+              <a:gd name="connsiteX94" fmla="*/ 3784600 w 4094440"/>
+              <a:gd name="connsiteY94" fmla="*/ 1587500 h 4254500"/>
+              <a:gd name="connsiteX95" fmla="*/ 3759200 w 4094440"/>
+              <a:gd name="connsiteY95" fmla="*/ 1549400 h 4254500"/>
+              <a:gd name="connsiteX96" fmla="*/ 3721100 w 4094440"/>
+              <a:gd name="connsiteY96" fmla="*/ 1447800 h 4254500"/>
+              <a:gd name="connsiteX97" fmla="*/ 3695700 w 4094440"/>
+              <a:gd name="connsiteY97" fmla="*/ 1371600 h 4254500"/>
+              <a:gd name="connsiteX98" fmla="*/ 3683000 w 4094440"/>
+              <a:gd name="connsiteY98" fmla="*/ 1333500 h 4254500"/>
+              <a:gd name="connsiteX99" fmla="*/ 3657600 w 4094440"/>
+              <a:gd name="connsiteY99" fmla="*/ 1295400 h 4254500"/>
+              <a:gd name="connsiteX100" fmla="*/ 3632200 w 4094440"/>
+              <a:gd name="connsiteY100" fmla="*/ 1231900 h 4254500"/>
+              <a:gd name="connsiteX101" fmla="*/ 3619500 w 4094440"/>
+              <a:gd name="connsiteY101" fmla="*/ 1181100 h 4254500"/>
+              <a:gd name="connsiteX102" fmla="*/ 3594100 w 4094440"/>
+              <a:gd name="connsiteY102" fmla="*/ 1143000 h 4254500"/>
+              <a:gd name="connsiteX103" fmla="*/ 3530600 w 4094440"/>
+              <a:gd name="connsiteY103" fmla="*/ 1016000 h 4254500"/>
+              <a:gd name="connsiteX104" fmla="*/ 3505200 w 4094440"/>
+              <a:gd name="connsiteY104" fmla="*/ 901700 h 4254500"/>
+              <a:gd name="connsiteX105" fmla="*/ 3492500 w 4094440"/>
+              <a:gd name="connsiteY105" fmla="*/ 850900 h 4254500"/>
+              <a:gd name="connsiteX106" fmla="*/ 3467100 w 4094440"/>
+              <a:gd name="connsiteY106" fmla="*/ 812800 h 4254500"/>
+              <a:gd name="connsiteX107" fmla="*/ 3429000 w 4094440"/>
+              <a:gd name="connsiteY107" fmla="*/ 723900 h 4254500"/>
+              <a:gd name="connsiteX108" fmla="*/ 3416300 w 4094440"/>
+              <a:gd name="connsiteY108" fmla="*/ 685800 h 4254500"/>
+              <a:gd name="connsiteX109" fmla="*/ 3340100 w 4094440"/>
+              <a:gd name="connsiteY109" fmla="*/ 584200 h 4254500"/>
+              <a:gd name="connsiteX110" fmla="*/ 3225800 w 4094440"/>
+              <a:gd name="connsiteY110" fmla="*/ 495300 h 4254500"/>
+              <a:gd name="connsiteX111" fmla="*/ 3162300 w 4094440"/>
+              <a:gd name="connsiteY111" fmla="*/ 431800 h 4254500"/>
+              <a:gd name="connsiteX112" fmla="*/ 3111500 w 4094440"/>
+              <a:gd name="connsiteY112" fmla="*/ 406400 h 4254500"/>
+              <a:gd name="connsiteX113" fmla="*/ 3060700 w 4094440"/>
+              <a:gd name="connsiteY113" fmla="*/ 355600 h 4254500"/>
+              <a:gd name="connsiteX114" fmla="*/ 2946400 w 4094440"/>
+              <a:gd name="connsiteY114" fmla="*/ 279400 h 4254500"/>
+              <a:gd name="connsiteX115" fmla="*/ 2857500 w 4094440"/>
+              <a:gd name="connsiteY115" fmla="*/ 215900 h 4254500"/>
+              <a:gd name="connsiteX116" fmla="*/ 2781300 w 4094440"/>
+              <a:gd name="connsiteY116" fmla="*/ 190500 h 4254500"/>
+              <a:gd name="connsiteX117" fmla="*/ 2743200 w 4094440"/>
+              <a:gd name="connsiteY117" fmla="*/ 165100 h 4254500"/>
+              <a:gd name="connsiteX118" fmla="*/ 2705100 w 4094440"/>
+              <a:gd name="connsiteY118" fmla="*/ 127000 h 4254500"/>
+              <a:gd name="connsiteX119" fmla="*/ 2667000 w 4094440"/>
+              <a:gd name="connsiteY119" fmla="*/ 114300 h 4254500"/>
+              <a:gd name="connsiteX120" fmla="*/ 2590800 w 4094440"/>
+              <a:gd name="connsiteY120" fmla="*/ 50800 h 4254500"/>
+              <a:gd name="connsiteX121" fmla="*/ 2552700 w 4094440"/>
+              <a:gd name="connsiteY121" fmla="*/ 38100 h 4254500"/>
+              <a:gd name="connsiteX122" fmla="*/ 2463800 w 4094440"/>
+              <a:gd name="connsiteY122" fmla="*/ 0 h 4254500"/>
+              <a:gd name="connsiteX123" fmla="*/ 2298700 w 4094440"/>
+              <a:gd name="connsiteY123" fmla="*/ 25400 h 4254500"/>
+              <a:gd name="connsiteX124" fmla="*/ 2260600 w 4094440"/>
+              <a:gd name="connsiteY124" fmla="*/ 50800 h 4254500"/>
+              <a:gd name="connsiteX125" fmla="*/ 2222500 w 4094440"/>
+              <a:gd name="connsiteY125" fmla="*/ 63500 h 4254500"/>
+              <a:gd name="connsiteX126" fmla="*/ 2184400 w 4094440"/>
+              <a:gd name="connsiteY126" fmla="*/ 88900 h 4254500"/>
+              <a:gd name="connsiteX127" fmla="*/ 2146300 w 4094440"/>
+              <a:gd name="connsiteY127" fmla="*/ 101600 h 4254500"/>
+              <a:gd name="connsiteX128" fmla="*/ 2108200 w 4094440"/>
+              <a:gd name="connsiteY128" fmla="*/ 127000 h 4254500"/>
+              <a:gd name="connsiteX129" fmla="*/ 1968500 w 4094440"/>
+              <a:gd name="connsiteY129" fmla="*/ 139700 h 4254500"/>
+            </a:gdLst>
+            <a:ahLst/>
+            <a:cxnLst>
+              <a:cxn ang="0">
+                <a:pos x="connsiteX0" y="connsiteY0"/>
+              </a:cxn>
+              <a:cxn ang="0">
+                <a:pos x="connsiteX1" y="connsiteY1"/>
+              </a:cxn>
+              <a:cxn ang="0">
+                <a:pos x="connsiteX2" y="connsiteY2"/>
+              </a:cxn>
+              <a:cxn ang="0">
+                <a:pos x="connsiteX3" y="connsiteY3"/>
+              </a:cxn>
+              <a:cxn ang="0">
+                <a:pos x="connsiteX4" y="connsiteY4"/>
+              </a:cxn>
+              <a:cxn ang="0">
+                <a:pos x="connsiteX5" y="connsiteY5"/>
+              </a:cxn>
+              <a:cxn ang="0">
+                <a:pos x="connsiteX6" y="connsiteY6"/>
+              </a:cxn>
+              <a:cxn ang="0">
+                <a:pos x="connsiteX7" y="connsiteY7"/>
+              </a:cxn>
+              <a:cxn ang="0">
+                <a:pos x="connsiteX8" y="connsiteY8"/>
+              </a:cxn>
+              <a:cxn ang="0">
+                <a:pos x="connsiteX9" y="connsiteY9"/>
+              </a:cxn>
+              <a:cxn ang="0">
+                <a:pos x="connsiteX10" y="connsiteY10"/>
+              </a:cxn>
+              <a:cxn ang="0">
+                <a:pos x="connsiteX11" y="connsiteY11"/>
+              </a:cxn>
+              <a:cxn ang="0">
+                <a:pos x="connsiteX12" y="connsiteY12"/>
+              </a:cxn>
+              <a:cxn ang="0">
+                <a:pos x="connsiteX13" y="connsiteY13"/>
+              </a:cxn>
+              <a:cxn ang="0">
+                <a:pos x="connsiteX14" y="connsiteY14"/>
+              </a:cxn>
+              <a:cxn ang="0">
+                <a:pos x="connsiteX15" y="connsiteY15"/>
+              </a:cxn>
+              <a:cxn ang="0">
+                <a:pos x="connsiteX16" y="connsiteY16"/>
+              </a:cxn>
+              <a:cxn ang="0">
+                <a:pos x="connsiteX17" y="connsiteY17"/>
+              </a:cxn>
+              <a:cxn ang="0">
+                <a:pos x="connsiteX18" y="connsiteY18"/>
+              </a:cxn>
+              <a:cxn ang="0">
+                <a:pos x="connsiteX19" y="connsiteY19"/>
+              </a:cxn>
+              <a:cxn ang="0">
+                <a:pos x="connsiteX20" y="connsiteY20"/>
+              </a:cxn>
+              <a:cxn ang="0">
+                <a:pos x="connsiteX21" y="connsiteY21"/>
+              </a:cxn>
+              <a:cxn ang="0">
+                <a:pos x="connsiteX22" y="connsiteY22"/>
+              </a:cxn>
+              <a:cxn ang="0">
+                <a:pos x="connsiteX23" y="connsiteY23"/>
+              </a:cxn>
+              <a:cxn ang="0">
+                <a:pos x="connsiteX24" y="connsiteY24"/>
+              </a:cxn>
+              <a:cxn ang="0">
+                <a:pos x="connsiteX25" y="connsiteY25"/>
+              </a:cxn>
+              <a:cxn ang="0">
+                <a:pos x="connsiteX26" y="connsiteY26"/>
+              </a:cxn>
+              <a:cxn ang="0">
+                <a:pos x="connsiteX27" y="connsiteY27"/>
+              </a:cxn>
+              <a:cxn ang="0">
+                <a:pos x="connsiteX28" y="connsiteY28"/>
+              </a:cxn>
+              <a:cxn ang="0">
+                <a:pos x="connsiteX29" y="connsiteY29"/>
+              </a:cxn>
+              <a:cxn ang="0">
+                <a:pos x="connsiteX30" y="connsiteY30"/>
+              </a:cxn>
+              <a:cxn ang="0">
+                <a:pos x="connsiteX31" y="connsiteY31"/>
+              </a:cxn>
+              <a:cxn ang="0">
+                <a:pos x="connsiteX32" y="connsiteY32"/>
+              </a:cxn>
+              <a:cxn ang="0">
+                <a:pos x="connsiteX33" y="connsiteY33"/>
+              </a:cxn>
+              <a:cxn ang="0">
+                <a:pos x="connsiteX34" y="connsiteY34"/>
+              </a:cxn>
+              <a:cxn ang="0">
+                <a:pos x="connsiteX35" y="connsiteY35"/>
+              </a:cxn>
+              <a:cxn ang="0">
+                <a:pos x="connsiteX36" y="connsiteY36"/>
+              </a:cxn>
+              <a:cxn ang="0">
+                <a:pos x="connsiteX37" y="connsiteY37"/>
+              </a:cxn>
+              <a:cxn ang="0">
+                <a:pos x="connsiteX38" y="connsiteY38"/>
+              </a:cxn>
+              <a:cxn ang="0">
+                <a:pos x="connsiteX39" y="connsiteY39"/>
+              </a:cxn>
+              <a:cxn ang="0">
+                <a:pos x="connsiteX40" y="connsiteY40"/>
+              </a:cxn>
+              <a:cxn ang="0">
+                <a:pos x="connsiteX41" y="connsiteY41"/>
+              </a:cxn>
+              <a:cxn ang="0">
+                <a:pos x="connsiteX42" y="connsiteY42"/>
+              </a:cxn>
+              <a:cxn ang="0">
+                <a:pos x="connsiteX43" y="connsiteY43"/>
+              </a:cxn>
+              <a:cxn ang="0">
+                <a:pos x="connsiteX44" y="connsiteY44"/>
+              </a:cxn>
+              <a:cxn ang="0">
+                <a:pos x="connsiteX45" y="connsiteY45"/>
+              </a:cxn>
+              <a:cxn ang="0">
+                <a:pos x="connsiteX46" y="connsiteY46"/>
+              </a:cxn>
+              <a:cxn ang="0">
+                <a:pos x="connsiteX47" y="connsiteY47"/>
+              </a:cxn>
+              <a:cxn ang="0">
+                <a:pos x="connsiteX48" y="connsiteY48"/>
+              </a:cxn>
+              <a:cxn ang="0">
+                <a:pos x="connsiteX49" y="connsiteY49"/>
+              </a:cxn>
+              <a:cxn ang="0">
+                <a:pos x="connsiteX50" y="connsiteY50"/>
+              </a:cxn>
+              <a:cxn ang="0">
+                <a:pos x="connsiteX51" y="connsiteY51"/>
+              </a:cxn>
+              <a:cxn ang="0">
+                <a:pos x="connsiteX52" y="connsiteY52"/>
+              </a:cxn>
+              <a:cxn ang="0">
+                <a:pos x="connsiteX53" y="connsiteY53"/>
+              </a:cxn>
+              <a:cxn ang="0">
+                <a:pos x="connsiteX54" y="connsiteY54"/>
+              </a:cxn>
+              <a:cxn ang="0">
+                <a:pos x="connsiteX55" y="connsiteY55"/>
+              </a:cxn>
+              <a:cxn ang="0">
+                <a:pos x="connsiteX56" y="connsiteY56"/>
+              </a:cxn>
+              <a:cxn ang="0">
+                <a:pos x="connsiteX57" y="connsiteY57"/>
+              </a:cxn>
+              <a:cxn ang="0">
+                <a:pos x="connsiteX58" y="connsiteY58"/>
+              </a:cxn>
+              <a:cxn ang="0">
+                <a:pos x="connsiteX59" y="connsiteY59"/>
+              </a:cxn>
+              <a:cxn ang="0">
+                <a:pos x="connsiteX60" y="connsiteY60"/>
+              </a:cxn>
+              <a:cxn ang="0">
+                <a:pos x="connsiteX61" y="connsiteY61"/>
+              </a:cxn>
+              <a:cxn ang="0">
+                <a:pos x="connsiteX62" y="connsiteY62"/>
+              </a:cxn>
+              <a:cxn ang="0">
+                <a:pos x="connsiteX63" y="connsiteY63"/>
+              </a:cxn>
+              <a:cxn ang="0">
+                <a:pos x="connsiteX64" y="connsiteY64"/>
+              </a:cxn>
+              <a:cxn ang="0">
+                <a:pos x="connsiteX65" y="connsiteY65"/>
+              </a:cxn>
+              <a:cxn ang="0">
+                <a:pos x="connsiteX66" y="connsiteY66"/>
+              </a:cxn>
+              <a:cxn ang="0">
+                <a:pos x="connsiteX67" y="connsiteY67"/>
+              </a:cxn>
+              <a:cxn ang="0">
+                <a:pos x="connsiteX68" y="connsiteY68"/>
+              </a:cxn>
+              <a:cxn ang="0">
+                <a:pos x="connsiteX69" y="connsiteY69"/>
+              </a:cxn>
+              <a:cxn ang="0">
+                <a:pos x="connsiteX70" y="connsiteY70"/>
+              </a:cxn>
+              <a:cxn ang="0">
+                <a:pos x="connsiteX71" y="connsiteY71"/>
+              </a:cxn>
+              <a:cxn ang="0">
+                <a:pos x="connsiteX72" y="connsiteY72"/>
+              </a:cxn>
+              <a:cxn ang="0">
+                <a:pos x="connsiteX73" y="connsiteY73"/>
+              </a:cxn>
+              <a:cxn ang="0">
+                <a:pos x="connsiteX74" y="connsiteY74"/>
+              </a:cxn>
+              <a:cxn ang="0">
+                <a:pos x="connsiteX75" y="connsiteY75"/>
+              </a:cxn>
+              <a:cxn ang="0">
+                <a:pos x="connsiteX76" y="connsiteY76"/>
+              </a:cxn>
+              <a:cxn ang="0">
+                <a:pos x="connsiteX77" y="connsiteY77"/>
+              </a:cxn>
+              <a:cxn ang="0">
+                <a:pos x="connsiteX78" y="connsiteY78"/>
+              </a:cxn>
+              <a:cxn ang="0">
+                <a:pos x="connsiteX79" y="connsiteY79"/>
+              </a:cxn>
+              <a:cxn ang="0">
+                <a:pos x="connsiteX80" y="connsiteY80"/>
+              </a:cxn>
+              <a:cxn ang="0">
+                <a:pos x="connsiteX81" y="connsiteY81"/>
+              </a:cxn>
+              <a:cxn ang="0">
+                <a:pos x="connsiteX82" y="connsiteY82"/>
+              </a:cxn>
+              <a:cxn ang="0">
+                <a:pos x="connsiteX83" y="connsiteY83"/>
+              </a:cxn>
+              <a:cxn ang="0">
+                <a:pos x="connsiteX84" y="connsiteY84"/>
+              </a:cxn>
+              <a:cxn ang="0">
+                <a:pos x="connsiteX85" y="connsiteY85"/>
+              </a:cxn>
+              <a:cxn ang="0">
+                <a:pos x="connsiteX86" y="connsiteY86"/>
+              </a:cxn>
+              <a:cxn ang="0">
+                <a:pos x="connsiteX87" y="connsiteY87"/>
+              </a:cxn>
+              <a:cxn ang="0">
+                <a:pos x="connsiteX88" y="connsiteY88"/>
+              </a:cxn>
+              <a:cxn ang="0">
+                <a:pos x="connsiteX89" y="connsiteY89"/>
+              </a:cxn>
+              <a:cxn ang="0">
+                <a:pos x="connsiteX90" y="connsiteY90"/>
+              </a:cxn>
+              <a:cxn ang="0">
+                <a:pos x="connsiteX91" y="connsiteY91"/>
+              </a:cxn>
+              <a:cxn ang="0">
+                <a:pos x="connsiteX92" y="connsiteY92"/>
+              </a:cxn>
+              <a:cxn ang="0">
+                <a:pos x="connsiteX93" y="connsiteY93"/>
+              </a:cxn>
+              <a:cxn ang="0">
+                <a:pos x="connsiteX94" y="connsiteY94"/>
+              </a:cxn>
+              <a:cxn ang="0">
+                <a:pos x="connsiteX95" y="connsiteY95"/>
+              </a:cxn>
+              <a:cxn ang="0">
+                <a:pos x="connsiteX96" y="connsiteY96"/>
+              </a:cxn>
+              <a:cxn ang="0">
+                <a:pos x="connsiteX97" y="connsiteY97"/>
+              </a:cxn>
+              <a:cxn ang="0">
+                <a:pos x="connsiteX98" y="connsiteY98"/>
+              </a:cxn>
+              <a:cxn ang="0">
+                <a:pos x="connsiteX99" y="connsiteY99"/>
+              </a:cxn>
+              <a:cxn ang="0">
+                <a:pos x="connsiteX100" y="connsiteY100"/>
+              </a:cxn>
+              <a:cxn ang="0">
+                <a:pos x="connsiteX101" y="connsiteY101"/>
+              </a:cxn>
+              <a:cxn ang="0">
+                <a:pos x="connsiteX102" y="connsiteY102"/>
+              </a:cxn>
+              <a:cxn ang="0">
+                <a:pos x="connsiteX103" y="connsiteY103"/>
+              </a:cxn>
+              <a:cxn ang="0">
+                <a:pos x="connsiteX104" y="connsiteY104"/>
+              </a:cxn>
+              <a:cxn ang="0">
+                <a:pos x="connsiteX105" y="connsiteY105"/>
+              </a:cxn>
+              <a:cxn ang="0">
+                <a:pos x="connsiteX106" y="connsiteY106"/>
+              </a:cxn>
+              <a:cxn ang="0">
+                <a:pos x="connsiteX107" y="connsiteY107"/>
+              </a:cxn>
+              <a:cxn ang="0">
+                <a:pos x="connsiteX108" y="connsiteY108"/>
+              </a:cxn>
+              <a:cxn ang="0">
+                <a:pos x="connsiteX109" y="connsiteY109"/>
+              </a:cxn>
+              <a:cxn ang="0">
+                <a:pos x="connsiteX110" y="connsiteY110"/>
+              </a:cxn>
+              <a:cxn ang="0">
+                <a:pos x="connsiteX111" y="connsiteY111"/>
+              </a:cxn>
+              <a:cxn ang="0">
+                <a:pos x="connsiteX112" y="connsiteY112"/>
+              </a:cxn>
+              <a:cxn ang="0">
+                <a:pos x="connsiteX113" y="connsiteY113"/>
+              </a:cxn>
+              <a:cxn ang="0">
+                <a:pos x="connsiteX114" y="connsiteY114"/>
+              </a:cxn>
+              <a:cxn ang="0">
+                <a:pos x="connsiteX115" y="connsiteY115"/>
+              </a:cxn>
+              <a:cxn ang="0">
+                <a:pos x="connsiteX116" y="connsiteY116"/>
+              </a:cxn>
+              <a:cxn ang="0">
+                <a:pos x="connsiteX117" y="connsiteY117"/>
+              </a:cxn>
+              <a:cxn ang="0">
+                <a:pos x="connsiteX118" y="connsiteY118"/>
+              </a:cxn>
+              <a:cxn ang="0">
+                <a:pos x="connsiteX119" y="connsiteY119"/>
+              </a:cxn>
+              <a:cxn ang="0">
+                <a:pos x="connsiteX120" y="connsiteY120"/>
+              </a:cxn>
+              <a:cxn ang="0">
+                <a:pos x="connsiteX121" y="connsiteY121"/>
+              </a:cxn>
+              <a:cxn ang="0">
+                <a:pos x="connsiteX122" y="connsiteY122"/>
+              </a:cxn>
+              <a:cxn ang="0">
+                <a:pos x="connsiteX123" y="connsiteY123"/>
+              </a:cxn>
+              <a:cxn ang="0">
+                <a:pos x="connsiteX124" y="connsiteY124"/>
+              </a:cxn>
+              <a:cxn ang="0">
+                <a:pos x="connsiteX125" y="connsiteY125"/>
+              </a:cxn>
+              <a:cxn ang="0">
+                <a:pos x="connsiteX126" y="connsiteY126"/>
+              </a:cxn>
+              <a:cxn ang="0">
+                <a:pos x="connsiteX127" y="connsiteY127"/>
+              </a:cxn>
+              <a:cxn ang="0">
+                <a:pos x="connsiteX128" y="connsiteY128"/>
+              </a:cxn>
+              <a:cxn ang="0">
+                <a:pos x="connsiteX129" y="connsiteY129"/>
+              </a:cxn>
+            </a:cxnLst>
+            <a:rect l="l" t="t" r="r" b="b"/>
+            <a:pathLst>
+              <a:path w="4094440" h="4254500">
+                <a:moveTo>
+                  <a:pt x="1968500" y="139700"/>
+                </a:moveTo>
+                <a:lnTo>
+                  <a:pt x="1968500" y="139700"/>
+                </a:lnTo>
+                <a:lnTo>
+                  <a:pt x="1854200" y="152400"/>
+                </a:lnTo>
+                <a:cubicBezTo>
+                  <a:pt x="1797977" y="159428"/>
+                  <a:pt x="1765211" y="162587"/>
+                  <a:pt x="1714500" y="177800"/>
+                </a:cubicBezTo>
+                <a:cubicBezTo>
+                  <a:pt x="1688855" y="185493"/>
+                  <a:pt x="1663700" y="194733"/>
+                  <a:pt x="1638300" y="203200"/>
+                </a:cubicBezTo>
+                <a:cubicBezTo>
+                  <a:pt x="1625600" y="207433"/>
+                  <a:pt x="1611339" y="208474"/>
+                  <a:pt x="1600200" y="215900"/>
+                </a:cubicBezTo>
+                <a:cubicBezTo>
+                  <a:pt x="1491011" y="288693"/>
+                  <a:pt x="1629160" y="201420"/>
+                  <a:pt x="1524000" y="254000"/>
+                </a:cubicBezTo>
+                <a:cubicBezTo>
+                  <a:pt x="1440603" y="295698"/>
+                  <a:pt x="1540759" y="272035"/>
+                  <a:pt x="1409700" y="304800"/>
+                </a:cubicBezTo>
+                <a:cubicBezTo>
+                  <a:pt x="1291704" y="334299"/>
+                  <a:pt x="1438395" y="299061"/>
+                  <a:pt x="1282700" y="330200"/>
+                </a:cubicBezTo>
+                <a:cubicBezTo>
+                  <a:pt x="1168533" y="353033"/>
+                  <a:pt x="1301483" y="333419"/>
+                  <a:pt x="1168400" y="355600"/>
+                </a:cubicBezTo>
+                <a:cubicBezTo>
+                  <a:pt x="1138873" y="360521"/>
+                  <a:pt x="1109133" y="364067"/>
+                  <a:pt x="1079500" y="368300"/>
+                </a:cubicBezTo>
+                <a:cubicBezTo>
+                  <a:pt x="1041315" y="381028"/>
+                  <a:pt x="1036126" y="379045"/>
+                  <a:pt x="1003300" y="406400"/>
+                </a:cubicBezTo>
+                <a:cubicBezTo>
+                  <a:pt x="989502" y="417898"/>
+                  <a:pt x="978998" y="433002"/>
+                  <a:pt x="965200" y="444500"/>
+                </a:cubicBezTo>
+                <a:cubicBezTo>
+                  <a:pt x="910709" y="489909"/>
+                  <a:pt x="939595" y="447286"/>
+                  <a:pt x="889000" y="508000"/>
+                </a:cubicBezTo>
+                <a:cubicBezTo>
+                  <a:pt x="879229" y="519726"/>
+                  <a:pt x="873741" y="534692"/>
+                  <a:pt x="863600" y="546100"/>
+                </a:cubicBezTo>
+                <a:cubicBezTo>
+                  <a:pt x="839735" y="572948"/>
+                  <a:pt x="817288" y="602375"/>
+                  <a:pt x="787400" y="622300"/>
+                </a:cubicBezTo>
+                <a:lnTo>
+                  <a:pt x="711200" y="673100"/>
+                </a:lnTo>
+                <a:cubicBezTo>
+                  <a:pt x="702733" y="690033"/>
+                  <a:pt x="695540" y="707666"/>
+                  <a:pt x="685800" y="723900"/>
+                </a:cubicBezTo>
+                <a:cubicBezTo>
+                  <a:pt x="670094" y="750077"/>
+                  <a:pt x="644653" y="771140"/>
+                  <a:pt x="635000" y="800100"/>
+                </a:cubicBezTo>
+                <a:cubicBezTo>
+                  <a:pt x="616620" y="855239"/>
+                  <a:pt x="631766" y="828734"/>
+                  <a:pt x="584200" y="876300"/>
+                </a:cubicBezTo>
+                <a:cubicBezTo>
+                  <a:pt x="570966" y="916003"/>
+                  <a:pt x="558131" y="965646"/>
+                  <a:pt x="520700" y="990600"/>
+                </a:cubicBezTo>
+                <a:lnTo>
+                  <a:pt x="482600" y="1016000"/>
+                </a:lnTo>
+                <a:cubicBezTo>
+                  <a:pt x="474133" y="1041400"/>
+                  <a:pt x="472052" y="1069923"/>
+                  <a:pt x="457200" y="1092200"/>
+                </a:cubicBezTo>
+                <a:cubicBezTo>
+                  <a:pt x="448733" y="1104900"/>
+                  <a:pt x="438626" y="1116648"/>
+                  <a:pt x="431800" y="1130300"/>
+                </a:cubicBezTo>
+                <a:cubicBezTo>
+                  <a:pt x="425813" y="1142274"/>
+                  <a:pt x="425601" y="1156698"/>
+                  <a:pt x="419100" y="1168400"/>
+                </a:cubicBezTo>
+                <a:cubicBezTo>
+                  <a:pt x="404275" y="1195085"/>
+                  <a:pt x="385233" y="1219200"/>
+                  <a:pt x="368300" y="1244600"/>
+                </a:cubicBezTo>
+                <a:cubicBezTo>
+                  <a:pt x="359833" y="1257300"/>
+                  <a:pt x="347727" y="1268220"/>
+                  <a:pt x="342900" y="1282700"/>
+                </a:cubicBezTo>
+                <a:cubicBezTo>
+                  <a:pt x="312673" y="1373380"/>
+                  <a:pt x="332352" y="1336623"/>
+                  <a:pt x="292100" y="1397000"/>
+                </a:cubicBezTo>
+                <a:cubicBezTo>
+                  <a:pt x="285655" y="1422779"/>
+                  <a:pt x="277632" y="1460393"/>
+                  <a:pt x="266700" y="1485900"/>
+                </a:cubicBezTo>
+                <a:cubicBezTo>
+                  <a:pt x="247364" y="1531016"/>
+                  <a:pt x="241409" y="1536536"/>
+                  <a:pt x="215900" y="1574800"/>
+                </a:cubicBezTo>
+                <a:cubicBezTo>
+                  <a:pt x="196706" y="1651575"/>
+                  <a:pt x="208720" y="1609041"/>
+                  <a:pt x="177800" y="1701800"/>
+                </a:cubicBezTo>
+                <a:cubicBezTo>
+                  <a:pt x="173567" y="1714500"/>
+                  <a:pt x="167725" y="1726773"/>
+                  <a:pt x="165100" y="1739900"/>
+                </a:cubicBezTo>
+                <a:cubicBezTo>
+                  <a:pt x="160867" y="1761067"/>
+                  <a:pt x="159226" y="1782922"/>
+                  <a:pt x="152400" y="1803400"/>
+                </a:cubicBezTo>
+                <a:cubicBezTo>
+                  <a:pt x="146413" y="1821361"/>
+                  <a:pt x="133647" y="1836473"/>
+                  <a:pt x="127000" y="1854200"/>
+                </a:cubicBezTo>
+                <a:cubicBezTo>
+                  <a:pt x="120871" y="1870543"/>
+                  <a:pt x="119095" y="1888217"/>
+                  <a:pt x="114300" y="1905000"/>
+                </a:cubicBezTo>
+                <a:cubicBezTo>
+                  <a:pt x="93086" y="1979249"/>
+                  <a:pt x="108751" y="1904570"/>
+                  <a:pt x="88900" y="1993900"/>
+                </a:cubicBezTo>
+                <a:cubicBezTo>
+                  <a:pt x="84217" y="2014972"/>
+                  <a:pt x="81435" y="2036459"/>
+                  <a:pt x="76200" y="2057400"/>
+                </a:cubicBezTo>
+                <a:cubicBezTo>
+                  <a:pt x="57512" y="2132154"/>
+                  <a:pt x="53576" y="2073292"/>
+                  <a:pt x="38100" y="2197100"/>
+                </a:cubicBezTo>
+                <a:lnTo>
+                  <a:pt x="25400" y="2298700"/>
+                </a:lnTo>
+                <a:cubicBezTo>
+                  <a:pt x="21167" y="2374900"/>
+                  <a:pt x="17461" y="2451131"/>
+                  <a:pt x="12700" y="2527300"/>
+                </a:cubicBezTo>
+                <a:cubicBezTo>
+                  <a:pt x="8994" y="2586602"/>
+                  <a:pt x="0" y="2645682"/>
+                  <a:pt x="0" y="2705100"/>
+                </a:cubicBezTo>
+                <a:cubicBezTo>
+                  <a:pt x="0" y="2832171"/>
+                  <a:pt x="2699" y="2959424"/>
+                  <a:pt x="12700" y="3086100"/>
+                </a:cubicBezTo>
+                <a:cubicBezTo>
+                  <a:pt x="17639" y="3148663"/>
+                  <a:pt x="36152" y="3174533"/>
+                  <a:pt x="50800" y="3225800"/>
+                </a:cubicBezTo>
+                <a:cubicBezTo>
+                  <a:pt x="59674" y="3256860"/>
+                  <a:pt x="73810" y="3330165"/>
+                  <a:pt x="88900" y="3352800"/>
+                </a:cubicBezTo>
+                <a:lnTo>
+                  <a:pt x="114300" y="3390900"/>
+                </a:lnTo>
+                <a:cubicBezTo>
+                  <a:pt x="120745" y="3416679"/>
+                  <a:pt x="128768" y="3454293"/>
+                  <a:pt x="139700" y="3479800"/>
+                </a:cubicBezTo>
+                <a:cubicBezTo>
+                  <a:pt x="165100" y="3539067"/>
+                  <a:pt x="176046" y="3534532"/>
+                  <a:pt x="190500" y="3606800"/>
+                </a:cubicBezTo>
+                <a:cubicBezTo>
+                  <a:pt x="216320" y="3735902"/>
+                  <a:pt x="189865" y="3617278"/>
+                  <a:pt x="215900" y="3708400"/>
+                </a:cubicBezTo>
+                <a:cubicBezTo>
+                  <a:pt x="221325" y="3727389"/>
+                  <a:pt x="231150" y="3777000"/>
+                  <a:pt x="241300" y="3797300"/>
+                </a:cubicBezTo>
+                <a:cubicBezTo>
+                  <a:pt x="248126" y="3810952"/>
+                  <a:pt x="260501" y="3821452"/>
+                  <a:pt x="266700" y="3835400"/>
+                </a:cubicBezTo>
+                <a:cubicBezTo>
+                  <a:pt x="277574" y="3859866"/>
+                  <a:pt x="277248" y="3889323"/>
+                  <a:pt x="292100" y="3911600"/>
+                </a:cubicBezTo>
+                <a:cubicBezTo>
+                  <a:pt x="309033" y="3937000"/>
+                  <a:pt x="333247" y="3958840"/>
+                  <a:pt x="342900" y="3987800"/>
+                </a:cubicBezTo>
+                <a:cubicBezTo>
+                  <a:pt x="351266" y="4012899"/>
+                  <a:pt x="358619" y="4046095"/>
+                  <a:pt x="381000" y="4064000"/>
+                </a:cubicBezTo>
+                <a:cubicBezTo>
+                  <a:pt x="391453" y="4072363"/>
+                  <a:pt x="407126" y="4070713"/>
+                  <a:pt x="419100" y="4076700"/>
+                </a:cubicBezTo>
+                <a:cubicBezTo>
+                  <a:pt x="432752" y="4083526"/>
+                  <a:pt x="441973" y="4101050"/>
+                  <a:pt x="457200" y="4102100"/>
+                </a:cubicBezTo>
+                <a:cubicBezTo>
+                  <a:pt x="689635" y="4118130"/>
+                  <a:pt x="1155700" y="4127500"/>
+                  <a:pt x="1155700" y="4127500"/>
+                </a:cubicBezTo>
+                <a:lnTo>
+                  <a:pt x="1219200" y="4140200"/>
+                </a:lnTo>
+                <a:cubicBezTo>
+                  <a:pt x="1244535" y="4144806"/>
+                  <a:pt x="1270418" y="4146655"/>
+                  <a:pt x="1295400" y="4152900"/>
+                </a:cubicBezTo>
+                <a:cubicBezTo>
+                  <a:pt x="1506817" y="4205754"/>
+                  <a:pt x="1264739" y="4151146"/>
+                  <a:pt x="1422400" y="4203700"/>
+                </a:cubicBezTo>
+                <a:cubicBezTo>
+                  <a:pt x="1440150" y="4209617"/>
+                  <a:pt x="1549306" y="4226968"/>
+                  <a:pt x="1562100" y="4229100"/>
+                </a:cubicBezTo>
+                <a:cubicBezTo>
+                  <a:pt x="1853026" y="4221444"/>
+                  <a:pt x="2011108" y="4204129"/>
+                  <a:pt x="2273300" y="4229100"/>
+                </a:cubicBezTo>
+                <a:cubicBezTo>
+                  <a:pt x="2286627" y="4230369"/>
+                  <a:pt x="2298332" y="4238896"/>
+                  <a:pt x="2311400" y="4241800"/>
+                </a:cubicBezTo>
+                <a:cubicBezTo>
+                  <a:pt x="2336537" y="4247386"/>
+                  <a:pt x="2362200" y="4250267"/>
+                  <a:pt x="2387600" y="4254500"/>
+                </a:cubicBezTo>
+                <a:lnTo>
+                  <a:pt x="2971800" y="4241800"/>
+                </a:lnTo>
+                <a:cubicBezTo>
+                  <a:pt x="2989241" y="4241102"/>
+                  <a:pt x="3005171" y="4230042"/>
+                  <a:pt x="3022600" y="4229100"/>
+                </a:cubicBezTo>
+                <a:cubicBezTo>
+                  <a:pt x="3162160" y="4221556"/>
+                  <a:pt x="3302000" y="4220633"/>
+                  <a:pt x="3441700" y="4216400"/>
+                </a:cubicBezTo>
+                <a:cubicBezTo>
+                  <a:pt x="3471131" y="4194327"/>
+                  <a:pt x="3507857" y="4170524"/>
+                  <a:pt x="3530600" y="4140200"/>
+                </a:cubicBezTo>
+                <a:cubicBezTo>
+                  <a:pt x="3545411" y="4120453"/>
+                  <a:pt x="3555448" y="4097525"/>
+                  <a:pt x="3568700" y="4076700"/>
+                </a:cubicBezTo>
+                <a:cubicBezTo>
+                  <a:pt x="3585089" y="4050946"/>
+                  <a:pt x="3605848" y="4027804"/>
+                  <a:pt x="3619500" y="4000500"/>
+                </a:cubicBezTo>
+                <a:cubicBezTo>
+                  <a:pt x="3677126" y="3885248"/>
+                  <a:pt x="3649297" y="3930405"/>
+                  <a:pt x="3695700" y="3860800"/>
+                </a:cubicBezTo>
+                <a:cubicBezTo>
+                  <a:pt x="3699933" y="3843867"/>
+                  <a:pt x="3701524" y="3826043"/>
+                  <a:pt x="3708400" y="3810000"/>
+                </a:cubicBezTo>
+                <a:cubicBezTo>
+                  <a:pt x="3714413" y="3795971"/>
+                  <a:pt x="3728973" y="3786380"/>
+                  <a:pt x="3733800" y="3771900"/>
+                </a:cubicBezTo>
+                <a:cubicBezTo>
+                  <a:pt x="3741943" y="3747471"/>
+                  <a:pt x="3739101" y="3720364"/>
+                  <a:pt x="3746500" y="3695700"/>
+                </a:cubicBezTo>
+                <a:cubicBezTo>
+                  <a:pt x="3751940" y="3677566"/>
+                  <a:pt x="3764442" y="3662301"/>
+                  <a:pt x="3771900" y="3644900"/>
+                </a:cubicBezTo>
+                <a:cubicBezTo>
+                  <a:pt x="3777173" y="3632595"/>
+                  <a:pt x="3779327" y="3619105"/>
+                  <a:pt x="3784600" y="3606800"/>
+                </a:cubicBezTo>
+                <a:cubicBezTo>
+                  <a:pt x="3792058" y="3589399"/>
+                  <a:pt x="3802969" y="3573578"/>
+                  <a:pt x="3810000" y="3556000"/>
+                </a:cubicBezTo>
+                <a:cubicBezTo>
+                  <a:pt x="3819944" y="3531141"/>
+                  <a:pt x="3819336" y="3501219"/>
+                  <a:pt x="3835400" y="3479800"/>
+                </a:cubicBezTo>
+                <a:cubicBezTo>
+                  <a:pt x="3933502" y="3348998"/>
+                  <a:pt x="3815747" y="3515175"/>
+                  <a:pt x="3898900" y="3365500"/>
+                </a:cubicBezTo>
+                <a:cubicBezTo>
+                  <a:pt x="3909179" y="3346997"/>
+                  <a:pt x="3926110" y="3332850"/>
+                  <a:pt x="3937000" y="3314700"/>
+                </a:cubicBezTo>
+                <a:cubicBezTo>
+                  <a:pt x="3951611" y="3290349"/>
+                  <a:pt x="3962400" y="3263900"/>
+                  <a:pt x="3975100" y="3238500"/>
+                </a:cubicBezTo>
+                <a:cubicBezTo>
+                  <a:pt x="3999506" y="3116468"/>
+                  <a:pt x="3971136" y="3229360"/>
+                  <a:pt x="4013200" y="3124200"/>
+                </a:cubicBezTo>
+                <a:cubicBezTo>
+                  <a:pt x="4058540" y="3010850"/>
+                  <a:pt x="4015133" y="3083201"/>
+                  <a:pt x="4064000" y="3009900"/>
+                </a:cubicBezTo>
+                <a:cubicBezTo>
+                  <a:pt x="4114310" y="2808660"/>
+                  <a:pt x="4090134" y="2946057"/>
+                  <a:pt x="4076700" y="2603500"/>
+                </a:cubicBezTo>
+                <a:cubicBezTo>
+                  <a:pt x="4072218" y="2489209"/>
+                  <a:pt x="4075381" y="2374411"/>
+                  <a:pt x="4064000" y="2260600"/>
+                </a:cubicBezTo>
+                <a:cubicBezTo>
+                  <a:pt x="4062481" y="2245412"/>
+                  <a:pt x="4044799" y="2236448"/>
+                  <a:pt x="4038600" y="2222500"/>
+                </a:cubicBezTo>
+                <a:cubicBezTo>
+                  <a:pt x="4027726" y="2198034"/>
+                  <a:pt x="4020893" y="2171945"/>
+                  <a:pt x="4013200" y="2146300"/>
+                </a:cubicBezTo>
+                <a:cubicBezTo>
+                  <a:pt x="4008184" y="2129582"/>
+                  <a:pt x="4008306" y="2111112"/>
+                  <a:pt x="4000500" y="2095500"/>
+                </a:cubicBezTo>
+                <a:cubicBezTo>
+                  <a:pt x="3986848" y="2068196"/>
+                  <a:pt x="3959353" y="2048260"/>
+                  <a:pt x="3949700" y="2019300"/>
+                </a:cubicBezTo>
+                <a:cubicBezTo>
+                  <a:pt x="3941233" y="1993900"/>
+                  <a:pt x="3939152" y="1965377"/>
+                  <a:pt x="3924300" y="1943100"/>
+                </a:cubicBezTo>
+                <a:cubicBezTo>
+                  <a:pt x="3915833" y="1930400"/>
+                  <a:pt x="3905099" y="1918948"/>
+                  <a:pt x="3898900" y="1905000"/>
+                </a:cubicBezTo>
+                <a:cubicBezTo>
+                  <a:pt x="3888026" y="1880534"/>
+                  <a:pt x="3881967" y="1854200"/>
+                  <a:pt x="3873500" y="1828800"/>
+                </a:cubicBezTo>
+                <a:cubicBezTo>
+                  <a:pt x="3844673" y="1742320"/>
+                  <a:pt x="3880958" y="1848687"/>
+                  <a:pt x="3835400" y="1727200"/>
+                </a:cubicBezTo>
+                <a:cubicBezTo>
+                  <a:pt x="3830700" y="1714665"/>
+                  <a:pt x="3827400" y="1701635"/>
+                  <a:pt x="3822700" y="1689100"/>
+                </a:cubicBezTo>
+                <a:cubicBezTo>
+                  <a:pt x="3814695" y="1667754"/>
+                  <a:pt x="3805305" y="1646946"/>
+                  <a:pt x="3797300" y="1625600"/>
+                </a:cubicBezTo>
+                <a:cubicBezTo>
+                  <a:pt x="3792600" y="1613065"/>
+                  <a:pt x="3790587" y="1599474"/>
+                  <a:pt x="3784600" y="1587500"/>
+                </a:cubicBezTo>
+                <a:cubicBezTo>
+                  <a:pt x="3777774" y="1573848"/>
+                  <a:pt x="3767667" y="1562100"/>
+                  <a:pt x="3759200" y="1549400"/>
+                </a:cubicBezTo>
+                <a:cubicBezTo>
+                  <a:pt x="3731704" y="1439414"/>
+                  <a:pt x="3765375" y="1558486"/>
+                  <a:pt x="3721100" y="1447800"/>
+                </a:cubicBezTo>
+                <a:cubicBezTo>
+                  <a:pt x="3711156" y="1422941"/>
+                  <a:pt x="3704167" y="1397000"/>
+                  <a:pt x="3695700" y="1371600"/>
+                </a:cubicBezTo>
+                <a:cubicBezTo>
+                  <a:pt x="3691467" y="1358900"/>
+                  <a:pt x="3690426" y="1344639"/>
+                  <a:pt x="3683000" y="1333500"/>
+                </a:cubicBezTo>
+                <a:cubicBezTo>
+                  <a:pt x="3674533" y="1320800"/>
+                  <a:pt x="3664426" y="1309052"/>
+                  <a:pt x="3657600" y="1295400"/>
+                </a:cubicBezTo>
+                <a:cubicBezTo>
+                  <a:pt x="3647405" y="1275010"/>
+                  <a:pt x="3639409" y="1253527"/>
+                  <a:pt x="3632200" y="1231900"/>
+                </a:cubicBezTo>
+                <a:cubicBezTo>
+                  <a:pt x="3626680" y="1215341"/>
+                  <a:pt x="3626376" y="1197143"/>
+                  <a:pt x="3619500" y="1181100"/>
+                </a:cubicBezTo>
+                <a:cubicBezTo>
+                  <a:pt x="3613487" y="1167071"/>
+                  <a:pt x="3600299" y="1156948"/>
+                  <a:pt x="3594100" y="1143000"/>
+                </a:cubicBezTo>
+                <a:cubicBezTo>
+                  <a:pt x="3535748" y="1011708"/>
+                  <a:pt x="3605523" y="1115898"/>
+                  <a:pt x="3530600" y="1016000"/>
+                </a:cubicBezTo>
+                <a:cubicBezTo>
+                  <a:pt x="3522133" y="977900"/>
+                  <a:pt x="3513976" y="939730"/>
+                  <a:pt x="3505200" y="901700"/>
+                </a:cubicBezTo>
+                <a:cubicBezTo>
+                  <a:pt x="3501275" y="884693"/>
+                  <a:pt x="3499376" y="866943"/>
+                  <a:pt x="3492500" y="850900"/>
+                </a:cubicBezTo>
+                <a:cubicBezTo>
+                  <a:pt x="3486487" y="836871"/>
+                  <a:pt x="3475567" y="825500"/>
+                  <a:pt x="3467100" y="812800"/>
+                </a:cubicBezTo>
+                <a:cubicBezTo>
+                  <a:pt x="3440669" y="707074"/>
+                  <a:pt x="3472853" y="811605"/>
+                  <a:pt x="3429000" y="723900"/>
+                </a:cubicBezTo>
+                <a:cubicBezTo>
+                  <a:pt x="3423013" y="711926"/>
+                  <a:pt x="3422287" y="697774"/>
+                  <a:pt x="3416300" y="685800"/>
+                </a:cubicBezTo>
+                <a:cubicBezTo>
+                  <a:pt x="3404951" y="663103"/>
+                  <a:pt x="3348778" y="592211"/>
+                  <a:pt x="3340100" y="584200"/>
+                </a:cubicBezTo>
+                <a:cubicBezTo>
+                  <a:pt x="3304633" y="551461"/>
+                  <a:pt x="3259930" y="529430"/>
+                  <a:pt x="3225800" y="495300"/>
+                </a:cubicBezTo>
+                <a:cubicBezTo>
+                  <a:pt x="3204633" y="474133"/>
+                  <a:pt x="3185929" y="450178"/>
+                  <a:pt x="3162300" y="431800"/>
+                </a:cubicBezTo>
+                <a:cubicBezTo>
+                  <a:pt x="3147356" y="420177"/>
+                  <a:pt x="3126646" y="417759"/>
+                  <a:pt x="3111500" y="406400"/>
+                </a:cubicBezTo>
+                <a:cubicBezTo>
+                  <a:pt x="3092342" y="392032"/>
+                  <a:pt x="3078722" y="371369"/>
+                  <a:pt x="3060700" y="355600"/>
+                </a:cubicBezTo>
+                <a:cubicBezTo>
+                  <a:pt x="3010076" y="311304"/>
+                  <a:pt x="3004815" y="318344"/>
+                  <a:pt x="2946400" y="279400"/>
+                </a:cubicBezTo>
+                <a:cubicBezTo>
+                  <a:pt x="2937018" y="273146"/>
+                  <a:pt x="2874539" y="223473"/>
+                  <a:pt x="2857500" y="215900"/>
+                </a:cubicBezTo>
+                <a:cubicBezTo>
+                  <a:pt x="2833034" y="205026"/>
+                  <a:pt x="2803577" y="205352"/>
+                  <a:pt x="2781300" y="190500"/>
+                </a:cubicBezTo>
+                <a:cubicBezTo>
+                  <a:pt x="2768600" y="182033"/>
+                  <a:pt x="2754926" y="174871"/>
+                  <a:pt x="2743200" y="165100"/>
+                </a:cubicBezTo>
+                <a:cubicBezTo>
+                  <a:pt x="2729402" y="153602"/>
+                  <a:pt x="2720044" y="136963"/>
+                  <a:pt x="2705100" y="127000"/>
+                </a:cubicBezTo>
+                <a:cubicBezTo>
+                  <a:pt x="2693961" y="119574"/>
+                  <a:pt x="2678974" y="120287"/>
+                  <a:pt x="2667000" y="114300"/>
+                </a:cubicBezTo>
+                <a:cubicBezTo>
+                  <a:pt x="2583898" y="72749"/>
+                  <a:pt x="2675062" y="106975"/>
+                  <a:pt x="2590800" y="50800"/>
+                </a:cubicBezTo>
+                <a:cubicBezTo>
+                  <a:pt x="2579661" y="43374"/>
+                  <a:pt x="2564674" y="44087"/>
+                  <a:pt x="2552700" y="38100"/>
+                </a:cubicBezTo>
+                <a:cubicBezTo>
+                  <a:pt x="2464995" y="-5753"/>
+                  <a:pt x="2569526" y="26431"/>
+                  <a:pt x="2463800" y="0"/>
+                </a:cubicBezTo>
+                <a:cubicBezTo>
+                  <a:pt x="2427377" y="3642"/>
+                  <a:pt x="2344469" y="2515"/>
+                  <a:pt x="2298700" y="25400"/>
+                </a:cubicBezTo>
+                <a:cubicBezTo>
+                  <a:pt x="2285048" y="32226"/>
+                  <a:pt x="2274252" y="43974"/>
+                  <a:pt x="2260600" y="50800"/>
+                </a:cubicBezTo>
+                <a:cubicBezTo>
+                  <a:pt x="2248626" y="56787"/>
+                  <a:pt x="2234474" y="57513"/>
+                  <a:pt x="2222500" y="63500"/>
+                </a:cubicBezTo>
+                <a:cubicBezTo>
+                  <a:pt x="2208848" y="70326"/>
+                  <a:pt x="2198052" y="82074"/>
+                  <a:pt x="2184400" y="88900"/>
+                </a:cubicBezTo>
+                <a:cubicBezTo>
+                  <a:pt x="2172426" y="94887"/>
+                  <a:pt x="2158274" y="95613"/>
+                  <a:pt x="2146300" y="101600"/>
+                </a:cubicBezTo>
+                <a:cubicBezTo>
+                  <a:pt x="2132648" y="108426"/>
+                  <a:pt x="2122148" y="120801"/>
+                  <a:pt x="2108200" y="127000"/>
+                </a:cubicBezTo>
+                <a:cubicBezTo>
+                  <a:pt x="2042014" y="156416"/>
+                  <a:pt x="2048309" y="152400"/>
+                  <a:pt x="1968500" y="139700"/>
+                </a:cubicBezTo>
+                <a:close/>
+              </a:path>
+            </a:pathLst>
+          </a:custGeom>
+          <a:solidFill>
+            <a:schemeClr val="accent1">
+              <a:alpha val="70000"/>
+            </a:schemeClr>
+          </a:solidFill>
+        </p:spPr>
+        <p:style>
+          <a:lnRef idx="2">
+            <a:schemeClr val="accent1">
+              <a:shade val="50000"/>
+            </a:schemeClr>
+          </a:lnRef>
+          <a:fillRef idx="1">
+            <a:schemeClr val="accent1"/>
+          </a:fillRef>
+          <a:effectRef idx="0">
+            <a:schemeClr val="accent1"/>
+          </a:effectRef>
+          <a:fontRef idx="minor">
+            <a:schemeClr val="lt1"/>
+          </a:fontRef>
+        </p:style>
+        <p:txBody>
+          <a:bodyPr rtlCol="0" anchor="ctr"/>
+          <a:lstStyle/>
+          <a:p>
+            <a:pPr algn="ctr"/>
+            <a:endParaRPr lang="en-SG"/>
+          </a:p>
+        </p:txBody>
+      </p:sp>
+    </p:spTree>
+    <p:extLst>
+      <p:ext uri="{BB962C8B-B14F-4D97-AF65-F5344CB8AC3E}">
+        <p14:creationId xmlns:p14="http://schemas.microsoft.com/office/powerpoint/2010/main" val="2218722897"/>
+      </p:ext>
+    </p:extLst>
+  </p:cSld>
+  <p:clrMapOvr>
+    <a:masterClrMapping/>
+  </p:clrMapOvr>
+</p:sld>
+</file>
+
+<file path=ppt/slides/slide11.xml><?xml version="1.0" encoding="utf-8"?>
+<p:sld xmlns:a="http://schemas.openxmlformats.org/drawingml/2006/main" xmlns:r="http://schemas.openxmlformats.org/officeDocument/2006/relationships" xmlns:p="http://schemas.openxmlformats.org/presentationml/2006/main">
+  <p:cSld>
+    <p:spTree>
+      <p:nvGrpSpPr>
+        <p:cNvPr id="1" name=""/>
+        <p:cNvGrpSpPr/>
+        <p:nvPr/>
+      </p:nvGrpSpPr>
+      <p:grpSpPr>
+        <a:xfrm>
+          <a:off x="0" y="0"/>
+          <a:ext cx="0" cy="0"/>
+          <a:chOff x="0" y="0"/>
+          <a:chExt cx="0" cy="0"/>
+        </a:xfrm>
+      </p:grpSpPr>
+      <p:sp>
+        <p:nvSpPr>
+          <p:cNvPr id="5" name="text 3"/>
+          <p:cNvSpPr txBox="1"/>
+          <p:nvPr/>
+        </p:nvSpPr>
+        <p:spPr>
+          <a:xfrm>
+            <a:off x="3365631" y="6019800"/>
+            <a:ext cx="2693814" cy="523220"/>
+          </a:xfrm>
+          <a:prstGeom prst="rect">
+            <a:avLst/>
+          </a:prstGeom>
+          <a:noFill/>
+        </p:spPr>
+        <p:txBody>
+          <a:bodyPr wrap="none" rtlCol="0">
+            <a:spAutoFit/>
+          </a:bodyPr>
+          <a:lstStyle/>
+          <a:p>
+            <a:r>
+              <a:rPr lang="en-US" sz="2800" b="1" dirty="0" smtClean="0">
+                <a:solidFill>
+                  <a:schemeClr val="accent1"/>
+                </a:solidFill>
+              </a:rPr>
+              <a:t>Expected Output</a:t>
+            </a:r>
+            <a:endParaRPr lang="en-SG" sz="2800" b="1" dirty="0">
+              <a:solidFill>
+                <a:schemeClr val="accent1"/>
+              </a:solidFill>
+            </a:endParaRPr>
+          </a:p>
+        </p:txBody>
+      </p:sp>
+      <p:pic>
+        <p:nvPicPr>
+          <p:cNvPr id="4" name="pic"/>
+          <p:cNvPicPr>
+            <a:picLocks noGrp="1" noChangeAspect="1"/>
+          </p:cNvPicPr>
+          <p:nvPr>
+            <p:ph idx="1"/>
+          </p:nvPr>
+        </p:nvPicPr>
+        <p:blipFill>
+          <a:blip r:embed="rId2">
+            <a:extLst>
+              <a:ext uri="{28A0092B-C50C-407E-A947-70E740481C1C}">
+                <a14:useLocalDpi xmlns:a14="http://schemas.microsoft.com/office/drawing/2010/main" val="0"/>
+              </a:ext>
+            </a:extLst>
+          </a:blip>
+          <a:stretch>
+            <a:fillRect/>
+          </a:stretch>
+        </p:blipFill>
+        <p:spPr>
+          <a:xfrm>
+            <a:off x="2514600" y="1219200"/>
+            <a:ext cx="4395876" cy="4351338"/>
+          </a:xfrm>
+        </p:spPr>
+      </p:pic>
+      <p:sp>
+        <p:nvSpPr>
+          <p:cNvPr id="7" name="selectMe639536c9-cfd6-46e0-87f5-7e22fb457cef"/>
+          <p:cNvSpPr/>
+          <p:nvPr/>
+        </p:nvSpPr>
+        <p:spPr>
+          <a:xfrm rot="705292">
+            <a:off x="2667000" y="1371600"/>
+            <a:ext cx="4094440" cy="4254500"/>
+          </a:xfrm>
+          <a:custGeom>
+            <a:avLst/>
+            <a:gdLst>
+              <a:gd name="connsiteX0" fmla="*/ 1968500 w 4094440"/>
+              <a:gd name="connsiteY0" fmla="*/ 139700 h 4254500"/>
+              <a:gd name="connsiteX1" fmla="*/ 1968500 w 4094440"/>
+              <a:gd name="connsiteY1" fmla="*/ 139700 h 4254500"/>
+              <a:gd name="connsiteX2" fmla="*/ 1854200 w 4094440"/>
+              <a:gd name="connsiteY2" fmla="*/ 152400 h 4254500"/>
+              <a:gd name="connsiteX3" fmla="*/ 1714500 w 4094440"/>
+              <a:gd name="connsiteY3" fmla="*/ 177800 h 4254500"/>
+              <a:gd name="connsiteX4" fmla="*/ 1638300 w 4094440"/>
+              <a:gd name="connsiteY4" fmla="*/ 203200 h 4254500"/>
+              <a:gd name="connsiteX5" fmla="*/ 1600200 w 4094440"/>
+              <a:gd name="connsiteY5" fmla="*/ 215900 h 4254500"/>
+              <a:gd name="connsiteX6" fmla="*/ 1524000 w 4094440"/>
+              <a:gd name="connsiteY6" fmla="*/ 254000 h 4254500"/>
+              <a:gd name="connsiteX7" fmla="*/ 1409700 w 4094440"/>
+              <a:gd name="connsiteY7" fmla="*/ 304800 h 4254500"/>
+              <a:gd name="connsiteX8" fmla="*/ 1282700 w 4094440"/>
+              <a:gd name="connsiteY8" fmla="*/ 330200 h 4254500"/>
+              <a:gd name="connsiteX9" fmla="*/ 1168400 w 4094440"/>
+              <a:gd name="connsiteY9" fmla="*/ 355600 h 4254500"/>
+              <a:gd name="connsiteX10" fmla="*/ 1079500 w 4094440"/>
+              <a:gd name="connsiteY10" fmla="*/ 368300 h 4254500"/>
+              <a:gd name="connsiteX11" fmla="*/ 1003300 w 4094440"/>
+              <a:gd name="connsiteY11" fmla="*/ 406400 h 4254500"/>
+              <a:gd name="connsiteX12" fmla="*/ 965200 w 4094440"/>
+              <a:gd name="connsiteY12" fmla="*/ 444500 h 4254500"/>
+              <a:gd name="connsiteX13" fmla="*/ 889000 w 4094440"/>
+              <a:gd name="connsiteY13" fmla="*/ 508000 h 4254500"/>
+              <a:gd name="connsiteX14" fmla="*/ 863600 w 4094440"/>
+              <a:gd name="connsiteY14" fmla="*/ 546100 h 4254500"/>
+              <a:gd name="connsiteX15" fmla="*/ 787400 w 4094440"/>
+              <a:gd name="connsiteY15" fmla="*/ 622300 h 4254500"/>
+              <a:gd name="connsiteX16" fmla="*/ 711200 w 4094440"/>
+              <a:gd name="connsiteY16" fmla="*/ 673100 h 4254500"/>
+              <a:gd name="connsiteX17" fmla="*/ 685800 w 4094440"/>
+              <a:gd name="connsiteY17" fmla="*/ 723900 h 4254500"/>
+              <a:gd name="connsiteX18" fmla="*/ 635000 w 4094440"/>
+              <a:gd name="connsiteY18" fmla="*/ 800100 h 4254500"/>
+              <a:gd name="connsiteX19" fmla="*/ 584200 w 4094440"/>
+              <a:gd name="connsiteY19" fmla="*/ 876300 h 4254500"/>
+              <a:gd name="connsiteX20" fmla="*/ 520700 w 4094440"/>
+              <a:gd name="connsiteY20" fmla="*/ 990600 h 4254500"/>
+              <a:gd name="connsiteX21" fmla="*/ 482600 w 4094440"/>
+              <a:gd name="connsiteY21" fmla="*/ 1016000 h 4254500"/>
+              <a:gd name="connsiteX22" fmla="*/ 457200 w 4094440"/>
+              <a:gd name="connsiteY22" fmla="*/ 1092200 h 4254500"/>
+              <a:gd name="connsiteX23" fmla="*/ 431800 w 4094440"/>
+              <a:gd name="connsiteY23" fmla="*/ 1130300 h 4254500"/>
+              <a:gd name="connsiteX24" fmla="*/ 419100 w 4094440"/>
+              <a:gd name="connsiteY24" fmla="*/ 1168400 h 4254500"/>
+              <a:gd name="connsiteX25" fmla="*/ 368300 w 4094440"/>
+              <a:gd name="connsiteY25" fmla="*/ 1244600 h 4254500"/>
+              <a:gd name="connsiteX26" fmla="*/ 342900 w 4094440"/>
+              <a:gd name="connsiteY26" fmla="*/ 1282700 h 4254500"/>
+              <a:gd name="connsiteX27" fmla="*/ 292100 w 4094440"/>
+              <a:gd name="connsiteY27" fmla="*/ 1397000 h 4254500"/>
+              <a:gd name="connsiteX28" fmla="*/ 266700 w 4094440"/>
+              <a:gd name="connsiteY28" fmla="*/ 1485900 h 4254500"/>
+              <a:gd name="connsiteX29" fmla="*/ 215900 w 4094440"/>
+              <a:gd name="connsiteY29" fmla="*/ 1574800 h 4254500"/>
+              <a:gd name="connsiteX30" fmla="*/ 177800 w 4094440"/>
+              <a:gd name="connsiteY30" fmla="*/ 1701800 h 4254500"/>
+              <a:gd name="connsiteX31" fmla="*/ 165100 w 4094440"/>
+              <a:gd name="connsiteY31" fmla="*/ 1739900 h 4254500"/>
+              <a:gd name="connsiteX32" fmla="*/ 152400 w 4094440"/>
+              <a:gd name="connsiteY32" fmla="*/ 1803400 h 4254500"/>
+              <a:gd name="connsiteX33" fmla="*/ 127000 w 4094440"/>
+              <a:gd name="connsiteY33" fmla="*/ 1854200 h 4254500"/>
+              <a:gd name="connsiteX34" fmla="*/ 114300 w 4094440"/>
+              <a:gd name="connsiteY34" fmla="*/ 1905000 h 4254500"/>
+              <a:gd name="connsiteX35" fmla="*/ 88900 w 4094440"/>
+              <a:gd name="connsiteY35" fmla="*/ 1993900 h 4254500"/>
+              <a:gd name="connsiteX36" fmla="*/ 76200 w 4094440"/>
+              <a:gd name="connsiteY36" fmla="*/ 2057400 h 4254500"/>
+              <a:gd name="connsiteX37" fmla="*/ 38100 w 4094440"/>
+              <a:gd name="connsiteY37" fmla="*/ 2197100 h 4254500"/>
+              <a:gd name="connsiteX38" fmla="*/ 25400 w 4094440"/>
+              <a:gd name="connsiteY38" fmla="*/ 2298700 h 4254500"/>
+              <a:gd name="connsiteX39" fmla="*/ 12700 w 4094440"/>
+              <a:gd name="connsiteY39" fmla="*/ 2527300 h 4254500"/>
+              <a:gd name="connsiteX40" fmla="*/ 0 w 4094440"/>
+              <a:gd name="connsiteY40" fmla="*/ 2705100 h 4254500"/>
+              <a:gd name="connsiteX41" fmla="*/ 12700 w 4094440"/>
+              <a:gd name="connsiteY41" fmla="*/ 3086100 h 4254500"/>
+              <a:gd name="connsiteX42" fmla="*/ 50800 w 4094440"/>
+              <a:gd name="connsiteY42" fmla="*/ 3225800 h 4254500"/>
+              <a:gd name="connsiteX43" fmla="*/ 88900 w 4094440"/>
+              <a:gd name="connsiteY43" fmla="*/ 3352800 h 4254500"/>
+              <a:gd name="connsiteX44" fmla="*/ 114300 w 4094440"/>
+              <a:gd name="connsiteY44" fmla="*/ 3390900 h 4254500"/>
+              <a:gd name="connsiteX45" fmla="*/ 139700 w 4094440"/>
+              <a:gd name="connsiteY45" fmla="*/ 3479800 h 4254500"/>
+              <a:gd name="connsiteX46" fmla="*/ 190500 w 4094440"/>
+              <a:gd name="connsiteY46" fmla="*/ 3606800 h 4254500"/>
+              <a:gd name="connsiteX47" fmla="*/ 215900 w 4094440"/>
+              <a:gd name="connsiteY47" fmla="*/ 3708400 h 4254500"/>
+              <a:gd name="connsiteX48" fmla="*/ 241300 w 4094440"/>
+              <a:gd name="connsiteY48" fmla="*/ 3797300 h 4254500"/>
+              <a:gd name="connsiteX49" fmla="*/ 266700 w 4094440"/>
+              <a:gd name="connsiteY49" fmla="*/ 3835400 h 4254500"/>
+              <a:gd name="connsiteX50" fmla="*/ 292100 w 4094440"/>
+              <a:gd name="connsiteY50" fmla="*/ 3911600 h 4254500"/>
+              <a:gd name="connsiteX51" fmla="*/ 342900 w 4094440"/>
+              <a:gd name="connsiteY51" fmla="*/ 3987800 h 4254500"/>
+              <a:gd name="connsiteX52" fmla="*/ 381000 w 4094440"/>
+              <a:gd name="connsiteY52" fmla="*/ 4064000 h 4254500"/>
+              <a:gd name="connsiteX53" fmla="*/ 419100 w 4094440"/>
+              <a:gd name="connsiteY53" fmla="*/ 4076700 h 4254500"/>
+              <a:gd name="connsiteX54" fmla="*/ 457200 w 4094440"/>
+              <a:gd name="connsiteY54" fmla="*/ 4102100 h 4254500"/>
+              <a:gd name="connsiteX55" fmla="*/ 1155700 w 4094440"/>
+              <a:gd name="connsiteY55" fmla="*/ 4127500 h 4254500"/>
+              <a:gd name="connsiteX56" fmla="*/ 1219200 w 4094440"/>
+              <a:gd name="connsiteY56" fmla="*/ 4140200 h 4254500"/>
+              <a:gd name="connsiteX57" fmla="*/ 1295400 w 4094440"/>
+              <a:gd name="connsiteY57" fmla="*/ 4152900 h 4254500"/>
+              <a:gd name="connsiteX58" fmla="*/ 1422400 w 4094440"/>
+              <a:gd name="connsiteY58" fmla="*/ 4203700 h 4254500"/>
+              <a:gd name="connsiteX59" fmla="*/ 1562100 w 4094440"/>
+              <a:gd name="connsiteY59" fmla="*/ 4229100 h 4254500"/>
+              <a:gd name="connsiteX60" fmla="*/ 2273300 w 4094440"/>
+              <a:gd name="connsiteY60" fmla="*/ 4229100 h 4254500"/>
+              <a:gd name="connsiteX61" fmla="*/ 2311400 w 4094440"/>
+              <a:gd name="connsiteY61" fmla="*/ 4241800 h 4254500"/>
+              <a:gd name="connsiteX62" fmla="*/ 2387600 w 4094440"/>
+              <a:gd name="connsiteY62" fmla="*/ 4254500 h 4254500"/>
+              <a:gd name="connsiteX63" fmla="*/ 2971800 w 4094440"/>
+              <a:gd name="connsiteY63" fmla="*/ 4241800 h 4254500"/>
+              <a:gd name="connsiteX64" fmla="*/ 3022600 w 4094440"/>
+              <a:gd name="connsiteY64" fmla="*/ 4229100 h 4254500"/>
+              <a:gd name="connsiteX65" fmla="*/ 3441700 w 4094440"/>
+              <a:gd name="connsiteY65" fmla="*/ 4216400 h 4254500"/>
+              <a:gd name="connsiteX66" fmla="*/ 3530600 w 4094440"/>
+              <a:gd name="connsiteY66" fmla="*/ 4140200 h 4254500"/>
+              <a:gd name="connsiteX67" fmla="*/ 3568700 w 4094440"/>
+              <a:gd name="connsiteY67" fmla="*/ 4076700 h 4254500"/>
+              <a:gd name="connsiteX68" fmla="*/ 3619500 w 4094440"/>
+              <a:gd name="connsiteY68" fmla="*/ 4000500 h 4254500"/>
+              <a:gd name="connsiteX69" fmla="*/ 3695700 w 4094440"/>
+              <a:gd name="connsiteY69" fmla="*/ 3860800 h 4254500"/>
+              <a:gd name="connsiteX70" fmla="*/ 3708400 w 4094440"/>
+              <a:gd name="connsiteY70" fmla="*/ 3810000 h 4254500"/>
+              <a:gd name="connsiteX71" fmla="*/ 3733800 w 4094440"/>
+              <a:gd name="connsiteY71" fmla="*/ 3771900 h 4254500"/>
+              <a:gd name="connsiteX72" fmla="*/ 3746500 w 4094440"/>
+              <a:gd name="connsiteY72" fmla="*/ 3695700 h 4254500"/>
+              <a:gd name="connsiteX73" fmla="*/ 3771900 w 4094440"/>
+              <a:gd name="connsiteY73" fmla="*/ 3644900 h 4254500"/>
+              <a:gd name="connsiteX74" fmla="*/ 3784600 w 4094440"/>
+              <a:gd name="connsiteY74" fmla="*/ 3606800 h 4254500"/>
+              <a:gd name="connsiteX75" fmla="*/ 3810000 w 4094440"/>
+              <a:gd name="connsiteY75" fmla="*/ 3556000 h 4254500"/>
+              <a:gd name="connsiteX76" fmla="*/ 3835400 w 4094440"/>
+              <a:gd name="connsiteY76" fmla="*/ 3479800 h 4254500"/>
+              <a:gd name="connsiteX77" fmla="*/ 3898900 w 4094440"/>
+              <a:gd name="connsiteY77" fmla="*/ 3365500 h 4254500"/>
+              <a:gd name="connsiteX78" fmla="*/ 3937000 w 4094440"/>
+              <a:gd name="connsiteY78" fmla="*/ 3314700 h 4254500"/>
+              <a:gd name="connsiteX79" fmla="*/ 3975100 w 4094440"/>
+              <a:gd name="connsiteY79" fmla="*/ 3238500 h 4254500"/>
+              <a:gd name="connsiteX80" fmla="*/ 4013200 w 4094440"/>
+              <a:gd name="connsiteY80" fmla="*/ 3124200 h 4254500"/>
+              <a:gd name="connsiteX81" fmla="*/ 4064000 w 4094440"/>
+              <a:gd name="connsiteY81" fmla="*/ 3009900 h 4254500"/>
+              <a:gd name="connsiteX82" fmla="*/ 4076700 w 4094440"/>
+              <a:gd name="connsiteY82" fmla="*/ 2603500 h 4254500"/>
+              <a:gd name="connsiteX83" fmla="*/ 4064000 w 4094440"/>
+              <a:gd name="connsiteY83" fmla="*/ 2260600 h 4254500"/>
+              <a:gd name="connsiteX84" fmla="*/ 4038600 w 4094440"/>
+              <a:gd name="connsiteY84" fmla="*/ 2222500 h 4254500"/>
+              <a:gd name="connsiteX85" fmla="*/ 4013200 w 4094440"/>
+              <a:gd name="connsiteY85" fmla="*/ 2146300 h 4254500"/>
+              <a:gd name="connsiteX86" fmla="*/ 4000500 w 4094440"/>
+              <a:gd name="connsiteY86" fmla="*/ 2095500 h 4254500"/>
+              <a:gd name="connsiteX87" fmla="*/ 3949700 w 4094440"/>
+              <a:gd name="connsiteY87" fmla="*/ 2019300 h 4254500"/>
+              <a:gd name="connsiteX88" fmla="*/ 3924300 w 4094440"/>
+              <a:gd name="connsiteY88" fmla="*/ 1943100 h 4254500"/>
+              <a:gd name="connsiteX89" fmla="*/ 3898900 w 4094440"/>
+              <a:gd name="connsiteY89" fmla="*/ 1905000 h 4254500"/>
+              <a:gd name="connsiteX90" fmla="*/ 3873500 w 4094440"/>
+              <a:gd name="connsiteY90" fmla="*/ 1828800 h 4254500"/>
+              <a:gd name="connsiteX91" fmla="*/ 3835400 w 4094440"/>
+              <a:gd name="connsiteY91" fmla="*/ 1727200 h 4254500"/>
+              <a:gd name="connsiteX92" fmla="*/ 3822700 w 4094440"/>
+              <a:gd name="connsiteY92" fmla="*/ 1689100 h 4254500"/>
+              <a:gd name="connsiteX93" fmla="*/ 3797300 w 4094440"/>
+              <a:gd name="connsiteY93" fmla="*/ 1625600 h 4254500"/>
+              <a:gd name="connsiteX94" fmla="*/ 3784600 w 4094440"/>
+              <a:gd name="connsiteY94" fmla="*/ 1587500 h 4254500"/>
+              <a:gd name="connsiteX95" fmla="*/ 3759200 w 4094440"/>
+              <a:gd name="connsiteY95" fmla="*/ 1549400 h 4254500"/>
+              <a:gd name="connsiteX96" fmla="*/ 3721100 w 4094440"/>
+              <a:gd name="connsiteY96" fmla="*/ 1447800 h 4254500"/>
+              <a:gd name="connsiteX97" fmla="*/ 3695700 w 4094440"/>
+              <a:gd name="connsiteY97" fmla="*/ 1371600 h 4254500"/>
+              <a:gd name="connsiteX98" fmla="*/ 3683000 w 4094440"/>
+              <a:gd name="connsiteY98" fmla="*/ 1333500 h 4254500"/>
+              <a:gd name="connsiteX99" fmla="*/ 3657600 w 4094440"/>
+              <a:gd name="connsiteY99" fmla="*/ 1295400 h 4254500"/>
+              <a:gd name="connsiteX100" fmla="*/ 3632200 w 4094440"/>
+              <a:gd name="connsiteY100" fmla="*/ 1231900 h 4254500"/>
+              <a:gd name="connsiteX101" fmla="*/ 3619500 w 4094440"/>
+              <a:gd name="connsiteY101" fmla="*/ 1181100 h 4254500"/>
+              <a:gd name="connsiteX102" fmla="*/ 3594100 w 4094440"/>
+              <a:gd name="connsiteY102" fmla="*/ 1143000 h 4254500"/>
+              <a:gd name="connsiteX103" fmla="*/ 3530600 w 4094440"/>
+              <a:gd name="connsiteY103" fmla="*/ 1016000 h 4254500"/>
+              <a:gd name="connsiteX104" fmla="*/ 3505200 w 4094440"/>
+              <a:gd name="connsiteY104" fmla="*/ 901700 h 4254500"/>
+              <a:gd name="connsiteX105" fmla="*/ 3492500 w 4094440"/>
+              <a:gd name="connsiteY105" fmla="*/ 850900 h 4254500"/>
+              <a:gd name="connsiteX106" fmla="*/ 3467100 w 4094440"/>
+              <a:gd name="connsiteY106" fmla="*/ 812800 h 4254500"/>
+              <a:gd name="connsiteX107" fmla="*/ 3429000 w 4094440"/>
+              <a:gd name="connsiteY107" fmla="*/ 723900 h 4254500"/>
+              <a:gd name="connsiteX108" fmla="*/ 3416300 w 4094440"/>
+              <a:gd name="connsiteY108" fmla="*/ 685800 h 4254500"/>
+              <a:gd name="connsiteX109" fmla="*/ 3340100 w 4094440"/>
+              <a:gd name="connsiteY109" fmla="*/ 584200 h 4254500"/>
+              <a:gd name="connsiteX110" fmla="*/ 3225800 w 4094440"/>
+              <a:gd name="connsiteY110" fmla="*/ 495300 h 4254500"/>
+              <a:gd name="connsiteX111" fmla="*/ 3162300 w 4094440"/>
+              <a:gd name="connsiteY111" fmla="*/ 431800 h 4254500"/>
+              <a:gd name="connsiteX112" fmla="*/ 3111500 w 4094440"/>
+              <a:gd name="connsiteY112" fmla="*/ 406400 h 4254500"/>
+              <a:gd name="connsiteX113" fmla="*/ 3060700 w 4094440"/>
+              <a:gd name="connsiteY113" fmla="*/ 355600 h 4254500"/>
+              <a:gd name="connsiteX114" fmla="*/ 2946400 w 4094440"/>
+              <a:gd name="connsiteY114" fmla="*/ 279400 h 4254500"/>
+              <a:gd name="connsiteX115" fmla="*/ 2857500 w 4094440"/>
+              <a:gd name="connsiteY115" fmla="*/ 215900 h 4254500"/>
+              <a:gd name="connsiteX116" fmla="*/ 2781300 w 4094440"/>
+              <a:gd name="connsiteY116" fmla="*/ 190500 h 4254500"/>
+              <a:gd name="connsiteX117" fmla="*/ 2743200 w 4094440"/>
+              <a:gd name="connsiteY117" fmla="*/ 165100 h 4254500"/>
+              <a:gd name="connsiteX118" fmla="*/ 2705100 w 4094440"/>
+              <a:gd name="connsiteY118" fmla="*/ 127000 h 4254500"/>
+              <a:gd name="connsiteX119" fmla="*/ 2667000 w 4094440"/>
+              <a:gd name="connsiteY119" fmla="*/ 114300 h 4254500"/>
+              <a:gd name="connsiteX120" fmla="*/ 2590800 w 4094440"/>
+              <a:gd name="connsiteY120" fmla="*/ 50800 h 4254500"/>
+              <a:gd name="connsiteX121" fmla="*/ 2552700 w 4094440"/>
+              <a:gd name="connsiteY121" fmla="*/ 38100 h 4254500"/>
+              <a:gd name="connsiteX122" fmla="*/ 2463800 w 4094440"/>
+              <a:gd name="connsiteY122" fmla="*/ 0 h 4254500"/>
+              <a:gd name="connsiteX123" fmla="*/ 2298700 w 4094440"/>
+              <a:gd name="connsiteY123" fmla="*/ 25400 h 4254500"/>
+              <a:gd name="connsiteX124" fmla="*/ 2260600 w 4094440"/>
+              <a:gd name="connsiteY124" fmla="*/ 50800 h 4254500"/>
+              <a:gd name="connsiteX125" fmla="*/ 2222500 w 4094440"/>
+              <a:gd name="connsiteY125" fmla="*/ 63500 h 4254500"/>
+              <a:gd name="connsiteX126" fmla="*/ 2184400 w 4094440"/>
+              <a:gd name="connsiteY126" fmla="*/ 88900 h 4254500"/>
+              <a:gd name="connsiteX127" fmla="*/ 2146300 w 4094440"/>
+              <a:gd name="connsiteY127" fmla="*/ 101600 h 4254500"/>
+              <a:gd name="connsiteX128" fmla="*/ 2108200 w 4094440"/>
+              <a:gd name="connsiteY128" fmla="*/ 127000 h 4254500"/>
+              <a:gd name="connsiteX129" fmla="*/ 1968500 w 4094440"/>
+              <a:gd name="connsiteY129" fmla="*/ 139700 h 4254500"/>
+            </a:gdLst>
+            <a:ahLst/>
+            <a:cxnLst>
+              <a:cxn ang="0">
+                <a:pos x="connsiteX0" y="connsiteY0"/>
+              </a:cxn>
+              <a:cxn ang="0">
+                <a:pos x="connsiteX1" y="connsiteY1"/>
+              </a:cxn>
+              <a:cxn ang="0">
+                <a:pos x="connsiteX2" y="connsiteY2"/>
+              </a:cxn>
+              <a:cxn ang="0">
+                <a:pos x="connsiteX3" y="connsiteY3"/>
+              </a:cxn>
+              <a:cxn ang="0">
+                <a:pos x="connsiteX4" y="connsiteY4"/>
+              </a:cxn>
+              <a:cxn ang="0">
+                <a:pos x="connsiteX5" y="connsiteY5"/>
+              </a:cxn>
+              <a:cxn ang="0">
+                <a:pos x="connsiteX6" y="connsiteY6"/>
+              </a:cxn>
+              <a:cxn ang="0">
+                <a:pos x="connsiteX7" y="connsiteY7"/>
+              </a:cxn>
+              <a:cxn ang="0">
+                <a:pos x="connsiteX8" y="connsiteY8"/>
+              </a:cxn>
+              <a:cxn ang="0">
+                <a:pos x="connsiteX9" y="connsiteY9"/>
+              </a:cxn>
+              <a:cxn ang="0">
+                <a:pos x="connsiteX10" y="connsiteY10"/>
+              </a:cxn>
+              <a:cxn ang="0">
+                <a:pos x="connsiteX11" y="connsiteY11"/>
+              </a:cxn>
+              <a:cxn ang="0">
+                <a:pos x="connsiteX12" y="connsiteY12"/>
+              </a:cxn>
+              <a:cxn ang="0">
+                <a:pos x="connsiteX13" y="connsiteY13"/>
+              </a:cxn>
+              <a:cxn ang="0">
+                <a:pos x="connsiteX14" y="connsiteY14"/>
+              </a:cxn>
+              <a:cxn ang="0">
+                <a:pos x="connsiteX15" y="connsiteY15"/>
+              </a:cxn>
+              <a:cxn ang="0">
+                <a:pos x="connsiteX16" y="connsiteY16"/>
+              </a:cxn>
+              <a:cxn ang="0">
+                <a:pos x="connsiteX17" y="connsiteY17"/>
+              </a:cxn>
+              <a:cxn ang="0">
+                <a:pos x="connsiteX18" y="connsiteY18"/>
+              </a:cxn>
+              <a:cxn ang="0">
+                <a:pos x="connsiteX19" y="connsiteY19"/>
+              </a:cxn>
+              <a:cxn ang="0">
+                <a:pos x="connsiteX20" y="connsiteY20"/>
+              </a:cxn>
+              <a:cxn ang="0">
+                <a:pos x="connsiteX21" y="connsiteY21"/>
+              </a:cxn>
+              <a:cxn ang="0">
+                <a:pos x="connsiteX22" y="connsiteY22"/>
+              </a:cxn>
+              <a:cxn ang="0">
+                <a:pos x="connsiteX23" y="connsiteY23"/>
+              </a:cxn>
+              <a:cxn ang="0">
+                <a:pos x="connsiteX24" y="connsiteY24"/>
+              </a:cxn>
+              <a:cxn ang="0">
+                <a:pos x="connsiteX25" y="connsiteY25"/>
+              </a:cxn>
+              <a:cxn ang="0">
+                <a:pos x="connsiteX26" y="connsiteY26"/>
+              </a:cxn>
+              <a:cxn ang="0">
+                <a:pos x="connsiteX27" y="connsiteY27"/>
+              </a:cxn>
+              <a:cxn ang="0">
+                <a:pos x="connsiteX28" y="connsiteY28"/>
+              </a:cxn>
+              <a:cxn ang="0">
+                <a:pos x="connsiteX29" y="connsiteY29"/>
+              </a:cxn>
+              <a:cxn ang="0">
+                <a:pos x="connsiteX30" y="connsiteY30"/>
+              </a:cxn>
+              <a:cxn ang="0">
+                <a:pos x="connsiteX31" y="connsiteY31"/>
+              </a:cxn>
+              <a:cxn ang="0">
+                <a:pos x="connsiteX32" y="connsiteY32"/>
+              </a:cxn>
+              <a:cxn ang="0">
+                <a:pos x="connsiteX33" y="connsiteY33"/>
+              </a:cxn>
+              <a:cxn ang="0">
+                <a:pos x="connsiteX34" y="connsiteY34"/>
+              </a:cxn>
+              <a:cxn ang="0">
+                <a:pos x="connsiteX35" y="connsiteY35"/>
+              </a:cxn>
+              <a:cxn ang="0">
+                <a:pos x="connsiteX36" y="connsiteY36"/>
+              </a:cxn>
+              <a:cxn ang="0">
+                <a:pos x="connsiteX37" y="connsiteY37"/>
+              </a:cxn>
+              <a:cxn ang="0">
+                <a:pos x="connsiteX38" y="connsiteY38"/>
+              </a:cxn>
+              <a:cxn ang="0">
+                <a:pos x="connsiteX39" y="connsiteY39"/>
+              </a:cxn>
+              <a:cxn ang="0">
+                <a:pos x="connsiteX40" y="connsiteY40"/>
+              </a:cxn>
+              <a:cxn ang="0">
+                <a:pos x="connsiteX41" y="connsiteY41"/>
+              </a:cxn>
+              <a:cxn ang="0">
+                <a:pos x="connsiteX42" y="connsiteY42"/>
+              </a:cxn>
+              <a:cxn ang="0">
+                <a:pos x="connsiteX43" y="connsiteY43"/>
+              </a:cxn>
+              <a:cxn ang="0">
+                <a:pos x="connsiteX44" y="connsiteY44"/>
+              </a:cxn>
+              <a:cxn ang="0">
+                <a:pos x="connsiteX45" y="connsiteY45"/>
+              </a:cxn>
+              <a:cxn ang="0">
+                <a:pos x="connsiteX46" y="connsiteY46"/>
+              </a:cxn>
+              <a:cxn ang="0">
+                <a:pos x="connsiteX47" y="connsiteY47"/>
+              </a:cxn>
+              <a:cxn ang="0">
+                <a:pos x="connsiteX48" y="connsiteY48"/>
+              </a:cxn>
+              <a:cxn ang="0">
+                <a:pos x="connsiteX49" y="connsiteY49"/>
+              </a:cxn>
+              <a:cxn ang="0">
+                <a:pos x="connsiteX50" y="connsiteY50"/>
+              </a:cxn>
+              <a:cxn ang="0">
+                <a:pos x="connsiteX51" y="connsiteY51"/>
+              </a:cxn>
+              <a:cxn ang="0">
+                <a:pos x="connsiteX52" y="connsiteY52"/>
+              </a:cxn>
+              <a:cxn ang="0">
+                <a:pos x="connsiteX53" y="connsiteY53"/>
+              </a:cxn>
+              <a:cxn ang="0">
+                <a:pos x="connsiteX54" y="connsiteY54"/>
+              </a:cxn>
+              <a:cxn ang="0">
+                <a:pos x="connsiteX55" y="connsiteY55"/>
+              </a:cxn>
+              <a:cxn ang="0">
+                <a:pos x="connsiteX56" y="connsiteY56"/>
+              </a:cxn>
+              <a:cxn ang="0">
+                <a:pos x="connsiteX57" y="connsiteY57"/>
+              </a:cxn>
+              <a:cxn ang="0">
+                <a:pos x="connsiteX58" y="connsiteY58"/>
+              </a:cxn>
+              <a:cxn ang="0">
+                <a:pos x="connsiteX59" y="connsiteY59"/>
+              </a:cxn>
+              <a:cxn ang="0">
+                <a:pos x="connsiteX60" y="connsiteY60"/>
+              </a:cxn>
+              <a:cxn ang="0">
+                <a:pos x="connsiteX61" y="connsiteY61"/>
+              </a:cxn>
+              <a:cxn ang="0">
+                <a:pos x="connsiteX62" y="connsiteY62"/>
+              </a:cxn>
+              <a:cxn ang="0">
+                <a:pos x="connsiteX63" y="connsiteY63"/>
+              </a:cxn>
+              <a:cxn ang="0">
+                <a:pos x="connsiteX64" y="connsiteY64"/>
+              </a:cxn>
+              <a:cxn ang="0">
+                <a:pos x="connsiteX65" y="connsiteY65"/>
+              </a:cxn>
+              <a:cxn ang="0">
+                <a:pos x="connsiteX66" y="connsiteY66"/>
+              </a:cxn>
+              <a:cxn ang="0">
+                <a:pos x="connsiteX67" y="connsiteY67"/>
+              </a:cxn>
+              <a:cxn ang="0">
+                <a:pos x="connsiteX68" y="connsiteY68"/>
+              </a:cxn>
+              <a:cxn ang="0">
+                <a:pos x="connsiteX69" y="connsiteY69"/>
+              </a:cxn>
+              <a:cxn ang="0">
+                <a:pos x="connsiteX70" y="connsiteY70"/>
+              </a:cxn>
+              <a:cxn ang="0">
+                <a:pos x="connsiteX71" y="connsiteY71"/>
+              </a:cxn>
+              <a:cxn ang="0">
+                <a:pos x="connsiteX72" y="connsiteY72"/>
+              </a:cxn>
+              <a:cxn ang="0">
+                <a:pos x="connsiteX73" y="connsiteY73"/>
+              </a:cxn>
+              <a:cxn ang="0">
+                <a:pos x="connsiteX74" y="connsiteY74"/>
+              </a:cxn>
+              <a:cxn ang="0">
+                <a:pos x="connsiteX75" y="connsiteY75"/>
+              </a:cxn>
+              <a:cxn ang="0">
+                <a:pos x="connsiteX76" y="connsiteY76"/>
+              </a:cxn>
+              <a:cxn ang="0">
+                <a:pos x="connsiteX77" y="connsiteY77"/>
+              </a:cxn>
+              <a:cxn ang="0">
+                <a:pos x="connsiteX78" y="connsiteY78"/>
+              </a:cxn>
+              <a:cxn ang="0">
+                <a:pos x="connsiteX79" y="connsiteY79"/>
+              </a:cxn>
+              <a:cxn ang="0">
+                <a:pos x="connsiteX80" y="connsiteY80"/>
+              </a:cxn>
+              <a:cxn ang="0">
+                <a:pos x="connsiteX81" y="connsiteY81"/>
+              </a:cxn>
+              <a:cxn ang="0">
+                <a:pos x="connsiteX82" y="connsiteY82"/>
+              </a:cxn>
+              <a:cxn ang="0">
+                <a:pos x="connsiteX83" y="connsiteY83"/>
+              </a:cxn>
+              <a:cxn ang="0">
+                <a:pos x="connsiteX84" y="connsiteY84"/>
+              </a:cxn>
+              <a:cxn ang="0">
+                <a:pos x="connsiteX85" y="connsiteY85"/>
+              </a:cxn>
+              <a:cxn ang="0">
+                <a:pos x="connsiteX86" y="connsiteY86"/>
+              </a:cxn>
+              <a:cxn ang="0">
+                <a:pos x="connsiteX87" y="connsiteY87"/>
+              </a:cxn>
+              <a:cxn ang="0">
+                <a:pos x="connsiteX88" y="connsiteY88"/>
+              </a:cxn>
+              <a:cxn ang="0">
+                <a:pos x="connsiteX89" y="connsiteY89"/>
+              </a:cxn>
+              <a:cxn ang="0">
+                <a:pos x="connsiteX90" y="connsiteY90"/>
+              </a:cxn>
+              <a:cxn ang="0">
+                <a:pos x="connsiteX91" y="connsiteY91"/>
+              </a:cxn>
+              <a:cxn ang="0">
+                <a:pos x="connsiteX92" y="connsiteY92"/>
+              </a:cxn>
+              <a:cxn ang="0">
+                <a:pos x="connsiteX93" y="connsiteY93"/>
+              </a:cxn>
+              <a:cxn ang="0">
+                <a:pos x="connsiteX94" y="connsiteY94"/>
+              </a:cxn>
+              <a:cxn ang="0">
+                <a:pos x="connsiteX95" y="connsiteY95"/>
+              </a:cxn>
+              <a:cxn ang="0">
+                <a:pos x="connsiteX96" y="connsiteY96"/>
+              </a:cxn>
+              <a:cxn ang="0">
+                <a:pos x="connsiteX97" y="connsiteY97"/>
+              </a:cxn>
+              <a:cxn ang="0">
+                <a:pos x="connsiteX98" y="connsiteY98"/>
+              </a:cxn>
+              <a:cxn ang="0">
+                <a:pos x="connsiteX99" y="connsiteY99"/>
+              </a:cxn>
+              <a:cxn ang="0">
+                <a:pos x="connsiteX100" y="connsiteY100"/>
+              </a:cxn>
+              <a:cxn ang="0">
+                <a:pos x="connsiteX101" y="connsiteY101"/>
+              </a:cxn>
+              <a:cxn ang="0">
+                <a:pos x="connsiteX102" y="connsiteY102"/>
+              </a:cxn>
+              <a:cxn ang="0">
+                <a:pos x="connsiteX103" y="connsiteY103"/>
+              </a:cxn>
+              <a:cxn ang="0">
+                <a:pos x="connsiteX104" y="connsiteY104"/>
+              </a:cxn>
+              <a:cxn ang="0">
+                <a:pos x="connsiteX105" y="connsiteY105"/>
+              </a:cxn>
+              <a:cxn ang="0">
+                <a:pos x="connsiteX106" y="connsiteY106"/>
+              </a:cxn>
+              <a:cxn ang="0">
+                <a:pos x="connsiteX107" y="connsiteY107"/>
+              </a:cxn>
+              <a:cxn ang="0">
+                <a:pos x="connsiteX108" y="connsiteY108"/>
+              </a:cxn>
+              <a:cxn ang="0">
+                <a:pos x="connsiteX109" y="connsiteY109"/>
+              </a:cxn>
+              <a:cxn ang="0">
+                <a:pos x="connsiteX110" y="connsiteY110"/>
+              </a:cxn>
+              <a:cxn ang="0">
+                <a:pos x="connsiteX111" y="connsiteY111"/>
+              </a:cxn>
+              <a:cxn ang="0">
+                <a:pos x="connsiteX112" y="connsiteY112"/>
+              </a:cxn>
+              <a:cxn ang="0">
+                <a:pos x="connsiteX113" y="connsiteY113"/>
+              </a:cxn>
+              <a:cxn ang="0">
+                <a:pos x="connsiteX114" y="connsiteY114"/>
+              </a:cxn>
+              <a:cxn ang="0">
+                <a:pos x="connsiteX115" y="connsiteY115"/>
+              </a:cxn>
+              <a:cxn ang="0">
+                <a:pos x="connsiteX116" y="connsiteY116"/>
+              </a:cxn>
+              <a:cxn ang="0">
+                <a:pos x="connsiteX117" y="connsiteY117"/>
+              </a:cxn>
+              <a:cxn ang="0">
+                <a:pos x="connsiteX118" y="connsiteY118"/>
+              </a:cxn>
+              <a:cxn ang="0">
+                <a:pos x="connsiteX119" y="connsiteY119"/>
+              </a:cxn>
+              <a:cxn ang="0">
+                <a:pos x="connsiteX120" y="connsiteY120"/>
+              </a:cxn>
+              <a:cxn ang="0">
+                <a:pos x="connsiteX121" y="connsiteY121"/>
+              </a:cxn>
+              <a:cxn ang="0">
+                <a:pos x="connsiteX122" y="connsiteY122"/>
+              </a:cxn>
+              <a:cxn ang="0">
+                <a:pos x="connsiteX123" y="connsiteY123"/>
+              </a:cxn>
+              <a:cxn ang="0">
+                <a:pos x="connsiteX124" y="connsiteY124"/>
+              </a:cxn>
+              <a:cxn ang="0">
+                <a:pos x="connsiteX125" y="connsiteY125"/>
+              </a:cxn>
+              <a:cxn ang="0">
+                <a:pos x="connsiteX126" y="connsiteY126"/>
+              </a:cxn>
+              <a:cxn ang="0">
+                <a:pos x="connsiteX127" y="connsiteY127"/>
+              </a:cxn>
+              <a:cxn ang="0">
+                <a:pos x="connsiteX128" y="connsiteY128"/>
+              </a:cxn>
+              <a:cxn ang="0">
+                <a:pos x="connsiteX129" y="connsiteY129"/>
+              </a:cxn>
+            </a:cxnLst>
+            <a:rect l="l" t="t" r="r" b="b"/>
+            <a:pathLst>
+              <a:path w="4094440" h="4254500">
+                <a:moveTo>
+                  <a:pt x="1968500" y="139700"/>
+                </a:moveTo>
+                <a:lnTo>
+                  <a:pt x="1968500" y="139700"/>
+                </a:lnTo>
+                <a:lnTo>
+                  <a:pt x="1854200" y="152400"/>
+                </a:lnTo>
+                <a:cubicBezTo>
+                  <a:pt x="1797977" y="159428"/>
+                  <a:pt x="1765211" y="162587"/>
+                  <a:pt x="1714500" y="177800"/>
+                </a:cubicBezTo>
+                <a:cubicBezTo>
+                  <a:pt x="1688855" y="185493"/>
+                  <a:pt x="1663700" y="194733"/>
+                  <a:pt x="1638300" y="203200"/>
+                </a:cubicBezTo>
+                <a:cubicBezTo>
+                  <a:pt x="1625600" y="207433"/>
+                  <a:pt x="1611339" y="208474"/>
+                  <a:pt x="1600200" y="215900"/>
+                </a:cubicBezTo>
+                <a:cubicBezTo>
+                  <a:pt x="1491011" y="288693"/>
+                  <a:pt x="1629160" y="201420"/>
+                  <a:pt x="1524000" y="254000"/>
+                </a:cubicBezTo>
+                <a:cubicBezTo>
+                  <a:pt x="1440603" y="295698"/>
+                  <a:pt x="1540759" y="272035"/>
+                  <a:pt x="1409700" y="304800"/>
+                </a:cubicBezTo>
+                <a:cubicBezTo>
+                  <a:pt x="1291704" y="334299"/>
+                  <a:pt x="1438395" y="299061"/>
+                  <a:pt x="1282700" y="330200"/>
+                </a:cubicBezTo>
+                <a:cubicBezTo>
+                  <a:pt x="1168533" y="353033"/>
+                  <a:pt x="1301483" y="333419"/>
+                  <a:pt x="1168400" y="355600"/>
+                </a:cubicBezTo>
+                <a:cubicBezTo>
+                  <a:pt x="1138873" y="360521"/>
+                  <a:pt x="1109133" y="364067"/>
+                  <a:pt x="1079500" y="368300"/>
+                </a:cubicBezTo>
+                <a:cubicBezTo>
+                  <a:pt x="1041315" y="381028"/>
+                  <a:pt x="1036126" y="379045"/>
+                  <a:pt x="1003300" y="406400"/>
+                </a:cubicBezTo>
+                <a:cubicBezTo>
+                  <a:pt x="989502" y="417898"/>
+                  <a:pt x="978998" y="433002"/>
+                  <a:pt x="965200" y="444500"/>
+                </a:cubicBezTo>
+                <a:cubicBezTo>
+                  <a:pt x="910709" y="489909"/>
+                  <a:pt x="939595" y="447286"/>
+                  <a:pt x="889000" y="508000"/>
+                </a:cubicBezTo>
+                <a:cubicBezTo>
+                  <a:pt x="879229" y="519726"/>
+                  <a:pt x="873741" y="534692"/>
+                  <a:pt x="863600" y="546100"/>
+                </a:cubicBezTo>
+                <a:cubicBezTo>
+                  <a:pt x="839735" y="572948"/>
+                  <a:pt x="817288" y="602375"/>
+                  <a:pt x="787400" y="622300"/>
+                </a:cubicBezTo>
+                <a:lnTo>
+                  <a:pt x="711200" y="673100"/>
+                </a:lnTo>
+                <a:cubicBezTo>
+                  <a:pt x="702733" y="690033"/>
+                  <a:pt x="695540" y="707666"/>
+                  <a:pt x="685800" y="723900"/>
+                </a:cubicBezTo>
+                <a:cubicBezTo>
+                  <a:pt x="670094" y="750077"/>
+                  <a:pt x="644653" y="771140"/>
+                  <a:pt x="635000" y="800100"/>
+                </a:cubicBezTo>
+                <a:cubicBezTo>
+                  <a:pt x="616620" y="855239"/>
+                  <a:pt x="631766" y="828734"/>
+                  <a:pt x="584200" y="876300"/>
+                </a:cubicBezTo>
+                <a:cubicBezTo>
+                  <a:pt x="570966" y="916003"/>
+                  <a:pt x="558131" y="965646"/>
+                  <a:pt x="520700" y="990600"/>
+                </a:cubicBezTo>
+                <a:lnTo>
+                  <a:pt x="482600" y="1016000"/>
+                </a:lnTo>
+                <a:cubicBezTo>
+                  <a:pt x="474133" y="1041400"/>
+                  <a:pt x="472052" y="1069923"/>
+                  <a:pt x="457200" y="1092200"/>
+                </a:cubicBezTo>
+                <a:cubicBezTo>
+                  <a:pt x="448733" y="1104900"/>
+                  <a:pt x="438626" y="1116648"/>
+                  <a:pt x="431800" y="1130300"/>
+                </a:cubicBezTo>
+                <a:cubicBezTo>
+                  <a:pt x="425813" y="1142274"/>
+                  <a:pt x="425601" y="1156698"/>
+                  <a:pt x="419100" y="1168400"/>
+                </a:cubicBezTo>
+                <a:cubicBezTo>
+                  <a:pt x="404275" y="1195085"/>
+                  <a:pt x="385233" y="1219200"/>
+                  <a:pt x="368300" y="1244600"/>
+                </a:cubicBezTo>
+                <a:cubicBezTo>
+                  <a:pt x="359833" y="1257300"/>
+                  <a:pt x="347727" y="1268220"/>
+                  <a:pt x="342900" y="1282700"/>
+                </a:cubicBezTo>
+                <a:cubicBezTo>
+                  <a:pt x="312673" y="1373380"/>
+                  <a:pt x="332352" y="1336623"/>
+                  <a:pt x="292100" y="1397000"/>
+                </a:cubicBezTo>
+                <a:cubicBezTo>
+                  <a:pt x="285655" y="1422779"/>
+                  <a:pt x="277632" y="1460393"/>
+                  <a:pt x="266700" y="1485900"/>
+                </a:cubicBezTo>
+                <a:cubicBezTo>
+                  <a:pt x="247364" y="1531016"/>
+                  <a:pt x="241409" y="1536536"/>
+                  <a:pt x="215900" y="1574800"/>
+                </a:cubicBezTo>
+                <a:cubicBezTo>
+                  <a:pt x="196706" y="1651575"/>
+                  <a:pt x="208720" y="1609041"/>
+                  <a:pt x="177800" y="1701800"/>
+                </a:cubicBezTo>
+                <a:cubicBezTo>
+                  <a:pt x="173567" y="1714500"/>
+                  <a:pt x="167725" y="1726773"/>
+                  <a:pt x="165100" y="1739900"/>
+                </a:cubicBezTo>
+                <a:cubicBezTo>
+                  <a:pt x="160867" y="1761067"/>
+                  <a:pt x="159226" y="1782922"/>
+                  <a:pt x="152400" y="1803400"/>
+                </a:cubicBezTo>
+                <a:cubicBezTo>
+                  <a:pt x="146413" y="1821361"/>
+                  <a:pt x="133647" y="1836473"/>
+                  <a:pt x="127000" y="1854200"/>
+                </a:cubicBezTo>
+                <a:cubicBezTo>
+                  <a:pt x="120871" y="1870543"/>
+                  <a:pt x="119095" y="1888217"/>
+                  <a:pt x="114300" y="1905000"/>
+                </a:cubicBezTo>
+                <a:cubicBezTo>
+                  <a:pt x="93086" y="1979249"/>
+                  <a:pt x="108751" y="1904570"/>
+                  <a:pt x="88900" y="1993900"/>
+                </a:cubicBezTo>
+                <a:cubicBezTo>
+                  <a:pt x="84217" y="2014972"/>
+                  <a:pt x="81435" y="2036459"/>
+                  <a:pt x="76200" y="2057400"/>
+                </a:cubicBezTo>
+                <a:cubicBezTo>
+                  <a:pt x="57512" y="2132154"/>
+                  <a:pt x="53576" y="2073292"/>
+                  <a:pt x="38100" y="2197100"/>
+                </a:cubicBezTo>
+                <a:lnTo>
+                  <a:pt x="25400" y="2298700"/>
+                </a:lnTo>
+                <a:cubicBezTo>
+                  <a:pt x="21167" y="2374900"/>
+                  <a:pt x="17461" y="2451131"/>
+                  <a:pt x="12700" y="2527300"/>
+                </a:cubicBezTo>
+                <a:cubicBezTo>
+                  <a:pt x="8994" y="2586602"/>
+                  <a:pt x="0" y="2645682"/>
+                  <a:pt x="0" y="2705100"/>
+                </a:cubicBezTo>
+                <a:cubicBezTo>
+                  <a:pt x="0" y="2832171"/>
+                  <a:pt x="2699" y="2959424"/>
+                  <a:pt x="12700" y="3086100"/>
+                </a:cubicBezTo>
+                <a:cubicBezTo>
+                  <a:pt x="17639" y="3148663"/>
+                  <a:pt x="36152" y="3174533"/>
+                  <a:pt x="50800" y="3225800"/>
+                </a:cubicBezTo>
+                <a:cubicBezTo>
+                  <a:pt x="59674" y="3256860"/>
+                  <a:pt x="73810" y="3330165"/>
+                  <a:pt x="88900" y="3352800"/>
+                </a:cubicBezTo>
+                <a:lnTo>
+                  <a:pt x="114300" y="3390900"/>
+                </a:lnTo>
+                <a:cubicBezTo>
+                  <a:pt x="120745" y="3416679"/>
+                  <a:pt x="128768" y="3454293"/>
+                  <a:pt x="139700" y="3479800"/>
+                </a:cubicBezTo>
+                <a:cubicBezTo>
+                  <a:pt x="165100" y="3539067"/>
+                  <a:pt x="176046" y="3534532"/>
+                  <a:pt x="190500" y="3606800"/>
+                </a:cubicBezTo>
+                <a:cubicBezTo>
+                  <a:pt x="216320" y="3735902"/>
+                  <a:pt x="189865" y="3617278"/>
+                  <a:pt x="215900" y="3708400"/>
+                </a:cubicBezTo>
+                <a:cubicBezTo>
+                  <a:pt x="221325" y="3727389"/>
+                  <a:pt x="231150" y="3777000"/>
+                  <a:pt x="241300" y="3797300"/>
+                </a:cubicBezTo>
+                <a:cubicBezTo>
+                  <a:pt x="248126" y="3810952"/>
+                  <a:pt x="260501" y="3821452"/>
+                  <a:pt x="266700" y="3835400"/>
+                </a:cubicBezTo>
+                <a:cubicBezTo>
+                  <a:pt x="277574" y="3859866"/>
+                  <a:pt x="277248" y="3889323"/>
+                  <a:pt x="292100" y="3911600"/>
+                </a:cubicBezTo>
+                <a:cubicBezTo>
+                  <a:pt x="309033" y="3937000"/>
+                  <a:pt x="333247" y="3958840"/>
+                  <a:pt x="342900" y="3987800"/>
+                </a:cubicBezTo>
+                <a:cubicBezTo>
+                  <a:pt x="351266" y="4012899"/>
+                  <a:pt x="358619" y="4046095"/>
+                  <a:pt x="381000" y="4064000"/>
+                </a:cubicBezTo>
+                <a:cubicBezTo>
+                  <a:pt x="391453" y="4072363"/>
+                  <a:pt x="407126" y="4070713"/>
+                  <a:pt x="419100" y="4076700"/>
+                </a:cubicBezTo>
+                <a:cubicBezTo>
+                  <a:pt x="432752" y="4083526"/>
+                  <a:pt x="441973" y="4101050"/>
+                  <a:pt x="457200" y="4102100"/>
+                </a:cubicBezTo>
+                <a:cubicBezTo>
+                  <a:pt x="689635" y="4118130"/>
+                  <a:pt x="1155700" y="4127500"/>
+                  <a:pt x="1155700" y="4127500"/>
+                </a:cubicBezTo>
+                <a:lnTo>
+                  <a:pt x="1219200" y="4140200"/>
+                </a:lnTo>
+                <a:cubicBezTo>
+                  <a:pt x="1244535" y="4144806"/>
+                  <a:pt x="1270418" y="4146655"/>
+                  <a:pt x="1295400" y="4152900"/>
+                </a:cubicBezTo>
+                <a:cubicBezTo>
+                  <a:pt x="1506817" y="4205754"/>
+                  <a:pt x="1264739" y="4151146"/>
+                  <a:pt x="1422400" y="4203700"/>
+                </a:cubicBezTo>
+                <a:cubicBezTo>
+                  <a:pt x="1440150" y="4209617"/>
+                  <a:pt x="1549306" y="4226968"/>
+                  <a:pt x="1562100" y="4229100"/>
+                </a:cubicBezTo>
+                <a:cubicBezTo>
+                  <a:pt x="1853026" y="4221444"/>
+                  <a:pt x="2011108" y="4204129"/>
+                  <a:pt x="2273300" y="4229100"/>
+                </a:cubicBezTo>
+                <a:cubicBezTo>
+                  <a:pt x="2286627" y="4230369"/>
+                  <a:pt x="2298332" y="4238896"/>
+                  <a:pt x="2311400" y="4241800"/>
+                </a:cubicBezTo>
+                <a:cubicBezTo>
+                  <a:pt x="2336537" y="4247386"/>
+                  <a:pt x="2362200" y="4250267"/>
+                  <a:pt x="2387600" y="4254500"/>
+                </a:cubicBezTo>
+                <a:lnTo>
+                  <a:pt x="2971800" y="4241800"/>
+                </a:lnTo>
+                <a:cubicBezTo>
+                  <a:pt x="2989241" y="4241102"/>
+                  <a:pt x="3005171" y="4230042"/>
+                  <a:pt x="3022600" y="4229100"/>
+                </a:cubicBezTo>
+                <a:cubicBezTo>
+                  <a:pt x="3162160" y="4221556"/>
+                  <a:pt x="3302000" y="4220633"/>
+                  <a:pt x="3441700" y="4216400"/>
+                </a:cubicBezTo>
+                <a:cubicBezTo>
+                  <a:pt x="3471131" y="4194327"/>
+                  <a:pt x="3507857" y="4170524"/>
+                  <a:pt x="3530600" y="4140200"/>
+                </a:cubicBezTo>
+                <a:cubicBezTo>
+                  <a:pt x="3545411" y="4120453"/>
+                  <a:pt x="3555448" y="4097525"/>
+                  <a:pt x="3568700" y="4076700"/>
+                </a:cubicBezTo>
+                <a:cubicBezTo>
+                  <a:pt x="3585089" y="4050946"/>
+                  <a:pt x="3605848" y="4027804"/>
+                  <a:pt x="3619500" y="4000500"/>
+                </a:cubicBezTo>
+                <a:cubicBezTo>
+                  <a:pt x="3677126" y="3885248"/>
+                  <a:pt x="3649297" y="3930405"/>
+                  <a:pt x="3695700" y="3860800"/>
+                </a:cubicBezTo>
+                <a:cubicBezTo>
+                  <a:pt x="3699933" y="3843867"/>
+                  <a:pt x="3701524" y="3826043"/>
+                  <a:pt x="3708400" y="3810000"/>
+                </a:cubicBezTo>
+                <a:cubicBezTo>
+                  <a:pt x="3714413" y="3795971"/>
+                  <a:pt x="3728973" y="3786380"/>
+                  <a:pt x="3733800" y="3771900"/>
+                </a:cubicBezTo>
+                <a:cubicBezTo>
+                  <a:pt x="3741943" y="3747471"/>
+                  <a:pt x="3739101" y="3720364"/>
+                  <a:pt x="3746500" y="3695700"/>
+                </a:cubicBezTo>
+                <a:cubicBezTo>
+                  <a:pt x="3751940" y="3677566"/>
+                  <a:pt x="3764442" y="3662301"/>
+                  <a:pt x="3771900" y="3644900"/>
+                </a:cubicBezTo>
+                <a:cubicBezTo>
+                  <a:pt x="3777173" y="3632595"/>
+                  <a:pt x="3779327" y="3619105"/>
+                  <a:pt x="3784600" y="3606800"/>
+                </a:cubicBezTo>
+                <a:cubicBezTo>
+                  <a:pt x="3792058" y="3589399"/>
+                  <a:pt x="3802969" y="3573578"/>
+                  <a:pt x="3810000" y="3556000"/>
+                </a:cubicBezTo>
+                <a:cubicBezTo>
+                  <a:pt x="3819944" y="3531141"/>
+                  <a:pt x="3819336" y="3501219"/>
+                  <a:pt x="3835400" y="3479800"/>
+                </a:cubicBezTo>
+                <a:cubicBezTo>
+                  <a:pt x="3933502" y="3348998"/>
+                  <a:pt x="3815747" y="3515175"/>
+                  <a:pt x="3898900" y="3365500"/>
+                </a:cubicBezTo>
+                <a:cubicBezTo>
+                  <a:pt x="3909179" y="3346997"/>
+                  <a:pt x="3926110" y="3332850"/>
+                  <a:pt x="3937000" y="3314700"/>
+                </a:cubicBezTo>
+                <a:cubicBezTo>
+                  <a:pt x="3951611" y="3290349"/>
+                  <a:pt x="3962400" y="3263900"/>
+                  <a:pt x="3975100" y="3238500"/>
+                </a:cubicBezTo>
+                <a:cubicBezTo>
+                  <a:pt x="3999506" y="3116468"/>
+                  <a:pt x="3971136" y="3229360"/>
+                  <a:pt x="4013200" y="3124200"/>
+                </a:cubicBezTo>
+                <a:cubicBezTo>
+                  <a:pt x="4058540" y="3010850"/>
+                  <a:pt x="4015133" y="3083201"/>
+                  <a:pt x="4064000" y="3009900"/>
+                </a:cubicBezTo>
+                <a:cubicBezTo>
+                  <a:pt x="4114310" y="2808660"/>
+                  <a:pt x="4090134" y="2946057"/>
+                  <a:pt x="4076700" y="2603500"/>
+                </a:cubicBezTo>
+                <a:cubicBezTo>
+                  <a:pt x="4072218" y="2489209"/>
+                  <a:pt x="4075381" y="2374411"/>
+                  <a:pt x="4064000" y="2260600"/>
+                </a:cubicBezTo>
+                <a:cubicBezTo>
+                  <a:pt x="4062481" y="2245412"/>
+                  <a:pt x="4044799" y="2236448"/>
+                  <a:pt x="4038600" y="2222500"/>
+                </a:cubicBezTo>
+                <a:cubicBezTo>
+                  <a:pt x="4027726" y="2198034"/>
+                  <a:pt x="4020893" y="2171945"/>
+                  <a:pt x="4013200" y="2146300"/>
+                </a:cubicBezTo>
+                <a:cubicBezTo>
+                  <a:pt x="4008184" y="2129582"/>
+                  <a:pt x="4008306" y="2111112"/>
+                  <a:pt x="4000500" y="2095500"/>
+                </a:cubicBezTo>
+                <a:cubicBezTo>
+                  <a:pt x="3986848" y="2068196"/>
+                  <a:pt x="3959353" y="2048260"/>
+                  <a:pt x="3949700" y="2019300"/>
+                </a:cubicBezTo>
+                <a:cubicBezTo>
+                  <a:pt x="3941233" y="1993900"/>
+                  <a:pt x="3939152" y="1965377"/>
+                  <a:pt x="3924300" y="1943100"/>
+                </a:cubicBezTo>
+                <a:cubicBezTo>
+                  <a:pt x="3915833" y="1930400"/>
+                  <a:pt x="3905099" y="1918948"/>
+                  <a:pt x="3898900" y="1905000"/>
+                </a:cubicBezTo>
+                <a:cubicBezTo>
+                  <a:pt x="3888026" y="1880534"/>
+                  <a:pt x="3881967" y="1854200"/>
+                  <a:pt x="3873500" y="1828800"/>
+                </a:cubicBezTo>
+                <a:cubicBezTo>
+                  <a:pt x="3844673" y="1742320"/>
+                  <a:pt x="3880958" y="1848687"/>
+                  <a:pt x="3835400" y="1727200"/>
+                </a:cubicBezTo>
+                <a:cubicBezTo>
+                  <a:pt x="3830700" y="1714665"/>
+                  <a:pt x="3827400" y="1701635"/>
+                  <a:pt x="3822700" y="1689100"/>
+                </a:cubicBezTo>
+                <a:cubicBezTo>
+                  <a:pt x="3814695" y="1667754"/>
+                  <a:pt x="3805305" y="1646946"/>
+                  <a:pt x="3797300" y="1625600"/>
+                </a:cubicBezTo>
+                <a:cubicBezTo>
+                  <a:pt x="3792600" y="1613065"/>
+                  <a:pt x="3790587" y="1599474"/>
+                  <a:pt x="3784600" y="1587500"/>
+                </a:cubicBezTo>
+                <a:cubicBezTo>
+                  <a:pt x="3777774" y="1573848"/>
+                  <a:pt x="3767667" y="1562100"/>
+                  <a:pt x="3759200" y="1549400"/>
+                </a:cubicBezTo>
+                <a:cubicBezTo>
+                  <a:pt x="3731704" y="1439414"/>
+                  <a:pt x="3765375" y="1558486"/>
+                  <a:pt x="3721100" y="1447800"/>
+                </a:cubicBezTo>
+                <a:cubicBezTo>
+                  <a:pt x="3711156" y="1422941"/>
+                  <a:pt x="3704167" y="1397000"/>
+                  <a:pt x="3695700" y="1371600"/>
+                </a:cubicBezTo>
+                <a:cubicBezTo>
+                  <a:pt x="3691467" y="1358900"/>
+                  <a:pt x="3690426" y="1344639"/>
+                  <a:pt x="3683000" y="1333500"/>
+                </a:cubicBezTo>
+                <a:cubicBezTo>
+                  <a:pt x="3674533" y="1320800"/>
+                  <a:pt x="3664426" y="1309052"/>
+                  <a:pt x="3657600" y="1295400"/>
+                </a:cubicBezTo>
+                <a:cubicBezTo>
+                  <a:pt x="3647405" y="1275010"/>
+                  <a:pt x="3639409" y="1253527"/>
+                  <a:pt x="3632200" y="1231900"/>
+                </a:cubicBezTo>
+                <a:cubicBezTo>
+                  <a:pt x="3626680" y="1215341"/>
+                  <a:pt x="3626376" y="1197143"/>
+                  <a:pt x="3619500" y="1181100"/>
+                </a:cubicBezTo>
+                <a:cubicBezTo>
+                  <a:pt x="3613487" y="1167071"/>
+                  <a:pt x="3600299" y="1156948"/>
+                  <a:pt x="3594100" y="1143000"/>
+                </a:cubicBezTo>
+                <a:cubicBezTo>
+                  <a:pt x="3535748" y="1011708"/>
+                  <a:pt x="3605523" y="1115898"/>
+                  <a:pt x="3530600" y="1016000"/>
+                </a:cubicBezTo>
+                <a:cubicBezTo>
+                  <a:pt x="3522133" y="977900"/>
+                  <a:pt x="3513976" y="939730"/>
+                  <a:pt x="3505200" y="901700"/>
+                </a:cubicBezTo>
+                <a:cubicBezTo>
+                  <a:pt x="3501275" y="884693"/>
+                  <a:pt x="3499376" y="866943"/>
+                  <a:pt x="3492500" y="850900"/>
+                </a:cubicBezTo>
+                <a:cubicBezTo>
+                  <a:pt x="3486487" y="836871"/>
+                  <a:pt x="3475567" y="825500"/>
+                  <a:pt x="3467100" y="812800"/>
+                </a:cubicBezTo>
+                <a:cubicBezTo>
+                  <a:pt x="3440669" y="707074"/>
+                  <a:pt x="3472853" y="811605"/>
+                  <a:pt x="3429000" y="723900"/>
+                </a:cubicBezTo>
+                <a:cubicBezTo>
+                  <a:pt x="3423013" y="711926"/>
+                  <a:pt x="3422287" y="697774"/>
+                  <a:pt x="3416300" y="685800"/>
+                </a:cubicBezTo>
+                <a:cubicBezTo>
+                  <a:pt x="3404951" y="663103"/>
+                  <a:pt x="3348778" y="592211"/>
+                  <a:pt x="3340100" y="584200"/>
+                </a:cubicBezTo>
+                <a:cubicBezTo>
+                  <a:pt x="3304633" y="551461"/>
+                  <a:pt x="3259930" y="529430"/>
+                  <a:pt x="3225800" y="495300"/>
+                </a:cubicBezTo>
+                <a:cubicBezTo>
+                  <a:pt x="3204633" y="474133"/>
+                  <a:pt x="3185929" y="450178"/>
+                  <a:pt x="3162300" y="431800"/>
+                </a:cubicBezTo>
+                <a:cubicBezTo>
+                  <a:pt x="3147356" y="420177"/>
+                  <a:pt x="3126646" y="417759"/>
+                  <a:pt x="3111500" y="406400"/>
+                </a:cubicBezTo>
+                <a:cubicBezTo>
+                  <a:pt x="3092342" y="392032"/>
+                  <a:pt x="3078722" y="371369"/>
+                  <a:pt x="3060700" y="355600"/>
+                </a:cubicBezTo>
+                <a:cubicBezTo>
+                  <a:pt x="3010076" y="311304"/>
+                  <a:pt x="3004815" y="318344"/>
+                  <a:pt x="2946400" y="279400"/>
+                </a:cubicBezTo>
+                <a:cubicBezTo>
+                  <a:pt x="2937018" y="273146"/>
+                  <a:pt x="2874539" y="223473"/>
+                  <a:pt x="2857500" y="215900"/>
+                </a:cubicBezTo>
+                <a:cubicBezTo>
+                  <a:pt x="2833034" y="205026"/>
+                  <a:pt x="2803577" y="205352"/>
+                  <a:pt x="2781300" y="190500"/>
+                </a:cubicBezTo>
+                <a:cubicBezTo>
+                  <a:pt x="2768600" y="182033"/>
+                  <a:pt x="2754926" y="174871"/>
+                  <a:pt x="2743200" y="165100"/>
+                </a:cubicBezTo>
+                <a:cubicBezTo>
+                  <a:pt x="2729402" y="153602"/>
+                  <a:pt x="2720044" y="136963"/>
+                  <a:pt x="2705100" y="127000"/>
+                </a:cubicBezTo>
+                <a:cubicBezTo>
+                  <a:pt x="2693961" y="119574"/>
+                  <a:pt x="2678974" y="120287"/>
+                  <a:pt x="2667000" y="114300"/>
+                </a:cubicBezTo>
+                <a:cubicBezTo>
+                  <a:pt x="2583898" y="72749"/>
+                  <a:pt x="2675062" y="106975"/>
+                  <a:pt x="2590800" y="50800"/>
+                </a:cubicBezTo>
+                <a:cubicBezTo>
+                  <a:pt x="2579661" y="43374"/>
+                  <a:pt x="2564674" y="44087"/>
+                  <a:pt x="2552700" y="38100"/>
+                </a:cubicBezTo>
+                <a:cubicBezTo>
+                  <a:pt x="2464995" y="-5753"/>
+                  <a:pt x="2569526" y="26431"/>
+                  <a:pt x="2463800" y="0"/>
+                </a:cubicBezTo>
+                <a:cubicBezTo>
+                  <a:pt x="2427377" y="3642"/>
+                  <a:pt x="2344469" y="2515"/>
+                  <a:pt x="2298700" y="25400"/>
+                </a:cubicBezTo>
+                <a:cubicBezTo>
+                  <a:pt x="2285048" y="32226"/>
+                  <a:pt x="2274252" y="43974"/>
+                  <a:pt x="2260600" y="50800"/>
+                </a:cubicBezTo>
+                <a:cubicBezTo>
+                  <a:pt x="2248626" y="56787"/>
+                  <a:pt x="2234474" y="57513"/>
+                  <a:pt x="2222500" y="63500"/>
+                </a:cubicBezTo>
+                <a:cubicBezTo>
+                  <a:pt x="2208848" y="70326"/>
+                  <a:pt x="2198052" y="82074"/>
+                  <a:pt x="2184400" y="88900"/>
+                </a:cubicBezTo>
+                <a:cubicBezTo>
+                  <a:pt x="2172426" y="94887"/>
+                  <a:pt x="2158274" y="95613"/>
+                  <a:pt x="2146300" y="101600"/>
+                </a:cubicBezTo>
+                <a:cubicBezTo>
+                  <a:pt x="2132648" y="108426"/>
+                  <a:pt x="2122148" y="120801"/>
+                  <a:pt x="2108200" y="127000"/>
+                </a:cubicBezTo>
+                <a:cubicBezTo>
+                  <a:pt x="2042014" y="156416"/>
+                  <a:pt x="2048309" y="152400"/>
+                  <a:pt x="1968500" y="139700"/>
+                </a:cubicBezTo>
+                <a:close/>
+              </a:path>
+            </a:pathLst>
+          </a:custGeom>
+          <a:blipFill>
+            <a:blip r:embed="rId3"/>
+            <a:stretch>
+              <a:fillRect/>
+            </a:stretch>
+          </a:blipFill>
+          <a:ln w="25400" cap="flat" cmpd="sng" algn="ctr">
+            <a:noFill/>
+            <a:prstDash val="solid"/>
+          </a:ln>
+          <a:effectLst/>
+          <a:extLst>
+            <a:ext uri="{91240B29-F687-4F45-9708-019B960494DF}">
+              <a14:hiddenLine xmlns:a14="http://schemas.microsoft.com/office/drawing/2010/main" w="25400" cap="flat" cmpd="sng" algn="ctr">
+                <a:solidFill>
+                  <a:schemeClr val="accent1">
+                    <a:shade val="50000"/>
+                  </a:schemeClr>
+                </a:solidFill>
+                <a:prstDash val="solid"/>
+              </a14:hiddenLine>
+            </a:ext>
+          </a:extLst>
+        </p:spPr>
+        <p:style>
+          <a:lnRef idx="2">
+            <a:schemeClr val="accent1">
+              <a:shade val="50000"/>
+            </a:schemeClr>
+          </a:lnRef>
+          <a:fillRef idx="1">
+            <a:schemeClr val="accent1"/>
+          </a:fillRef>
+          <a:effectRef idx="0">
+            <a:schemeClr val="accent1"/>
+          </a:effectRef>
+          <a:fontRef idx="minor">
+            <a:schemeClr val="lt1"/>
+          </a:fontRef>
+        </p:style>
+        <p:txBody>
+          <a:bodyPr rtlCol="0" anchor="ctr"/>
+          <a:lstStyle/>
+          <a:p>
+            <a:pPr algn="ctr"/>
+            <a:endParaRPr lang="en-SG"/>
+          </a:p>
+        </p:txBody>
+      </p:sp>
+    </p:spTree>
+    <p:extLst>
+      <p:ext uri="{BB962C8B-B14F-4D97-AF65-F5344CB8AC3E}">
+        <p14:creationId xmlns:p14="http://schemas.microsoft.com/office/powerpoint/2010/main" val="3515373495"/>
+      </p:ext>
+    </p:extLst>
+  </p:cSld>
+  <p:clrMapOvr>
+    <a:masterClrMapping/>
+  </p:clrMapOvr>
+</p:sld>
+</file>
+
+<file path=ppt/slides/slide12.xml><?xml version="1.0" encoding="utf-8"?>
+<p:sld xmlns:a="http://schemas.openxmlformats.org/drawingml/2006/main" xmlns:r="http://schemas.openxmlformats.org/officeDocument/2006/relationships" xmlns:p="http://schemas.openxmlformats.org/presentationml/2006/main" show="0">
+  <p:cSld name="PPAck201403240026082737">
+    <p:spTree>
+      <p:nvGrpSpPr>
+        <p:cNvPr id="1" name=""/>
+        <p:cNvGrpSpPr/>
+        <p:nvPr/>
+      </p:nvGrpSpPr>
+      <p:grpSpPr>
+        <a:xfrm>
+          <a:off x="0" y="0"/>
+          <a:ext cx="0" cy="0"/>
+          <a:chOff x="0" y="0"/>
+          <a:chExt cx="0" cy="0"/>
+        </a:xfrm>
+      </p:grpSpPr>
+      <p:sp>
+        <p:nvSpPr>
+          <p:cNvPr id="2" name="标题 1"/>
+          <p:cNvSpPr>
+            <a:spLocks noGrp="1"/>
+          </p:cNvSpPr>
+          <p:nvPr>
+            <p:ph type="title"/>
+          </p:nvPr>
+        </p:nvSpPr>
+        <p:spPr/>
+        <p:txBody>
+          <a:bodyPr/>
+          <a:lstStyle/>
+          <a:p>
+            <a:endParaRPr lang="en-SG"/>
+          </a:p>
+        </p:txBody>
+      </p:sp>
+      <p:pic>
+        <p:nvPicPr>
+          <p:cNvPr id="4" name="内容占位符 3"/>
+          <p:cNvPicPr>
+            <a:picLocks noGrp="1"/>
+          </p:cNvPicPr>
+          <p:nvPr>
+            <p:ph idx="1"/>
+          </p:nvPr>
+        </p:nvPicPr>
+        <p:blipFill>
+          <a:blip r:embed="rId2">
+            <a:extLst>
+              <a:ext uri="{28A0092B-C50C-407E-A947-70E740481C1C}">
+                <a14:useLocalDpi xmlns:a14="http://schemas.microsoft.com/office/drawing/2010/main" val="0"/>
+              </a:ext>
+            </a:extLst>
+          </a:blip>
+          <a:stretch>
+            <a:fillRect/>
+          </a:stretch>
+        </p:blipFill>
+        <p:spPr>
+          <a:xfrm>
+            <a:off x="1074665" y="1600200"/>
+            <a:ext cx="6994670" cy="4525963"/>
+          </a:xfrm>
+        </p:spPr>
+      </p:pic>
+    </p:spTree>
+    <p:extLst>
+      <p:ext uri="{BB962C8B-B14F-4D97-AF65-F5344CB8AC3E}">
+        <p14:creationId xmlns:p14="http://schemas.microsoft.com/office/powerpoint/2010/main" val="2306293579"/>
+      </p:ext>
+    </p:extLst>
+  </p:cSld>
+  <p:clrMapOvr>
+    <a:masterClrMapping/>
+  </p:clrMapOvr>
+  <mc:AlternateContent xmlns:mc="http://schemas.openxmlformats.org/markup-compatibility/2006" xmlns:p14="http://schemas.microsoft.com/office/powerpoint/2010/main">
+    <mc:Choice Requires="p14">
+      <p:transition spd="slow" p14:dur="2000"/>
+    </mc:Choice>
+    <mc:Fallback xmlns="">
+      <p:transition spd="slow"/>
+    </mc:Fallback>
+  </mc:AlternateContent>
+  <p:timing>
+    <p:tnLst>
+      <p:par>
+        <p:cTn id="1" dur="indefinite" restart="never" nodeType="tmRoot"/>
+      </p:par>
+    </p:tnLst>
+  </p:timing>
 </p:sld>
 </file>
 
@@ -14201,8 +17150,8 @@
 </file>
 
 <file path=ppt/slides/slide9.xml><?xml version="1.0" encoding="utf-8"?>
-<p:sld xmlns:a="http://schemas.openxmlformats.org/drawingml/2006/main" xmlns:r="http://schemas.openxmlformats.org/officeDocument/2006/relationships" xmlns:p="http://schemas.openxmlformats.org/presentationml/2006/main" show="0">
-  <p:cSld name="PPAck201403240026082737">
+<p:sld xmlns:a="http://schemas.openxmlformats.org/drawingml/2006/main" xmlns:r="http://schemas.openxmlformats.org/officeDocument/2006/relationships" xmlns:p="http://schemas.openxmlformats.org/presentationml/2006/main">
+  <p:cSld>
     <p:spTree>
       <p:nvGrpSpPr>
         <p:cNvPr id="1" name=""/>
@@ -14219,7 +17168,7 @@
       </p:grpSpPr>
       <p:sp>
         <p:nvSpPr>
-          <p:cNvPr id="2" name="标题 1"/>
+          <p:cNvPr id="2" name="Title 1"/>
           <p:cNvSpPr>
             <a:spLocks noGrp="1"/>
           </p:cNvSpPr>
@@ -14232,64 +17181,43 @@
           <a:bodyPr/>
           <a:lstStyle/>
           <a:p>
-            <a:endParaRPr lang="en-SG"/>
-          </a:p>
-        </p:txBody>
-      </p:sp>
-      <p:pic>
-        <p:nvPicPr>
-          <p:cNvPr id="4" name="内容占位符 3"/>
-          <p:cNvPicPr>
-            <a:picLocks noGrp="1"/>
-          </p:cNvPicPr>
+            <a:r>
+              <a:rPr lang="en-US" dirty="0" smtClean="0"/>
+              <a:t>Auto Crop:: rotated shape</a:t>
+            </a:r>
+            <a:endParaRPr lang="en-SG" dirty="0"/>
+          </a:p>
+        </p:txBody>
+      </p:sp>
+      <p:sp>
+        <p:nvSpPr>
+          <p:cNvPr id="3" name="Content Placeholder 2"/>
+          <p:cNvSpPr>
+            <a:spLocks noGrp="1"/>
+          </p:cNvSpPr>
           <p:nvPr>
             <p:ph idx="1"/>
           </p:nvPr>
-        </p:nvPicPr>
-        <p:blipFill>
-          <a:blip r:embed="rId2">
-            <a:extLst>
-              <a:ext uri="{28A0092B-C50C-407E-A947-70E740481C1C}">
-                <a14:useLocalDpi xmlns:a14="http://schemas.microsoft.com/office/drawing/2010/main" val="0"/>
-              </a:ext>
-            </a:extLst>
-          </a:blip>
-          <a:stretch>
-            <a:fillRect/>
-          </a:stretch>
-        </p:blipFill>
-        <p:spPr>
-          <a:xfrm>
-            <a:off x="1074665" y="1600200"/>
-            <a:ext cx="6994670" cy="4525963"/>
-          </a:xfrm>
-        </p:spPr>
-      </p:pic>
+        </p:nvSpPr>
+        <p:spPr/>
+        <p:txBody>
+          <a:bodyPr/>
+          <a:lstStyle/>
+          <a:p>
+            <a:endParaRPr lang="en-SG" dirty="0"/>
+          </a:p>
+        </p:txBody>
+      </p:sp>
     </p:spTree>
     <p:extLst>
       <p:ext uri="{BB962C8B-B14F-4D97-AF65-F5344CB8AC3E}">
-        <p14:creationId xmlns:p14="http://schemas.microsoft.com/office/powerpoint/2010/main" val="2306293579"/>
+        <p14:creationId xmlns:p14="http://schemas.microsoft.com/office/powerpoint/2010/main" val="4026306467"/>
       </p:ext>
     </p:extLst>
   </p:cSld>
   <p:clrMapOvr>
     <a:masterClrMapping/>
   </p:clrMapOvr>
-  <mc:AlternateContent xmlns:mc="http://schemas.openxmlformats.org/markup-compatibility/2006" xmlns:p14="http://schemas.microsoft.com/office/powerpoint/2010/main">
-    <mc:Choice Requires="p14">
-      <p:transition spd="slow" p14:dur="2000"/>
-    </mc:Choice>
-    <mc:Fallback xmlns="">
-      <p:transition spd="slow"/>
-    </mc:Fallback>
-  </mc:AlternateContent>
-  <p:timing>
-    <p:tnLst>
-      <p:par>
-        <p:cTn id="1" dur="indefinite" restart="never" nodeType="tmRoot"/>
-      </p:par>
-    </p:tnLst>
-  </p:timing>
 </p:sld>
 </file>
 

</xml_diff>

<commit_message>
Support 'crop to shape' for rotated shapes #971 (#1030)
* Added support for rotated shapes

* #971 Update test and remove unused code

* #971 Remove unused code

* #971 Update rotated shapes that are out of slide

* #971 Rename variables
</commit_message>
<xml_diff>
--- a/doc/test/AutoCrop.pptx
+++ b/doc/test/AutoCrop.pptx
@@ -7,7 +7,7 @@
     <p:sldMasterId id="2147483672" r:id="rId3"/>
   </p:sldMasterIdLst>
   <p:notesMasterIdLst>
-    <p:notesMasterId r:id="rId13"/>
+    <p:notesMasterId r:id="rId16"/>
   </p:notesMasterIdLst>
   <p:sldIdLst>
     <p:sldId id="287" r:id="rId4"/>
@@ -18,7 +18,10 @@
     <p:sldId id="296" r:id="rId9"/>
     <p:sldId id="301" r:id="rId10"/>
     <p:sldId id="304" r:id="rId11"/>
-    <p:sldId id="274" r:id="rId12"/>
+    <p:sldId id="305" r:id="rId12"/>
+    <p:sldId id="306" r:id="rId13"/>
+    <p:sldId id="307" r:id="rId14"/>
+    <p:sldId id="274" r:id="rId15"/>
   </p:sldIdLst>
   <p:sldSz cx="9144000" cy="6858000" type="screen4x3"/>
   <p:notesSz cx="6858000" cy="9144000"/>
@@ -134,6 +137,9 @@
             <p14:sldId id="296"/>
             <p14:sldId id="301"/>
             <p14:sldId id="304"/>
+            <p14:sldId id="305"/>
+            <p14:sldId id="306"/>
+            <p14:sldId id="307"/>
             <p14:sldId id="274"/>
           </p14:sldIdLst>
         </p14:section>
@@ -239,7 +245,7 @@
           <a:p>
             <a:fld id="{26004F41-C1A1-4B0D-9EEE-5E3F0E5BC108}" type="datetimeFigureOut">
               <a:rPr lang="en-SG" smtClean="0"/>
-              <a:t>6/6/2015</a:t>
+              <a:t>16/5/2016</a:t>
             </a:fld>
             <a:endParaRPr lang="en-SG"/>
           </a:p>
@@ -904,7 +910,7 @@
           <a:p>
             <a:fld id="{699DC775-C286-4358-8C92-D7E584E969B3}" type="datetimeFigureOut">
               <a:rPr lang="en-US" smtClean="0"/>
-              <a:t>6/6/2015</a:t>
+              <a:t>2016/05/16</a:t>
             </a:fld>
             <a:endParaRPr lang="en-US"/>
           </a:p>
@@ -1074,7 +1080,7 @@
           <a:p>
             <a:fld id="{699DC775-C286-4358-8C92-D7E584E969B3}" type="datetimeFigureOut">
               <a:rPr lang="en-US" smtClean="0"/>
-              <a:t>6/6/2015</a:t>
+              <a:t>2016/05/16</a:t>
             </a:fld>
             <a:endParaRPr lang="en-US"/>
           </a:p>
@@ -1254,7 +1260,7 @@
           <a:p>
             <a:fld id="{699DC775-C286-4358-8C92-D7E584E969B3}" type="datetimeFigureOut">
               <a:rPr lang="en-US" smtClean="0"/>
-              <a:t>6/6/2015</a:t>
+              <a:t>2016/05/16</a:t>
             </a:fld>
             <a:endParaRPr lang="en-US"/>
           </a:p>
@@ -1496,7 +1502,7 @@
           <a:p>
             <a:fld id="{699DC775-C286-4358-8C92-D7E584E969B3}" type="datetimeFigureOut">
               <a:rPr lang="en-US" smtClean="0"/>
-              <a:t>6/6/2015</a:t>
+              <a:t>2016/05/16</a:t>
             </a:fld>
             <a:endParaRPr lang="en-US"/>
           </a:p>
@@ -1666,7 +1672,7 @@
           <a:p>
             <a:fld id="{699DC775-C286-4358-8C92-D7E584E969B3}" type="datetimeFigureOut">
               <a:rPr lang="en-US" smtClean="0"/>
-              <a:t>6/6/2015</a:t>
+              <a:t>2016/05/16</a:t>
             </a:fld>
             <a:endParaRPr lang="en-US"/>
           </a:p>
@@ -1912,7 +1918,7 @@
           <a:p>
             <a:fld id="{699DC775-C286-4358-8C92-D7E584E969B3}" type="datetimeFigureOut">
               <a:rPr lang="en-US" smtClean="0"/>
-              <a:t>6/6/2015</a:t>
+              <a:t>2016/05/16</a:t>
             </a:fld>
             <a:endParaRPr lang="en-US"/>
           </a:p>
@@ -2200,7 +2206,7 @@
           <a:p>
             <a:fld id="{699DC775-C286-4358-8C92-D7E584E969B3}" type="datetimeFigureOut">
               <a:rPr lang="en-US" smtClean="0"/>
-              <a:t>6/6/2015</a:t>
+              <a:t>2016/05/16</a:t>
             </a:fld>
             <a:endParaRPr lang="en-US"/>
           </a:p>
@@ -2622,7 +2628,7 @@
           <a:p>
             <a:fld id="{699DC775-C286-4358-8C92-D7E584E969B3}" type="datetimeFigureOut">
               <a:rPr lang="en-US" smtClean="0"/>
-              <a:t>6/6/2015</a:t>
+              <a:t>2016/05/16</a:t>
             </a:fld>
             <a:endParaRPr lang="en-US"/>
           </a:p>
@@ -2740,7 +2746,7 @@
           <a:p>
             <a:fld id="{699DC775-C286-4358-8C92-D7E584E969B3}" type="datetimeFigureOut">
               <a:rPr lang="en-US" smtClean="0"/>
-              <a:t>6/6/2015</a:t>
+              <a:t>2016/05/16</a:t>
             </a:fld>
             <a:endParaRPr lang="en-US"/>
           </a:p>
@@ -2835,7 +2841,7 @@
           <a:p>
             <a:fld id="{699DC775-C286-4358-8C92-D7E584E969B3}" type="datetimeFigureOut">
               <a:rPr lang="en-US" smtClean="0"/>
-              <a:t>6/6/2015</a:t>
+              <a:t>2016/05/16</a:t>
             </a:fld>
             <a:endParaRPr lang="en-US"/>
           </a:p>
@@ -3112,7 +3118,7 @@
           <a:p>
             <a:fld id="{699DC775-C286-4358-8C92-D7E584E969B3}" type="datetimeFigureOut">
               <a:rPr lang="en-US" smtClean="0"/>
-              <a:t>6/6/2015</a:t>
+              <a:t>2016/05/16</a:t>
             </a:fld>
             <a:endParaRPr lang="en-US"/>
           </a:p>
@@ -3282,7 +3288,7 @@
           <a:p>
             <a:fld id="{699DC775-C286-4358-8C92-D7E584E969B3}" type="datetimeFigureOut">
               <a:rPr lang="en-US" smtClean="0"/>
-              <a:t>6/6/2015</a:t>
+              <a:t>2016/05/16</a:t>
             </a:fld>
             <a:endParaRPr lang="en-US"/>
           </a:p>
@@ -3535,7 +3541,7 @@
           <a:p>
             <a:fld id="{699DC775-C286-4358-8C92-D7E584E969B3}" type="datetimeFigureOut">
               <a:rPr lang="en-US" smtClean="0"/>
-              <a:t>6/6/2015</a:t>
+              <a:t>2016/05/16</a:t>
             </a:fld>
             <a:endParaRPr lang="en-US"/>
           </a:p>
@@ -3705,7 +3711,7 @@
           <a:p>
             <a:fld id="{699DC775-C286-4358-8C92-D7E584E969B3}" type="datetimeFigureOut">
               <a:rPr lang="en-US" smtClean="0"/>
-              <a:t>6/6/2015</a:t>
+              <a:t>2016/05/16</a:t>
             </a:fld>
             <a:endParaRPr lang="en-US"/>
           </a:p>
@@ -3885,7 +3891,7 @@
           <a:p>
             <a:fld id="{699DC775-C286-4358-8C92-D7E584E969B3}" type="datetimeFigureOut">
               <a:rPr lang="en-US" smtClean="0"/>
-              <a:t>6/6/2015</a:t>
+              <a:t>2016/05/16</a:t>
             </a:fld>
             <a:endParaRPr lang="en-US"/>
           </a:p>
@@ -4135,7 +4141,7 @@
           <a:p>
             <a:fld id="{699DC775-C286-4358-8C92-D7E584E969B3}" type="datetimeFigureOut">
               <a:rPr lang="en-US" smtClean="0"/>
-              <a:t>6/6/2015</a:t>
+              <a:t>2016/05/16</a:t>
             </a:fld>
             <a:endParaRPr lang="en-US"/>
           </a:p>
@@ -4313,7 +4319,7 @@
           <a:p>
             <a:fld id="{699DC775-C286-4358-8C92-D7E584E969B3}" type="datetimeFigureOut">
               <a:rPr lang="en-US" smtClean="0"/>
-              <a:t>6/6/2015</a:t>
+              <a:t>2016/05/16</a:t>
             </a:fld>
             <a:endParaRPr lang="en-US"/>
           </a:p>
@@ -4567,7 +4573,7 @@
           <a:p>
             <a:fld id="{699DC775-C286-4358-8C92-D7E584E969B3}" type="datetimeFigureOut">
               <a:rPr lang="en-US" smtClean="0"/>
-              <a:t>6/6/2015</a:t>
+              <a:t>2016/05/16</a:t>
             </a:fld>
             <a:endParaRPr lang="en-US"/>
           </a:p>
@@ -4863,7 +4869,7 @@
           <a:p>
             <a:fld id="{699DC775-C286-4358-8C92-D7E584E969B3}" type="datetimeFigureOut">
               <a:rPr lang="en-US" smtClean="0"/>
-              <a:t>6/6/2015</a:t>
+              <a:t>2016/05/16</a:t>
             </a:fld>
             <a:endParaRPr lang="en-US"/>
           </a:p>
@@ -5293,7 +5299,7 @@
           <a:p>
             <a:fld id="{699DC775-C286-4358-8C92-D7E584E969B3}" type="datetimeFigureOut">
               <a:rPr lang="en-US" smtClean="0"/>
-              <a:t>6/6/2015</a:t>
+              <a:t>2016/05/16</a:t>
             </a:fld>
             <a:endParaRPr lang="en-US"/>
           </a:p>
@@ -5419,7 +5425,7 @@
           <a:p>
             <a:fld id="{699DC775-C286-4358-8C92-D7E584E969B3}" type="datetimeFigureOut">
               <a:rPr lang="en-US" smtClean="0"/>
-              <a:t>6/6/2015</a:t>
+              <a:t>2016/05/16</a:t>
             </a:fld>
             <a:endParaRPr lang="en-US"/>
           </a:p>
@@ -5522,7 +5528,7 @@
           <a:p>
             <a:fld id="{699DC775-C286-4358-8C92-D7E584E969B3}" type="datetimeFigureOut">
               <a:rPr lang="en-US" smtClean="0"/>
-              <a:t>6/6/2015</a:t>
+              <a:t>2016/05/16</a:t>
             </a:fld>
             <a:endParaRPr lang="en-US"/>
           </a:p>
@@ -5768,7 +5774,7 @@
           <a:p>
             <a:fld id="{699DC775-C286-4358-8C92-D7E584E969B3}" type="datetimeFigureOut">
               <a:rPr lang="en-US" smtClean="0"/>
-              <a:t>6/6/2015</a:t>
+              <a:t>2016/05/16</a:t>
             </a:fld>
             <a:endParaRPr lang="en-US"/>
           </a:p>
@@ -6053,7 +6059,7 @@
           <a:p>
             <a:fld id="{699DC775-C286-4358-8C92-D7E584E969B3}" type="datetimeFigureOut">
               <a:rPr lang="en-US" smtClean="0"/>
-              <a:t>6/6/2015</a:t>
+              <a:t>2016/05/16</a:t>
             </a:fld>
             <a:endParaRPr lang="en-US"/>
           </a:p>
@@ -6314,7 +6320,7 @@
           <a:p>
             <a:fld id="{699DC775-C286-4358-8C92-D7E584E969B3}" type="datetimeFigureOut">
               <a:rPr lang="en-US" smtClean="0"/>
-              <a:t>6/6/2015</a:t>
+              <a:t>2016/05/16</a:t>
             </a:fld>
             <a:endParaRPr lang="en-US"/>
           </a:p>
@@ -6492,7 +6498,7 @@
           <a:p>
             <a:fld id="{699DC775-C286-4358-8C92-D7E584E969B3}" type="datetimeFigureOut">
               <a:rPr lang="en-US" smtClean="0"/>
-              <a:t>6/6/2015</a:t>
+              <a:t>2016/05/16</a:t>
             </a:fld>
             <a:endParaRPr lang="en-US"/>
           </a:p>
@@ -6680,7 +6686,7 @@
           <a:p>
             <a:fld id="{699DC775-C286-4358-8C92-D7E584E969B3}" type="datetimeFigureOut">
               <a:rPr lang="en-US" smtClean="0"/>
-              <a:t>6/6/2015</a:t>
+              <a:t>2016/05/16</a:t>
             </a:fld>
             <a:endParaRPr lang="en-US"/>
           </a:p>
@@ -6968,7 +6974,7 @@
           <a:p>
             <a:fld id="{699DC775-C286-4358-8C92-D7E584E969B3}" type="datetimeFigureOut">
               <a:rPr lang="en-US" smtClean="0"/>
-              <a:t>6/6/2015</a:t>
+              <a:t>2016/05/16</a:t>
             </a:fld>
             <a:endParaRPr lang="en-US"/>
           </a:p>
@@ -7390,7 +7396,7 @@
           <a:p>
             <a:fld id="{699DC775-C286-4358-8C92-D7E584E969B3}" type="datetimeFigureOut">
               <a:rPr lang="en-US" smtClean="0"/>
-              <a:t>6/6/2015</a:t>
+              <a:t>2016/05/16</a:t>
             </a:fld>
             <a:endParaRPr lang="en-US"/>
           </a:p>
@@ -7508,7 +7514,7 @@
           <a:p>
             <a:fld id="{699DC775-C286-4358-8C92-D7E584E969B3}" type="datetimeFigureOut">
               <a:rPr lang="en-US" smtClean="0"/>
-              <a:t>6/6/2015</a:t>
+              <a:t>2016/05/16</a:t>
             </a:fld>
             <a:endParaRPr lang="en-US"/>
           </a:p>
@@ -7603,7 +7609,7 @@
           <a:p>
             <a:fld id="{699DC775-C286-4358-8C92-D7E584E969B3}" type="datetimeFigureOut">
               <a:rPr lang="en-US" smtClean="0"/>
-              <a:t>6/6/2015</a:t>
+              <a:t>2016/05/16</a:t>
             </a:fld>
             <a:endParaRPr lang="en-US"/>
           </a:p>
@@ -7880,7 +7886,7 @@
           <a:p>
             <a:fld id="{699DC775-C286-4358-8C92-D7E584E969B3}" type="datetimeFigureOut">
               <a:rPr lang="en-US" smtClean="0"/>
-              <a:t>6/6/2015</a:t>
+              <a:t>2016/05/16</a:t>
             </a:fld>
             <a:endParaRPr lang="en-US"/>
           </a:p>
@@ -8133,7 +8139,7 @@
           <a:p>
             <a:fld id="{699DC775-C286-4358-8C92-D7E584E969B3}" type="datetimeFigureOut">
               <a:rPr lang="en-US" smtClean="0"/>
-              <a:t>6/6/2015</a:t>
+              <a:t>2016/05/16</a:t>
             </a:fld>
             <a:endParaRPr lang="en-US"/>
           </a:p>
@@ -8346,7 +8352,7 @@
           <a:p>
             <a:fld id="{699DC775-C286-4358-8C92-D7E584E969B3}" type="datetimeFigureOut">
               <a:rPr lang="en-US" smtClean="0"/>
-              <a:t>6/6/2015</a:t>
+              <a:t>2016/05/16</a:t>
             </a:fld>
             <a:endParaRPr lang="en-US"/>
           </a:p>
@@ -8861,7 +8867,7 @@
           <a:p>
             <a:fld id="{699DC775-C286-4358-8C92-D7E584E969B3}" type="datetimeFigureOut">
               <a:rPr lang="en-US" smtClean="0"/>
-              <a:t>6/6/2015</a:t>
+              <a:t>2016/05/16</a:t>
             </a:fld>
             <a:endParaRPr lang="en-US"/>
           </a:p>
@@ -9374,7 +9380,7 @@
           <a:p>
             <a:fld id="{699DC775-C286-4358-8C92-D7E584E969B3}" type="datetimeFigureOut">
               <a:rPr lang="en-US" smtClean="0"/>
-              <a:t>6/6/2015</a:t>
+              <a:t>2016/05/16</a:t>
             </a:fld>
             <a:endParaRPr lang="en-US"/>
           </a:p>
@@ -9926,6 +9932,2949 @@
   <p:clrMapOvr>
     <a:masterClrMapping/>
   </p:clrMapOvr>
+</p:sld>
+</file>
+
+<file path=ppt/slides/slide10.xml><?xml version="1.0" encoding="utf-8"?>
+<p:sld xmlns:a="http://schemas.openxmlformats.org/drawingml/2006/main" xmlns:r="http://schemas.openxmlformats.org/officeDocument/2006/relationships" xmlns:p="http://schemas.openxmlformats.org/presentationml/2006/main">
+  <p:cSld>
+    <p:spTree>
+      <p:nvGrpSpPr>
+        <p:cNvPr id="1" name=""/>
+        <p:cNvGrpSpPr/>
+        <p:nvPr/>
+      </p:nvGrpSpPr>
+      <p:grpSpPr>
+        <a:xfrm>
+          <a:off x="0" y="0"/>
+          <a:ext cx="0" cy="0"/>
+          <a:chOff x="0" y="0"/>
+          <a:chExt cx="0" cy="0"/>
+        </a:xfrm>
+      </p:grpSpPr>
+      <p:pic>
+        <p:nvPicPr>
+          <p:cNvPr id="4" name="pic"/>
+          <p:cNvPicPr>
+            <a:picLocks noGrp="1" noChangeAspect="1"/>
+          </p:cNvPicPr>
+          <p:nvPr>
+            <p:ph idx="1"/>
+          </p:nvPr>
+        </p:nvPicPr>
+        <p:blipFill>
+          <a:blip r:embed="rId2">
+            <a:extLst>
+              <a:ext uri="{28A0092B-C50C-407E-A947-70E740481C1C}">
+                <a14:useLocalDpi xmlns:a14="http://schemas.microsoft.com/office/drawing/2010/main" val="0"/>
+              </a:ext>
+            </a:extLst>
+          </a:blip>
+          <a:stretch>
+            <a:fillRect/>
+          </a:stretch>
+        </p:blipFill>
+        <p:spPr>
+          <a:xfrm>
+            <a:off x="2514600" y="1219200"/>
+            <a:ext cx="4395876" cy="4351338"/>
+          </a:xfrm>
+        </p:spPr>
+      </p:pic>
+      <p:sp>
+        <p:nvSpPr>
+          <p:cNvPr id="6" name="selectMe"/>
+          <p:cNvSpPr/>
+          <p:nvPr/>
+        </p:nvSpPr>
+        <p:spPr>
+          <a:xfrm rot="705292">
+            <a:off x="2514600" y="1219200"/>
+            <a:ext cx="4094440" cy="4254500"/>
+          </a:xfrm>
+          <a:custGeom>
+            <a:avLst/>
+            <a:gdLst>
+              <a:gd name="connsiteX0" fmla="*/ 1968500 w 4094440"/>
+              <a:gd name="connsiteY0" fmla="*/ 139700 h 4254500"/>
+              <a:gd name="connsiteX1" fmla="*/ 1968500 w 4094440"/>
+              <a:gd name="connsiteY1" fmla="*/ 139700 h 4254500"/>
+              <a:gd name="connsiteX2" fmla="*/ 1854200 w 4094440"/>
+              <a:gd name="connsiteY2" fmla="*/ 152400 h 4254500"/>
+              <a:gd name="connsiteX3" fmla="*/ 1714500 w 4094440"/>
+              <a:gd name="connsiteY3" fmla="*/ 177800 h 4254500"/>
+              <a:gd name="connsiteX4" fmla="*/ 1638300 w 4094440"/>
+              <a:gd name="connsiteY4" fmla="*/ 203200 h 4254500"/>
+              <a:gd name="connsiteX5" fmla="*/ 1600200 w 4094440"/>
+              <a:gd name="connsiteY5" fmla="*/ 215900 h 4254500"/>
+              <a:gd name="connsiteX6" fmla="*/ 1524000 w 4094440"/>
+              <a:gd name="connsiteY6" fmla="*/ 254000 h 4254500"/>
+              <a:gd name="connsiteX7" fmla="*/ 1409700 w 4094440"/>
+              <a:gd name="connsiteY7" fmla="*/ 304800 h 4254500"/>
+              <a:gd name="connsiteX8" fmla="*/ 1282700 w 4094440"/>
+              <a:gd name="connsiteY8" fmla="*/ 330200 h 4254500"/>
+              <a:gd name="connsiteX9" fmla="*/ 1168400 w 4094440"/>
+              <a:gd name="connsiteY9" fmla="*/ 355600 h 4254500"/>
+              <a:gd name="connsiteX10" fmla="*/ 1079500 w 4094440"/>
+              <a:gd name="connsiteY10" fmla="*/ 368300 h 4254500"/>
+              <a:gd name="connsiteX11" fmla="*/ 1003300 w 4094440"/>
+              <a:gd name="connsiteY11" fmla="*/ 406400 h 4254500"/>
+              <a:gd name="connsiteX12" fmla="*/ 965200 w 4094440"/>
+              <a:gd name="connsiteY12" fmla="*/ 444500 h 4254500"/>
+              <a:gd name="connsiteX13" fmla="*/ 889000 w 4094440"/>
+              <a:gd name="connsiteY13" fmla="*/ 508000 h 4254500"/>
+              <a:gd name="connsiteX14" fmla="*/ 863600 w 4094440"/>
+              <a:gd name="connsiteY14" fmla="*/ 546100 h 4254500"/>
+              <a:gd name="connsiteX15" fmla="*/ 787400 w 4094440"/>
+              <a:gd name="connsiteY15" fmla="*/ 622300 h 4254500"/>
+              <a:gd name="connsiteX16" fmla="*/ 711200 w 4094440"/>
+              <a:gd name="connsiteY16" fmla="*/ 673100 h 4254500"/>
+              <a:gd name="connsiteX17" fmla="*/ 685800 w 4094440"/>
+              <a:gd name="connsiteY17" fmla="*/ 723900 h 4254500"/>
+              <a:gd name="connsiteX18" fmla="*/ 635000 w 4094440"/>
+              <a:gd name="connsiteY18" fmla="*/ 800100 h 4254500"/>
+              <a:gd name="connsiteX19" fmla="*/ 584200 w 4094440"/>
+              <a:gd name="connsiteY19" fmla="*/ 876300 h 4254500"/>
+              <a:gd name="connsiteX20" fmla="*/ 520700 w 4094440"/>
+              <a:gd name="connsiteY20" fmla="*/ 990600 h 4254500"/>
+              <a:gd name="connsiteX21" fmla="*/ 482600 w 4094440"/>
+              <a:gd name="connsiteY21" fmla="*/ 1016000 h 4254500"/>
+              <a:gd name="connsiteX22" fmla="*/ 457200 w 4094440"/>
+              <a:gd name="connsiteY22" fmla="*/ 1092200 h 4254500"/>
+              <a:gd name="connsiteX23" fmla="*/ 431800 w 4094440"/>
+              <a:gd name="connsiteY23" fmla="*/ 1130300 h 4254500"/>
+              <a:gd name="connsiteX24" fmla="*/ 419100 w 4094440"/>
+              <a:gd name="connsiteY24" fmla="*/ 1168400 h 4254500"/>
+              <a:gd name="connsiteX25" fmla="*/ 368300 w 4094440"/>
+              <a:gd name="connsiteY25" fmla="*/ 1244600 h 4254500"/>
+              <a:gd name="connsiteX26" fmla="*/ 342900 w 4094440"/>
+              <a:gd name="connsiteY26" fmla="*/ 1282700 h 4254500"/>
+              <a:gd name="connsiteX27" fmla="*/ 292100 w 4094440"/>
+              <a:gd name="connsiteY27" fmla="*/ 1397000 h 4254500"/>
+              <a:gd name="connsiteX28" fmla="*/ 266700 w 4094440"/>
+              <a:gd name="connsiteY28" fmla="*/ 1485900 h 4254500"/>
+              <a:gd name="connsiteX29" fmla="*/ 215900 w 4094440"/>
+              <a:gd name="connsiteY29" fmla="*/ 1574800 h 4254500"/>
+              <a:gd name="connsiteX30" fmla="*/ 177800 w 4094440"/>
+              <a:gd name="connsiteY30" fmla="*/ 1701800 h 4254500"/>
+              <a:gd name="connsiteX31" fmla="*/ 165100 w 4094440"/>
+              <a:gd name="connsiteY31" fmla="*/ 1739900 h 4254500"/>
+              <a:gd name="connsiteX32" fmla="*/ 152400 w 4094440"/>
+              <a:gd name="connsiteY32" fmla="*/ 1803400 h 4254500"/>
+              <a:gd name="connsiteX33" fmla="*/ 127000 w 4094440"/>
+              <a:gd name="connsiteY33" fmla="*/ 1854200 h 4254500"/>
+              <a:gd name="connsiteX34" fmla="*/ 114300 w 4094440"/>
+              <a:gd name="connsiteY34" fmla="*/ 1905000 h 4254500"/>
+              <a:gd name="connsiteX35" fmla="*/ 88900 w 4094440"/>
+              <a:gd name="connsiteY35" fmla="*/ 1993900 h 4254500"/>
+              <a:gd name="connsiteX36" fmla="*/ 76200 w 4094440"/>
+              <a:gd name="connsiteY36" fmla="*/ 2057400 h 4254500"/>
+              <a:gd name="connsiteX37" fmla="*/ 38100 w 4094440"/>
+              <a:gd name="connsiteY37" fmla="*/ 2197100 h 4254500"/>
+              <a:gd name="connsiteX38" fmla="*/ 25400 w 4094440"/>
+              <a:gd name="connsiteY38" fmla="*/ 2298700 h 4254500"/>
+              <a:gd name="connsiteX39" fmla="*/ 12700 w 4094440"/>
+              <a:gd name="connsiteY39" fmla="*/ 2527300 h 4254500"/>
+              <a:gd name="connsiteX40" fmla="*/ 0 w 4094440"/>
+              <a:gd name="connsiteY40" fmla="*/ 2705100 h 4254500"/>
+              <a:gd name="connsiteX41" fmla="*/ 12700 w 4094440"/>
+              <a:gd name="connsiteY41" fmla="*/ 3086100 h 4254500"/>
+              <a:gd name="connsiteX42" fmla="*/ 50800 w 4094440"/>
+              <a:gd name="connsiteY42" fmla="*/ 3225800 h 4254500"/>
+              <a:gd name="connsiteX43" fmla="*/ 88900 w 4094440"/>
+              <a:gd name="connsiteY43" fmla="*/ 3352800 h 4254500"/>
+              <a:gd name="connsiteX44" fmla="*/ 114300 w 4094440"/>
+              <a:gd name="connsiteY44" fmla="*/ 3390900 h 4254500"/>
+              <a:gd name="connsiteX45" fmla="*/ 139700 w 4094440"/>
+              <a:gd name="connsiteY45" fmla="*/ 3479800 h 4254500"/>
+              <a:gd name="connsiteX46" fmla="*/ 190500 w 4094440"/>
+              <a:gd name="connsiteY46" fmla="*/ 3606800 h 4254500"/>
+              <a:gd name="connsiteX47" fmla="*/ 215900 w 4094440"/>
+              <a:gd name="connsiteY47" fmla="*/ 3708400 h 4254500"/>
+              <a:gd name="connsiteX48" fmla="*/ 241300 w 4094440"/>
+              <a:gd name="connsiteY48" fmla="*/ 3797300 h 4254500"/>
+              <a:gd name="connsiteX49" fmla="*/ 266700 w 4094440"/>
+              <a:gd name="connsiteY49" fmla="*/ 3835400 h 4254500"/>
+              <a:gd name="connsiteX50" fmla="*/ 292100 w 4094440"/>
+              <a:gd name="connsiteY50" fmla="*/ 3911600 h 4254500"/>
+              <a:gd name="connsiteX51" fmla="*/ 342900 w 4094440"/>
+              <a:gd name="connsiteY51" fmla="*/ 3987800 h 4254500"/>
+              <a:gd name="connsiteX52" fmla="*/ 381000 w 4094440"/>
+              <a:gd name="connsiteY52" fmla="*/ 4064000 h 4254500"/>
+              <a:gd name="connsiteX53" fmla="*/ 419100 w 4094440"/>
+              <a:gd name="connsiteY53" fmla="*/ 4076700 h 4254500"/>
+              <a:gd name="connsiteX54" fmla="*/ 457200 w 4094440"/>
+              <a:gd name="connsiteY54" fmla="*/ 4102100 h 4254500"/>
+              <a:gd name="connsiteX55" fmla="*/ 1155700 w 4094440"/>
+              <a:gd name="connsiteY55" fmla="*/ 4127500 h 4254500"/>
+              <a:gd name="connsiteX56" fmla="*/ 1219200 w 4094440"/>
+              <a:gd name="connsiteY56" fmla="*/ 4140200 h 4254500"/>
+              <a:gd name="connsiteX57" fmla="*/ 1295400 w 4094440"/>
+              <a:gd name="connsiteY57" fmla="*/ 4152900 h 4254500"/>
+              <a:gd name="connsiteX58" fmla="*/ 1422400 w 4094440"/>
+              <a:gd name="connsiteY58" fmla="*/ 4203700 h 4254500"/>
+              <a:gd name="connsiteX59" fmla="*/ 1562100 w 4094440"/>
+              <a:gd name="connsiteY59" fmla="*/ 4229100 h 4254500"/>
+              <a:gd name="connsiteX60" fmla="*/ 2273300 w 4094440"/>
+              <a:gd name="connsiteY60" fmla="*/ 4229100 h 4254500"/>
+              <a:gd name="connsiteX61" fmla="*/ 2311400 w 4094440"/>
+              <a:gd name="connsiteY61" fmla="*/ 4241800 h 4254500"/>
+              <a:gd name="connsiteX62" fmla="*/ 2387600 w 4094440"/>
+              <a:gd name="connsiteY62" fmla="*/ 4254500 h 4254500"/>
+              <a:gd name="connsiteX63" fmla="*/ 2971800 w 4094440"/>
+              <a:gd name="connsiteY63" fmla="*/ 4241800 h 4254500"/>
+              <a:gd name="connsiteX64" fmla="*/ 3022600 w 4094440"/>
+              <a:gd name="connsiteY64" fmla="*/ 4229100 h 4254500"/>
+              <a:gd name="connsiteX65" fmla="*/ 3441700 w 4094440"/>
+              <a:gd name="connsiteY65" fmla="*/ 4216400 h 4254500"/>
+              <a:gd name="connsiteX66" fmla="*/ 3530600 w 4094440"/>
+              <a:gd name="connsiteY66" fmla="*/ 4140200 h 4254500"/>
+              <a:gd name="connsiteX67" fmla="*/ 3568700 w 4094440"/>
+              <a:gd name="connsiteY67" fmla="*/ 4076700 h 4254500"/>
+              <a:gd name="connsiteX68" fmla="*/ 3619500 w 4094440"/>
+              <a:gd name="connsiteY68" fmla="*/ 4000500 h 4254500"/>
+              <a:gd name="connsiteX69" fmla="*/ 3695700 w 4094440"/>
+              <a:gd name="connsiteY69" fmla="*/ 3860800 h 4254500"/>
+              <a:gd name="connsiteX70" fmla="*/ 3708400 w 4094440"/>
+              <a:gd name="connsiteY70" fmla="*/ 3810000 h 4254500"/>
+              <a:gd name="connsiteX71" fmla="*/ 3733800 w 4094440"/>
+              <a:gd name="connsiteY71" fmla="*/ 3771900 h 4254500"/>
+              <a:gd name="connsiteX72" fmla="*/ 3746500 w 4094440"/>
+              <a:gd name="connsiteY72" fmla="*/ 3695700 h 4254500"/>
+              <a:gd name="connsiteX73" fmla="*/ 3771900 w 4094440"/>
+              <a:gd name="connsiteY73" fmla="*/ 3644900 h 4254500"/>
+              <a:gd name="connsiteX74" fmla="*/ 3784600 w 4094440"/>
+              <a:gd name="connsiteY74" fmla="*/ 3606800 h 4254500"/>
+              <a:gd name="connsiteX75" fmla="*/ 3810000 w 4094440"/>
+              <a:gd name="connsiteY75" fmla="*/ 3556000 h 4254500"/>
+              <a:gd name="connsiteX76" fmla="*/ 3835400 w 4094440"/>
+              <a:gd name="connsiteY76" fmla="*/ 3479800 h 4254500"/>
+              <a:gd name="connsiteX77" fmla="*/ 3898900 w 4094440"/>
+              <a:gd name="connsiteY77" fmla="*/ 3365500 h 4254500"/>
+              <a:gd name="connsiteX78" fmla="*/ 3937000 w 4094440"/>
+              <a:gd name="connsiteY78" fmla="*/ 3314700 h 4254500"/>
+              <a:gd name="connsiteX79" fmla="*/ 3975100 w 4094440"/>
+              <a:gd name="connsiteY79" fmla="*/ 3238500 h 4254500"/>
+              <a:gd name="connsiteX80" fmla="*/ 4013200 w 4094440"/>
+              <a:gd name="connsiteY80" fmla="*/ 3124200 h 4254500"/>
+              <a:gd name="connsiteX81" fmla="*/ 4064000 w 4094440"/>
+              <a:gd name="connsiteY81" fmla="*/ 3009900 h 4254500"/>
+              <a:gd name="connsiteX82" fmla="*/ 4076700 w 4094440"/>
+              <a:gd name="connsiteY82" fmla="*/ 2603500 h 4254500"/>
+              <a:gd name="connsiteX83" fmla="*/ 4064000 w 4094440"/>
+              <a:gd name="connsiteY83" fmla="*/ 2260600 h 4254500"/>
+              <a:gd name="connsiteX84" fmla="*/ 4038600 w 4094440"/>
+              <a:gd name="connsiteY84" fmla="*/ 2222500 h 4254500"/>
+              <a:gd name="connsiteX85" fmla="*/ 4013200 w 4094440"/>
+              <a:gd name="connsiteY85" fmla="*/ 2146300 h 4254500"/>
+              <a:gd name="connsiteX86" fmla="*/ 4000500 w 4094440"/>
+              <a:gd name="connsiteY86" fmla="*/ 2095500 h 4254500"/>
+              <a:gd name="connsiteX87" fmla="*/ 3949700 w 4094440"/>
+              <a:gd name="connsiteY87" fmla="*/ 2019300 h 4254500"/>
+              <a:gd name="connsiteX88" fmla="*/ 3924300 w 4094440"/>
+              <a:gd name="connsiteY88" fmla="*/ 1943100 h 4254500"/>
+              <a:gd name="connsiteX89" fmla="*/ 3898900 w 4094440"/>
+              <a:gd name="connsiteY89" fmla="*/ 1905000 h 4254500"/>
+              <a:gd name="connsiteX90" fmla="*/ 3873500 w 4094440"/>
+              <a:gd name="connsiteY90" fmla="*/ 1828800 h 4254500"/>
+              <a:gd name="connsiteX91" fmla="*/ 3835400 w 4094440"/>
+              <a:gd name="connsiteY91" fmla="*/ 1727200 h 4254500"/>
+              <a:gd name="connsiteX92" fmla="*/ 3822700 w 4094440"/>
+              <a:gd name="connsiteY92" fmla="*/ 1689100 h 4254500"/>
+              <a:gd name="connsiteX93" fmla="*/ 3797300 w 4094440"/>
+              <a:gd name="connsiteY93" fmla="*/ 1625600 h 4254500"/>
+              <a:gd name="connsiteX94" fmla="*/ 3784600 w 4094440"/>
+              <a:gd name="connsiteY94" fmla="*/ 1587500 h 4254500"/>
+              <a:gd name="connsiteX95" fmla="*/ 3759200 w 4094440"/>
+              <a:gd name="connsiteY95" fmla="*/ 1549400 h 4254500"/>
+              <a:gd name="connsiteX96" fmla="*/ 3721100 w 4094440"/>
+              <a:gd name="connsiteY96" fmla="*/ 1447800 h 4254500"/>
+              <a:gd name="connsiteX97" fmla="*/ 3695700 w 4094440"/>
+              <a:gd name="connsiteY97" fmla="*/ 1371600 h 4254500"/>
+              <a:gd name="connsiteX98" fmla="*/ 3683000 w 4094440"/>
+              <a:gd name="connsiteY98" fmla="*/ 1333500 h 4254500"/>
+              <a:gd name="connsiteX99" fmla="*/ 3657600 w 4094440"/>
+              <a:gd name="connsiteY99" fmla="*/ 1295400 h 4254500"/>
+              <a:gd name="connsiteX100" fmla="*/ 3632200 w 4094440"/>
+              <a:gd name="connsiteY100" fmla="*/ 1231900 h 4254500"/>
+              <a:gd name="connsiteX101" fmla="*/ 3619500 w 4094440"/>
+              <a:gd name="connsiteY101" fmla="*/ 1181100 h 4254500"/>
+              <a:gd name="connsiteX102" fmla="*/ 3594100 w 4094440"/>
+              <a:gd name="connsiteY102" fmla="*/ 1143000 h 4254500"/>
+              <a:gd name="connsiteX103" fmla="*/ 3530600 w 4094440"/>
+              <a:gd name="connsiteY103" fmla="*/ 1016000 h 4254500"/>
+              <a:gd name="connsiteX104" fmla="*/ 3505200 w 4094440"/>
+              <a:gd name="connsiteY104" fmla="*/ 901700 h 4254500"/>
+              <a:gd name="connsiteX105" fmla="*/ 3492500 w 4094440"/>
+              <a:gd name="connsiteY105" fmla="*/ 850900 h 4254500"/>
+              <a:gd name="connsiteX106" fmla="*/ 3467100 w 4094440"/>
+              <a:gd name="connsiteY106" fmla="*/ 812800 h 4254500"/>
+              <a:gd name="connsiteX107" fmla="*/ 3429000 w 4094440"/>
+              <a:gd name="connsiteY107" fmla="*/ 723900 h 4254500"/>
+              <a:gd name="connsiteX108" fmla="*/ 3416300 w 4094440"/>
+              <a:gd name="connsiteY108" fmla="*/ 685800 h 4254500"/>
+              <a:gd name="connsiteX109" fmla="*/ 3340100 w 4094440"/>
+              <a:gd name="connsiteY109" fmla="*/ 584200 h 4254500"/>
+              <a:gd name="connsiteX110" fmla="*/ 3225800 w 4094440"/>
+              <a:gd name="connsiteY110" fmla="*/ 495300 h 4254500"/>
+              <a:gd name="connsiteX111" fmla="*/ 3162300 w 4094440"/>
+              <a:gd name="connsiteY111" fmla="*/ 431800 h 4254500"/>
+              <a:gd name="connsiteX112" fmla="*/ 3111500 w 4094440"/>
+              <a:gd name="connsiteY112" fmla="*/ 406400 h 4254500"/>
+              <a:gd name="connsiteX113" fmla="*/ 3060700 w 4094440"/>
+              <a:gd name="connsiteY113" fmla="*/ 355600 h 4254500"/>
+              <a:gd name="connsiteX114" fmla="*/ 2946400 w 4094440"/>
+              <a:gd name="connsiteY114" fmla="*/ 279400 h 4254500"/>
+              <a:gd name="connsiteX115" fmla="*/ 2857500 w 4094440"/>
+              <a:gd name="connsiteY115" fmla="*/ 215900 h 4254500"/>
+              <a:gd name="connsiteX116" fmla="*/ 2781300 w 4094440"/>
+              <a:gd name="connsiteY116" fmla="*/ 190500 h 4254500"/>
+              <a:gd name="connsiteX117" fmla="*/ 2743200 w 4094440"/>
+              <a:gd name="connsiteY117" fmla="*/ 165100 h 4254500"/>
+              <a:gd name="connsiteX118" fmla="*/ 2705100 w 4094440"/>
+              <a:gd name="connsiteY118" fmla="*/ 127000 h 4254500"/>
+              <a:gd name="connsiteX119" fmla="*/ 2667000 w 4094440"/>
+              <a:gd name="connsiteY119" fmla="*/ 114300 h 4254500"/>
+              <a:gd name="connsiteX120" fmla="*/ 2590800 w 4094440"/>
+              <a:gd name="connsiteY120" fmla="*/ 50800 h 4254500"/>
+              <a:gd name="connsiteX121" fmla="*/ 2552700 w 4094440"/>
+              <a:gd name="connsiteY121" fmla="*/ 38100 h 4254500"/>
+              <a:gd name="connsiteX122" fmla="*/ 2463800 w 4094440"/>
+              <a:gd name="connsiteY122" fmla="*/ 0 h 4254500"/>
+              <a:gd name="connsiteX123" fmla="*/ 2298700 w 4094440"/>
+              <a:gd name="connsiteY123" fmla="*/ 25400 h 4254500"/>
+              <a:gd name="connsiteX124" fmla="*/ 2260600 w 4094440"/>
+              <a:gd name="connsiteY124" fmla="*/ 50800 h 4254500"/>
+              <a:gd name="connsiteX125" fmla="*/ 2222500 w 4094440"/>
+              <a:gd name="connsiteY125" fmla="*/ 63500 h 4254500"/>
+              <a:gd name="connsiteX126" fmla="*/ 2184400 w 4094440"/>
+              <a:gd name="connsiteY126" fmla="*/ 88900 h 4254500"/>
+              <a:gd name="connsiteX127" fmla="*/ 2146300 w 4094440"/>
+              <a:gd name="connsiteY127" fmla="*/ 101600 h 4254500"/>
+              <a:gd name="connsiteX128" fmla="*/ 2108200 w 4094440"/>
+              <a:gd name="connsiteY128" fmla="*/ 127000 h 4254500"/>
+              <a:gd name="connsiteX129" fmla="*/ 1968500 w 4094440"/>
+              <a:gd name="connsiteY129" fmla="*/ 139700 h 4254500"/>
+            </a:gdLst>
+            <a:ahLst/>
+            <a:cxnLst>
+              <a:cxn ang="0">
+                <a:pos x="connsiteX0" y="connsiteY0"/>
+              </a:cxn>
+              <a:cxn ang="0">
+                <a:pos x="connsiteX1" y="connsiteY1"/>
+              </a:cxn>
+              <a:cxn ang="0">
+                <a:pos x="connsiteX2" y="connsiteY2"/>
+              </a:cxn>
+              <a:cxn ang="0">
+                <a:pos x="connsiteX3" y="connsiteY3"/>
+              </a:cxn>
+              <a:cxn ang="0">
+                <a:pos x="connsiteX4" y="connsiteY4"/>
+              </a:cxn>
+              <a:cxn ang="0">
+                <a:pos x="connsiteX5" y="connsiteY5"/>
+              </a:cxn>
+              <a:cxn ang="0">
+                <a:pos x="connsiteX6" y="connsiteY6"/>
+              </a:cxn>
+              <a:cxn ang="0">
+                <a:pos x="connsiteX7" y="connsiteY7"/>
+              </a:cxn>
+              <a:cxn ang="0">
+                <a:pos x="connsiteX8" y="connsiteY8"/>
+              </a:cxn>
+              <a:cxn ang="0">
+                <a:pos x="connsiteX9" y="connsiteY9"/>
+              </a:cxn>
+              <a:cxn ang="0">
+                <a:pos x="connsiteX10" y="connsiteY10"/>
+              </a:cxn>
+              <a:cxn ang="0">
+                <a:pos x="connsiteX11" y="connsiteY11"/>
+              </a:cxn>
+              <a:cxn ang="0">
+                <a:pos x="connsiteX12" y="connsiteY12"/>
+              </a:cxn>
+              <a:cxn ang="0">
+                <a:pos x="connsiteX13" y="connsiteY13"/>
+              </a:cxn>
+              <a:cxn ang="0">
+                <a:pos x="connsiteX14" y="connsiteY14"/>
+              </a:cxn>
+              <a:cxn ang="0">
+                <a:pos x="connsiteX15" y="connsiteY15"/>
+              </a:cxn>
+              <a:cxn ang="0">
+                <a:pos x="connsiteX16" y="connsiteY16"/>
+              </a:cxn>
+              <a:cxn ang="0">
+                <a:pos x="connsiteX17" y="connsiteY17"/>
+              </a:cxn>
+              <a:cxn ang="0">
+                <a:pos x="connsiteX18" y="connsiteY18"/>
+              </a:cxn>
+              <a:cxn ang="0">
+                <a:pos x="connsiteX19" y="connsiteY19"/>
+              </a:cxn>
+              <a:cxn ang="0">
+                <a:pos x="connsiteX20" y="connsiteY20"/>
+              </a:cxn>
+              <a:cxn ang="0">
+                <a:pos x="connsiteX21" y="connsiteY21"/>
+              </a:cxn>
+              <a:cxn ang="0">
+                <a:pos x="connsiteX22" y="connsiteY22"/>
+              </a:cxn>
+              <a:cxn ang="0">
+                <a:pos x="connsiteX23" y="connsiteY23"/>
+              </a:cxn>
+              <a:cxn ang="0">
+                <a:pos x="connsiteX24" y="connsiteY24"/>
+              </a:cxn>
+              <a:cxn ang="0">
+                <a:pos x="connsiteX25" y="connsiteY25"/>
+              </a:cxn>
+              <a:cxn ang="0">
+                <a:pos x="connsiteX26" y="connsiteY26"/>
+              </a:cxn>
+              <a:cxn ang="0">
+                <a:pos x="connsiteX27" y="connsiteY27"/>
+              </a:cxn>
+              <a:cxn ang="0">
+                <a:pos x="connsiteX28" y="connsiteY28"/>
+              </a:cxn>
+              <a:cxn ang="0">
+                <a:pos x="connsiteX29" y="connsiteY29"/>
+              </a:cxn>
+              <a:cxn ang="0">
+                <a:pos x="connsiteX30" y="connsiteY30"/>
+              </a:cxn>
+              <a:cxn ang="0">
+                <a:pos x="connsiteX31" y="connsiteY31"/>
+              </a:cxn>
+              <a:cxn ang="0">
+                <a:pos x="connsiteX32" y="connsiteY32"/>
+              </a:cxn>
+              <a:cxn ang="0">
+                <a:pos x="connsiteX33" y="connsiteY33"/>
+              </a:cxn>
+              <a:cxn ang="0">
+                <a:pos x="connsiteX34" y="connsiteY34"/>
+              </a:cxn>
+              <a:cxn ang="0">
+                <a:pos x="connsiteX35" y="connsiteY35"/>
+              </a:cxn>
+              <a:cxn ang="0">
+                <a:pos x="connsiteX36" y="connsiteY36"/>
+              </a:cxn>
+              <a:cxn ang="0">
+                <a:pos x="connsiteX37" y="connsiteY37"/>
+              </a:cxn>
+              <a:cxn ang="0">
+                <a:pos x="connsiteX38" y="connsiteY38"/>
+              </a:cxn>
+              <a:cxn ang="0">
+                <a:pos x="connsiteX39" y="connsiteY39"/>
+              </a:cxn>
+              <a:cxn ang="0">
+                <a:pos x="connsiteX40" y="connsiteY40"/>
+              </a:cxn>
+              <a:cxn ang="0">
+                <a:pos x="connsiteX41" y="connsiteY41"/>
+              </a:cxn>
+              <a:cxn ang="0">
+                <a:pos x="connsiteX42" y="connsiteY42"/>
+              </a:cxn>
+              <a:cxn ang="0">
+                <a:pos x="connsiteX43" y="connsiteY43"/>
+              </a:cxn>
+              <a:cxn ang="0">
+                <a:pos x="connsiteX44" y="connsiteY44"/>
+              </a:cxn>
+              <a:cxn ang="0">
+                <a:pos x="connsiteX45" y="connsiteY45"/>
+              </a:cxn>
+              <a:cxn ang="0">
+                <a:pos x="connsiteX46" y="connsiteY46"/>
+              </a:cxn>
+              <a:cxn ang="0">
+                <a:pos x="connsiteX47" y="connsiteY47"/>
+              </a:cxn>
+              <a:cxn ang="0">
+                <a:pos x="connsiteX48" y="connsiteY48"/>
+              </a:cxn>
+              <a:cxn ang="0">
+                <a:pos x="connsiteX49" y="connsiteY49"/>
+              </a:cxn>
+              <a:cxn ang="0">
+                <a:pos x="connsiteX50" y="connsiteY50"/>
+              </a:cxn>
+              <a:cxn ang="0">
+                <a:pos x="connsiteX51" y="connsiteY51"/>
+              </a:cxn>
+              <a:cxn ang="0">
+                <a:pos x="connsiteX52" y="connsiteY52"/>
+              </a:cxn>
+              <a:cxn ang="0">
+                <a:pos x="connsiteX53" y="connsiteY53"/>
+              </a:cxn>
+              <a:cxn ang="0">
+                <a:pos x="connsiteX54" y="connsiteY54"/>
+              </a:cxn>
+              <a:cxn ang="0">
+                <a:pos x="connsiteX55" y="connsiteY55"/>
+              </a:cxn>
+              <a:cxn ang="0">
+                <a:pos x="connsiteX56" y="connsiteY56"/>
+              </a:cxn>
+              <a:cxn ang="0">
+                <a:pos x="connsiteX57" y="connsiteY57"/>
+              </a:cxn>
+              <a:cxn ang="0">
+                <a:pos x="connsiteX58" y="connsiteY58"/>
+              </a:cxn>
+              <a:cxn ang="0">
+                <a:pos x="connsiteX59" y="connsiteY59"/>
+              </a:cxn>
+              <a:cxn ang="0">
+                <a:pos x="connsiteX60" y="connsiteY60"/>
+              </a:cxn>
+              <a:cxn ang="0">
+                <a:pos x="connsiteX61" y="connsiteY61"/>
+              </a:cxn>
+              <a:cxn ang="0">
+                <a:pos x="connsiteX62" y="connsiteY62"/>
+              </a:cxn>
+              <a:cxn ang="0">
+                <a:pos x="connsiteX63" y="connsiteY63"/>
+              </a:cxn>
+              <a:cxn ang="0">
+                <a:pos x="connsiteX64" y="connsiteY64"/>
+              </a:cxn>
+              <a:cxn ang="0">
+                <a:pos x="connsiteX65" y="connsiteY65"/>
+              </a:cxn>
+              <a:cxn ang="0">
+                <a:pos x="connsiteX66" y="connsiteY66"/>
+              </a:cxn>
+              <a:cxn ang="0">
+                <a:pos x="connsiteX67" y="connsiteY67"/>
+              </a:cxn>
+              <a:cxn ang="0">
+                <a:pos x="connsiteX68" y="connsiteY68"/>
+              </a:cxn>
+              <a:cxn ang="0">
+                <a:pos x="connsiteX69" y="connsiteY69"/>
+              </a:cxn>
+              <a:cxn ang="0">
+                <a:pos x="connsiteX70" y="connsiteY70"/>
+              </a:cxn>
+              <a:cxn ang="0">
+                <a:pos x="connsiteX71" y="connsiteY71"/>
+              </a:cxn>
+              <a:cxn ang="0">
+                <a:pos x="connsiteX72" y="connsiteY72"/>
+              </a:cxn>
+              <a:cxn ang="0">
+                <a:pos x="connsiteX73" y="connsiteY73"/>
+              </a:cxn>
+              <a:cxn ang="0">
+                <a:pos x="connsiteX74" y="connsiteY74"/>
+              </a:cxn>
+              <a:cxn ang="0">
+                <a:pos x="connsiteX75" y="connsiteY75"/>
+              </a:cxn>
+              <a:cxn ang="0">
+                <a:pos x="connsiteX76" y="connsiteY76"/>
+              </a:cxn>
+              <a:cxn ang="0">
+                <a:pos x="connsiteX77" y="connsiteY77"/>
+              </a:cxn>
+              <a:cxn ang="0">
+                <a:pos x="connsiteX78" y="connsiteY78"/>
+              </a:cxn>
+              <a:cxn ang="0">
+                <a:pos x="connsiteX79" y="connsiteY79"/>
+              </a:cxn>
+              <a:cxn ang="0">
+                <a:pos x="connsiteX80" y="connsiteY80"/>
+              </a:cxn>
+              <a:cxn ang="0">
+                <a:pos x="connsiteX81" y="connsiteY81"/>
+              </a:cxn>
+              <a:cxn ang="0">
+                <a:pos x="connsiteX82" y="connsiteY82"/>
+              </a:cxn>
+              <a:cxn ang="0">
+                <a:pos x="connsiteX83" y="connsiteY83"/>
+              </a:cxn>
+              <a:cxn ang="0">
+                <a:pos x="connsiteX84" y="connsiteY84"/>
+              </a:cxn>
+              <a:cxn ang="0">
+                <a:pos x="connsiteX85" y="connsiteY85"/>
+              </a:cxn>
+              <a:cxn ang="0">
+                <a:pos x="connsiteX86" y="connsiteY86"/>
+              </a:cxn>
+              <a:cxn ang="0">
+                <a:pos x="connsiteX87" y="connsiteY87"/>
+              </a:cxn>
+              <a:cxn ang="0">
+                <a:pos x="connsiteX88" y="connsiteY88"/>
+              </a:cxn>
+              <a:cxn ang="0">
+                <a:pos x="connsiteX89" y="connsiteY89"/>
+              </a:cxn>
+              <a:cxn ang="0">
+                <a:pos x="connsiteX90" y="connsiteY90"/>
+              </a:cxn>
+              <a:cxn ang="0">
+                <a:pos x="connsiteX91" y="connsiteY91"/>
+              </a:cxn>
+              <a:cxn ang="0">
+                <a:pos x="connsiteX92" y="connsiteY92"/>
+              </a:cxn>
+              <a:cxn ang="0">
+                <a:pos x="connsiteX93" y="connsiteY93"/>
+              </a:cxn>
+              <a:cxn ang="0">
+                <a:pos x="connsiteX94" y="connsiteY94"/>
+              </a:cxn>
+              <a:cxn ang="0">
+                <a:pos x="connsiteX95" y="connsiteY95"/>
+              </a:cxn>
+              <a:cxn ang="0">
+                <a:pos x="connsiteX96" y="connsiteY96"/>
+              </a:cxn>
+              <a:cxn ang="0">
+                <a:pos x="connsiteX97" y="connsiteY97"/>
+              </a:cxn>
+              <a:cxn ang="0">
+                <a:pos x="connsiteX98" y="connsiteY98"/>
+              </a:cxn>
+              <a:cxn ang="0">
+                <a:pos x="connsiteX99" y="connsiteY99"/>
+              </a:cxn>
+              <a:cxn ang="0">
+                <a:pos x="connsiteX100" y="connsiteY100"/>
+              </a:cxn>
+              <a:cxn ang="0">
+                <a:pos x="connsiteX101" y="connsiteY101"/>
+              </a:cxn>
+              <a:cxn ang="0">
+                <a:pos x="connsiteX102" y="connsiteY102"/>
+              </a:cxn>
+              <a:cxn ang="0">
+                <a:pos x="connsiteX103" y="connsiteY103"/>
+              </a:cxn>
+              <a:cxn ang="0">
+                <a:pos x="connsiteX104" y="connsiteY104"/>
+              </a:cxn>
+              <a:cxn ang="0">
+                <a:pos x="connsiteX105" y="connsiteY105"/>
+              </a:cxn>
+              <a:cxn ang="0">
+                <a:pos x="connsiteX106" y="connsiteY106"/>
+              </a:cxn>
+              <a:cxn ang="0">
+                <a:pos x="connsiteX107" y="connsiteY107"/>
+              </a:cxn>
+              <a:cxn ang="0">
+                <a:pos x="connsiteX108" y="connsiteY108"/>
+              </a:cxn>
+              <a:cxn ang="0">
+                <a:pos x="connsiteX109" y="connsiteY109"/>
+              </a:cxn>
+              <a:cxn ang="0">
+                <a:pos x="connsiteX110" y="connsiteY110"/>
+              </a:cxn>
+              <a:cxn ang="0">
+                <a:pos x="connsiteX111" y="connsiteY111"/>
+              </a:cxn>
+              <a:cxn ang="0">
+                <a:pos x="connsiteX112" y="connsiteY112"/>
+              </a:cxn>
+              <a:cxn ang="0">
+                <a:pos x="connsiteX113" y="connsiteY113"/>
+              </a:cxn>
+              <a:cxn ang="0">
+                <a:pos x="connsiteX114" y="connsiteY114"/>
+              </a:cxn>
+              <a:cxn ang="0">
+                <a:pos x="connsiteX115" y="connsiteY115"/>
+              </a:cxn>
+              <a:cxn ang="0">
+                <a:pos x="connsiteX116" y="connsiteY116"/>
+              </a:cxn>
+              <a:cxn ang="0">
+                <a:pos x="connsiteX117" y="connsiteY117"/>
+              </a:cxn>
+              <a:cxn ang="0">
+                <a:pos x="connsiteX118" y="connsiteY118"/>
+              </a:cxn>
+              <a:cxn ang="0">
+                <a:pos x="connsiteX119" y="connsiteY119"/>
+              </a:cxn>
+              <a:cxn ang="0">
+                <a:pos x="connsiteX120" y="connsiteY120"/>
+              </a:cxn>
+              <a:cxn ang="0">
+                <a:pos x="connsiteX121" y="connsiteY121"/>
+              </a:cxn>
+              <a:cxn ang="0">
+                <a:pos x="connsiteX122" y="connsiteY122"/>
+              </a:cxn>
+              <a:cxn ang="0">
+                <a:pos x="connsiteX123" y="connsiteY123"/>
+              </a:cxn>
+              <a:cxn ang="0">
+                <a:pos x="connsiteX124" y="connsiteY124"/>
+              </a:cxn>
+              <a:cxn ang="0">
+                <a:pos x="connsiteX125" y="connsiteY125"/>
+              </a:cxn>
+              <a:cxn ang="0">
+                <a:pos x="connsiteX126" y="connsiteY126"/>
+              </a:cxn>
+              <a:cxn ang="0">
+                <a:pos x="connsiteX127" y="connsiteY127"/>
+              </a:cxn>
+              <a:cxn ang="0">
+                <a:pos x="connsiteX128" y="connsiteY128"/>
+              </a:cxn>
+              <a:cxn ang="0">
+                <a:pos x="connsiteX129" y="connsiteY129"/>
+              </a:cxn>
+            </a:cxnLst>
+            <a:rect l="l" t="t" r="r" b="b"/>
+            <a:pathLst>
+              <a:path w="4094440" h="4254500">
+                <a:moveTo>
+                  <a:pt x="1968500" y="139700"/>
+                </a:moveTo>
+                <a:lnTo>
+                  <a:pt x="1968500" y="139700"/>
+                </a:lnTo>
+                <a:lnTo>
+                  <a:pt x="1854200" y="152400"/>
+                </a:lnTo>
+                <a:cubicBezTo>
+                  <a:pt x="1797977" y="159428"/>
+                  <a:pt x="1765211" y="162587"/>
+                  <a:pt x="1714500" y="177800"/>
+                </a:cubicBezTo>
+                <a:cubicBezTo>
+                  <a:pt x="1688855" y="185493"/>
+                  <a:pt x="1663700" y="194733"/>
+                  <a:pt x="1638300" y="203200"/>
+                </a:cubicBezTo>
+                <a:cubicBezTo>
+                  <a:pt x="1625600" y="207433"/>
+                  <a:pt x="1611339" y="208474"/>
+                  <a:pt x="1600200" y="215900"/>
+                </a:cubicBezTo>
+                <a:cubicBezTo>
+                  <a:pt x="1491011" y="288693"/>
+                  <a:pt x="1629160" y="201420"/>
+                  <a:pt x="1524000" y="254000"/>
+                </a:cubicBezTo>
+                <a:cubicBezTo>
+                  <a:pt x="1440603" y="295698"/>
+                  <a:pt x="1540759" y="272035"/>
+                  <a:pt x="1409700" y="304800"/>
+                </a:cubicBezTo>
+                <a:cubicBezTo>
+                  <a:pt x="1291704" y="334299"/>
+                  <a:pt x="1438395" y="299061"/>
+                  <a:pt x="1282700" y="330200"/>
+                </a:cubicBezTo>
+                <a:cubicBezTo>
+                  <a:pt x="1168533" y="353033"/>
+                  <a:pt x="1301483" y="333419"/>
+                  <a:pt x="1168400" y="355600"/>
+                </a:cubicBezTo>
+                <a:cubicBezTo>
+                  <a:pt x="1138873" y="360521"/>
+                  <a:pt x="1109133" y="364067"/>
+                  <a:pt x="1079500" y="368300"/>
+                </a:cubicBezTo>
+                <a:cubicBezTo>
+                  <a:pt x="1041315" y="381028"/>
+                  <a:pt x="1036126" y="379045"/>
+                  <a:pt x="1003300" y="406400"/>
+                </a:cubicBezTo>
+                <a:cubicBezTo>
+                  <a:pt x="989502" y="417898"/>
+                  <a:pt x="978998" y="433002"/>
+                  <a:pt x="965200" y="444500"/>
+                </a:cubicBezTo>
+                <a:cubicBezTo>
+                  <a:pt x="910709" y="489909"/>
+                  <a:pt x="939595" y="447286"/>
+                  <a:pt x="889000" y="508000"/>
+                </a:cubicBezTo>
+                <a:cubicBezTo>
+                  <a:pt x="879229" y="519726"/>
+                  <a:pt x="873741" y="534692"/>
+                  <a:pt x="863600" y="546100"/>
+                </a:cubicBezTo>
+                <a:cubicBezTo>
+                  <a:pt x="839735" y="572948"/>
+                  <a:pt x="817288" y="602375"/>
+                  <a:pt x="787400" y="622300"/>
+                </a:cubicBezTo>
+                <a:lnTo>
+                  <a:pt x="711200" y="673100"/>
+                </a:lnTo>
+                <a:cubicBezTo>
+                  <a:pt x="702733" y="690033"/>
+                  <a:pt x="695540" y="707666"/>
+                  <a:pt x="685800" y="723900"/>
+                </a:cubicBezTo>
+                <a:cubicBezTo>
+                  <a:pt x="670094" y="750077"/>
+                  <a:pt x="644653" y="771140"/>
+                  <a:pt x="635000" y="800100"/>
+                </a:cubicBezTo>
+                <a:cubicBezTo>
+                  <a:pt x="616620" y="855239"/>
+                  <a:pt x="631766" y="828734"/>
+                  <a:pt x="584200" y="876300"/>
+                </a:cubicBezTo>
+                <a:cubicBezTo>
+                  <a:pt x="570966" y="916003"/>
+                  <a:pt x="558131" y="965646"/>
+                  <a:pt x="520700" y="990600"/>
+                </a:cubicBezTo>
+                <a:lnTo>
+                  <a:pt x="482600" y="1016000"/>
+                </a:lnTo>
+                <a:cubicBezTo>
+                  <a:pt x="474133" y="1041400"/>
+                  <a:pt x="472052" y="1069923"/>
+                  <a:pt x="457200" y="1092200"/>
+                </a:cubicBezTo>
+                <a:cubicBezTo>
+                  <a:pt x="448733" y="1104900"/>
+                  <a:pt x="438626" y="1116648"/>
+                  <a:pt x="431800" y="1130300"/>
+                </a:cubicBezTo>
+                <a:cubicBezTo>
+                  <a:pt x="425813" y="1142274"/>
+                  <a:pt x="425601" y="1156698"/>
+                  <a:pt x="419100" y="1168400"/>
+                </a:cubicBezTo>
+                <a:cubicBezTo>
+                  <a:pt x="404275" y="1195085"/>
+                  <a:pt x="385233" y="1219200"/>
+                  <a:pt x="368300" y="1244600"/>
+                </a:cubicBezTo>
+                <a:cubicBezTo>
+                  <a:pt x="359833" y="1257300"/>
+                  <a:pt x="347727" y="1268220"/>
+                  <a:pt x="342900" y="1282700"/>
+                </a:cubicBezTo>
+                <a:cubicBezTo>
+                  <a:pt x="312673" y="1373380"/>
+                  <a:pt x="332352" y="1336623"/>
+                  <a:pt x="292100" y="1397000"/>
+                </a:cubicBezTo>
+                <a:cubicBezTo>
+                  <a:pt x="285655" y="1422779"/>
+                  <a:pt x="277632" y="1460393"/>
+                  <a:pt x="266700" y="1485900"/>
+                </a:cubicBezTo>
+                <a:cubicBezTo>
+                  <a:pt x="247364" y="1531016"/>
+                  <a:pt x="241409" y="1536536"/>
+                  <a:pt x="215900" y="1574800"/>
+                </a:cubicBezTo>
+                <a:cubicBezTo>
+                  <a:pt x="196706" y="1651575"/>
+                  <a:pt x="208720" y="1609041"/>
+                  <a:pt x="177800" y="1701800"/>
+                </a:cubicBezTo>
+                <a:cubicBezTo>
+                  <a:pt x="173567" y="1714500"/>
+                  <a:pt x="167725" y="1726773"/>
+                  <a:pt x="165100" y="1739900"/>
+                </a:cubicBezTo>
+                <a:cubicBezTo>
+                  <a:pt x="160867" y="1761067"/>
+                  <a:pt x="159226" y="1782922"/>
+                  <a:pt x="152400" y="1803400"/>
+                </a:cubicBezTo>
+                <a:cubicBezTo>
+                  <a:pt x="146413" y="1821361"/>
+                  <a:pt x="133647" y="1836473"/>
+                  <a:pt x="127000" y="1854200"/>
+                </a:cubicBezTo>
+                <a:cubicBezTo>
+                  <a:pt x="120871" y="1870543"/>
+                  <a:pt x="119095" y="1888217"/>
+                  <a:pt x="114300" y="1905000"/>
+                </a:cubicBezTo>
+                <a:cubicBezTo>
+                  <a:pt x="93086" y="1979249"/>
+                  <a:pt x="108751" y="1904570"/>
+                  <a:pt x="88900" y="1993900"/>
+                </a:cubicBezTo>
+                <a:cubicBezTo>
+                  <a:pt x="84217" y="2014972"/>
+                  <a:pt x="81435" y="2036459"/>
+                  <a:pt x="76200" y="2057400"/>
+                </a:cubicBezTo>
+                <a:cubicBezTo>
+                  <a:pt x="57512" y="2132154"/>
+                  <a:pt x="53576" y="2073292"/>
+                  <a:pt x="38100" y="2197100"/>
+                </a:cubicBezTo>
+                <a:lnTo>
+                  <a:pt x="25400" y="2298700"/>
+                </a:lnTo>
+                <a:cubicBezTo>
+                  <a:pt x="21167" y="2374900"/>
+                  <a:pt x="17461" y="2451131"/>
+                  <a:pt x="12700" y="2527300"/>
+                </a:cubicBezTo>
+                <a:cubicBezTo>
+                  <a:pt x="8994" y="2586602"/>
+                  <a:pt x="0" y="2645682"/>
+                  <a:pt x="0" y="2705100"/>
+                </a:cubicBezTo>
+                <a:cubicBezTo>
+                  <a:pt x="0" y="2832171"/>
+                  <a:pt x="2699" y="2959424"/>
+                  <a:pt x="12700" y="3086100"/>
+                </a:cubicBezTo>
+                <a:cubicBezTo>
+                  <a:pt x="17639" y="3148663"/>
+                  <a:pt x="36152" y="3174533"/>
+                  <a:pt x="50800" y="3225800"/>
+                </a:cubicBezTo>
+                <a:cubicBezTo>
+                  <a:pt x="59674" y="3256860"/>
+                  <a:pt x="73810" y="3330165"/>
+                  <a:pt x="88900" y="3352800"/>
+                </a:cubicBezTo>
+                <a:lnTo>
+                  <a:pt x="114300" y="3390900"/>
+                </a:lnTo>
+                <a:cubicBezTo>
+                  <a:pt x="120745" y="3416679"/>
+                  <a:pt x="128768" y="3454293"/>
+                  <a:pt x="139700" y="3479800"/>
+                </a:cubicBezTo>
+                <a:cubicBezTo>
+                  <a:pt x="165100" y="3539067"/>
+                  <a:pt x="176046" y="3534532"/>
+                  <a:pt x="190500" y="3606800"/>
+                </a:cubicBezTo>
+                <a:cubicBezTo>
+                  <a:pt x="216320" y="3735902"/>
+                  <a:pt x="189865" y="3617278"/>
+                  <a:pt x="215900" y="3708400"/>
+                </a:cubicBezTo>
+                <a:cubicBezTo>
+                  <a:pt x="221325" y="3727389"/>
+                  <a:pt x="231150" y="3777000"/>
+                  <a:pt x="241300" y="3797300"/>
+                </a:cubicBezTo>
+                <a:cubicBezTo>
+                  <a:pt x="248126" y="3810952"/>
+                  <a:pt x="260501" y="3821452"/>
+                  <a:pt x="266700" y="3835400"/>
+                </a:cubicBezTo>
+                <a:cubicBezTo>
+                  <a:pt x="277574" y="3859866"/>
+                  <a:pt x="277248" y="3889323"/>
+                  <a:pt x="292100" y="3911600"/>
+                </a:cubicBezTo>
+                <a:cubicBezTo>
+                  <a:pt x="309033" y="3937000"/>
+                  <a:pt x="333247" y="3958840"/>
+                  <a:pt x="342900" y="3987800"/>
+                </a:cubicBezTo>
+                <a:cubicBezTo>
+                  <a:pt x="351266" y="4012899"/>
+                  <a:pt x="358619" y="4046095"/>
+                  <a:pt x="381000" y="4064000"/>
+                </a:cubicBezTo>
+                <a:cubicBezTo>
+                  <a:pt x="391453" y="4072363"/>
+                  <a:pt x="407126" y="4070713"/>
+                  <a:pt x="419100" y="4076700"/>
+                </a:cubicBezTo>
+                <a:cubicBezTo>
+                  <a:pt x="432752" y="4083526"/>
+                  <a:pt x="441973" y="4101050"/>
+                  <a:pt x="457200" y="4102100"/>
+                </a:cubicBezTo>
+                <a:cubicBezTo>
+                  <a:pt x="689635" y="4118130"/>
+                  <a:pt x="1155700" y="4127500"/>
+                  <a:pt x="1155700" y="4127500"/>
+                </a:cubicBezTo>
+                <a:lnTo>
+                  <a:pt x="1219200" y="4140200"/>
+                </a:lnTo>
+                <a:cubicBezTo>
+                  <a:pt x="1244535" y="4144806"/>
+                  <a:pt x="1270418" y="4146655"/>
+                  <a:pt x="1295400" y="4152900"/>
+                </a:cubicBezTo>
+                <a:cubicBezTo>
+                  <a:pt x="1506817" y="4205754"/>
+                  <a:pt x="1264739" y="4151146"/>
+                  <a:pt x="1422400" y="4203700"/>
+                </a:cubicBezTo>
+                <a:cubicBezTo>
+                  <a:pt x="1440150" y="4209617"/>
+                  <a:pt x="1549306" y="4226968"/>
+                  <a:pt x="1562100" y="4229100"/>
+                </a:cubicBezTo>
+                <a:cubicBezTo>
+                  <a:pt x="1853026" y="4221444"/>
+                  <a:pt x="2011108" y="4204129"/>
+                  <a:pt x="2273300" y="4229100"/>
+                </a:cubicBezTo>
+                <a:cubicBezTo>
+                  <a:pt x="2286627" y="4230369"/>
+                  <a:pt x="2298332" y="4238896"/>
+                  <a:pt x="2311400" y="4241800"/>
+                </a:cubicBezTo>
+                <a:cubicBezTo>
+                  <a:pt x="2336537" y="4247386"/>
+                  <a:pt x="2362200" y="4250267"/>
+                  <a:pt x="2387600" y="4254500"/>
+                </a:cubicBezTo>
+                <a:lnTo>
+                  <a:pt x="2971800" y="4241800"/>
+                </a:lnTo>
+                <a:cubicBezTo>
+                  <a:pt x="2989241" y="4241102"/>
+                  <a:pt x="3005171" y="4230042"/>
+                  <a:pt x="3022600" y="4229100"/>
+                </a:cubicBezTo>
+                <a:cubicBezTo>
+                  <a:pt x="3162160" y="4221556"/>
+                  <a:pt x="3302000" y="4220633"/>
+                  <a:pt x="3441700" y="4216400"/>
+                </a:cubicBezTo>
+                <a:cubicBezTo>
+                  <a:pt x="3471131" y="4194327"/>
+                  <a:pt x="3507857" y="4170524"/>
+                  <a:pt x="3530600" y="4140200"/>
+                </a:cubicBezTo>
+                <a:cubicBezTo>
+                  <a:pt x="3545411" y="4120453"/>
+                  <a:pt x="3555448" y="4097525"/>
+                  <a:pt x="3568700" y="4076700"/>
+                </a:cubicBezTo>
+                <a:cubicBezTo>
+                  <a:pt x="3585089" y="4050946"/>
+                  <a:pt x="3605848" y="4027804"/>
+                  <a:pt x="3619500" y="4000500"/>
+                </a:cubicBezTo>
+                <a:cubicBezTo>
+                  <a:pt x="3677126" y="3885248"/>
+                  <a:pt x="3649297" y="3930405"/>
+                  <a:pt x="3695700" y="3860800"/>
+                </a:cubicBezTo>
+                <a:cubicBezTo>
+                  <a:pt x="3699933" y="3843867"/>
+                  <a:pt x="3701524" y="3826043"/>
+                  <a:pt x="3708400" y="3810000"/>
+                </a:cubicBezTo>
+                <a:cubicBezTo>
+                  <a:pt x="3714413" y="3795971"/>
+                  <a:pt x="3728973" y="3786380"/>
+                  <a:pt x="3733800" y="3771900"/>
+                </a:cubicBezTo>
+                <a:cubicBezTo>
+                  <a:pt x="3741943" y="3747471"/>
+                  <a:pt x="3739101" y="3720364"/>
+                  <a:pt x="3746500" y="3695700"/>
+                </a:cubicBezTo>
+                <a:cubicBezTo>
+                  <a:pt x="3751940" y="3677566"/>
+                  <a:pt x="3764442" y="3662301"/>
+                  <a:pt x="3771900" y="3644900"/>
+                </a:cubicBezTo>
+                <a:cubicBezTo>
+                  <a:pt x="3777173" y="3632595"/>
+                  <a:pt x="3779327" y="3619105"/>
+                  <a:pt x="3784600" y="3606800"/>
+                </a:cubicBezTo>
+                <a:cubicBezTo>
+                  <a:pt x="3792058" y="3589399"/>
+                  <a:pt x="3802969" y="3573578"/>
+                  <a:pt x="3810000" y="3556000"/>
+                </a:cubicBezTo>
+                <a:cubicBezTo>
+                  <a:pt x="3819944" y="3531141"/>
+                  <a:pt x="3819336" y="3501219"/>
+                  <a:pt x="3835400" y="3479800"/>
+                </a:cubicBezTo>
+                <a:cubicBezTo>
+                  <a:pt x="3933502" y="3348998"/>
+                  <a:pt x="3815747" y="3515175"/>
+                  <a:pt x="3898900" y="3365500"/>
+                </a:cubicBezTo>
+                <a:cubicBezTo>
+                  <a:pt x="3909179" y="3346997"/>
+                  <a:pt x="3926110" y="3332850"/>
+                  <a:pt x="3937000" y="3314700"/>
+                </a:cubicBezTo>
+                <a:cubicBezTo>
+                  <a:pt x="3951611" y="3290349"/>
+                  <a:pt x="3962400" y="3263900"/>
+                  <a:pt x="3975100" y="3238500"/>
+                </a:cubicBezTo>
+                <a:cubicBezTo>
+                  <a:pt x="3999506" y="3116468"/>
+                  <a:pt x="3971136" y="3229360"/>
+                  <a:pt x="4013200" y="3124200"/>
+                </a:cubicBezTo>
+                <a:cubicBezTo>
+                  <a:pt x="4058540" y="3010850"/>
+                  <a:pt x="4015133" y="3083201"/>
+                  <a:pt x="4064000" y="3009900"/>
+                </a:cubicBezTo>
+                <a:cubicBezTo>
+                  <a:pt x="4114310" y="2808660"/>
+                  <a:pt x="4090134" y="2946057"/>
+                  <a:pt x="4076700" y="2603500"/>
+                </a:cubicBezTo>
+                <a:cubicBezTo>
+                  <a:pt x="4072218" y="2489209"/>
+                  <a:pt x="4075381" y="2374411"/>
+                  <a:pt x="4064000" y="2260600"/>
+                </a:cubicBezTo>
+                <a:cubicBezTo>
+                  <a:pt x="4062481" y="2245412"/>
+                  <a:pt x="4044799" y="2236448"/>
+                  <a:pt x="4038600" y="2222500"/>
+                </a:cubicBezTo>
+                <a:cubicBezTo>
+                  <a:pt x="4027726" y="2198034"/>
+                  <a:pt x="4020893" y="2171945"/>
+                  <a:pt x="4013200" y="2146300"/>
+                </a:cubicBezTo>
+                <a:cubicBezTo>
+                  <a:pt x="4008184" y="2129582"/>
+                  <a:pt x="4008306" y="2111112"/>
+                  <a:pt x="4000500" y="2095500"/>
+                </a:cubicBezTo>
+                <a:cubicBezTo>
+                  <a:pt x="3986848" y="2068196"/>
+                  <a:pt x="3959353" y="2048260"/>
+                  <a:pt x="3949700" y="2019300"/>
+                </a:cubicBezTo>
+                <a:cubicBezTo>
+                  <a:pt x="3941233" y="1993900"/>
+                  <a:pt x="3939152" y="1965377"/>
+                  <a:pt x="3924300" y="1943100"/>
+                </a:cubicBezTo>
+                <a:cubicBezTo>
+                  <a:pt x="3915833" y="1930400"/>
+                  <a:pt x="3905099" y="1918948"/>
+                  <a:pt x="3898900" y="1905000"/>
+                </a:cubicBezTo>
+                <a:cubicBezTo>
+                  <a:pt x="3888026" y="1880534"/>
+                  <a:pt x="3881967" y="1854200"/>
+                  <a:pt x="3873500" y="1828800"/>
+                </a:cubicBezTo>
+                <a:cubicBezTo>
+                  <a:pt x="3844673" y="1742320"/>
+                  <a:pt x="3880958" y="1848687"/>
+                  <a:pt x="3835400" y="1727200"/>
+                </a:cubicBezTo>
+                <a:cubicBezTo>
+                  <a:pt x="3830700" y="1714665"/>
+                  <a:pt x="3827400" y="1701635"/>
+                  <a:pt x="3822700" y="1689100"/>
+                </a:cubicBezTo>
+                <a:cubicBezTo>
+                  <a:pt x="3814695" y="1667754"/>
+                  <a:pt x="3805305" y="1646946"/>
+                  <a:pt x="3797300" y="1625600"/>
+                </a:cubicBezTo>
+                <a:cubicBezTo>
+                  <a:pt x="3792600" y="1613065"/>
+                  <a:pt x="3790587" y="1599474"/>
+                  <a:pt x="3784600" y="1587500"/>
+                </a:cubicBezTo>
+                <a:cubicBezTo>
+                  <a:pt x="3777774" y="1573848"/>
+                  <a:pt x="3767667" y="1562100"/>
+                  <a:pt x="3759200" y="1549400"/>
+                </a:cubicBezTo>
+                <a:cubicBezTo>
+                  <a:pt x="3731704" y="1439414"/>
+                  <a:pt x="3765375" y="1558486"/>
+                  <a:pt x="3721100" y="1447800"/>
+                </a:cubicBezTo>
+                <a:cubicBezTo>
+                  <a:pt x="3711156" y="1422941"/>
+                  <a:pt x="3704167" y="1397000"/>
+                  <a:pt x="3695700" y="1371600"/>
+                </a:cubicBezTo>
+                <a:cubicBezTo>
+                  <a:pt x="3691467" y="1358900"/>
+                  <a:pt x="3690426" y="1344639"/>
+                  <a:pt x="3683000" y="1333500"/>
+                </a:cubicBezTo>
+                <a:cubicBezTo>
+                  <a:pt x="3674533" y="1320800"/>
+                  <a:pt x="3664426" y="1309052"/>
+                  <a:pt x="3657600" y="1295400"/>
+                </a:cubicBezTo>
+                <a:cubicBezTo>
+                  <a:pt x="3647405" y="1275010"/>
+                  <a:pt x="3639409" y="1253527"/>
+                  <a:pt x="3632200" y="1231900"/>
+                </a:cubicBezTo>
+                <a:cubicBezTo>
+                  <a:pt x="3626680" y="1215341"/>
+                  <a:pt x="3626376" y="1197143"/>
+                  <a:pt x="3619500" y="1181100"/>
+                </a:cubicBezTo>
+                <a:cubicBezTo>
+                  <a:pt x="3613487" y="1167071"/>
+                  <a:pt x="3600299" y="1156948"/>
+                  <a:pt x="3594100" y="1143000"/>
+                </a:cubicBezTo>
+                <a:cubicBezTo>
+                  <a:pt x="3535748" y="1011708"/>
+                  <a:pt x="3605523" y="1115898"/>
+                  <a:pt x="3530600" y="1016000"/>
+                </a:cubicBezTo>
+                <a:cubicBezTo>
+                  <a:pt x="3522133" y="977900"/>
+                  <a:pt x="3513976" y="939730"/>
+                  <a:pt x="3505200" y="901700"/>
+                </a:cubicBezTo>
+                <a:cubicBezTo>
+                  <a:pt x="3501275" y="884693"/>
+                  <a:pt x="3499376" y="866943"/>
+                  <a:pt x="3492500" y="850900"/>
+                </a:cubicBezTo>
+                <a:cubicBezTo>
+                  <a:pt x="3486487" y="836871"/>
+                  <a:pt x="3475567" y="825500"/>
+                  <a:pt x="3467100" y="812800"/>
+                </a:cubicBezTo>
+                <a:cubicBezTo>
+                  <a:pt x="3440669" y="707074"/>
+                  <a:pt x="3472853" y="811605"/>
+                  <a:pt x="3429000" y="723900"/>
+                </a:cubicBezTo>
+                <a:cubicBezTo>
+                  <a:pt x="3423013" y="711926"/>
+                  <a:pt x="3422287" y="697774"/>
+                  <a:pt x="3416300" y="685800"/>
+                </a:cubicBezTo>
+                <a:cubicBezTo>
+                  <a:pt x="3404951" y="663103"/>
+                  <a:pt x="3348778" y="592211"/>
+                  <a:pt x="3340100" y="584200"/>
+                </a:cubicBezTo>
+                <a:cubicBezTo>
+                  <a:pt x="3304633" y="551461"/>
+                  <a:pt x="3259930" y="529430"/>
+                  <a:pt x="3225800" y="495300"/>
+                </a:cubicBezTo>
+                <a:cubicBezTo>
+                  <a:pt x="3204633" y="474133"/>
+                  <a:pt x="3185929" y="450178"/>
+                  <a:pt x="3162300" y="431800"/>
+                </a:cubicBezTo>
+                <a:cubicBezTo>
+                  <a:pt x="3147356" y="420177"/>
+                  <a:pt x="3126646" y="417759"/>
+                  <a:pt x="3111500" y="406400"/>
+                </a:cubicBezTo>
+                <a:cubicBezTo>
+                  <a:pt x="3092342" y="392032"/>
+                  <a:pt x="3078722" y="371369"/>
+                  <a:pt x="3060700" y="355600"/>
+                </a:cubicBezTo>
+                <a:cubicBezTo>
+                  <a:pt x="3010076" y="311304"/>
+                  <a:pt x="3004815" y="318344"/>
+                  <a:pt x="2946400" y="279400"/>
+                </a:cubicBezTo>
+                <a:cubicBezTo>
+                  <a:pt x="2937018" y="273146"/>
+                  <a:pt x="2874539" y="223473"/>
+                  <a:pt x="2857500" y="215900"/>
+                </a:cubicBezTo>
+                <a:cubicBezTo>
+                  <a:pt x="2833034" y="205026"/>
+                  <a:pt x="2803577" y="205352"/>
+                  <a:pt x="2781300" y="190500"/>
+                </a:cubicBezTo>
+                <a:cubicBezTo>
+                  <a:pt x="2768600" y="182033"/>
+                  <a:pt x="2754926" y="174871"/>
+                  <a:pt x="2743200" y="165100"/>
+                </a:cubicBezTo>
+                <a:cubicBezTo>
+                  <a:pt x="2729402" y="153602"/>
+                  <a:pt x="2720044" y="136963"/>
+                  <a:pt x="2705100" y="127000"/>
+                </a:cubicBezTo>
+                <a:cubicBezTo>
+                  <a:pt x="2693961" y="119574"/>
+                  <a:pt x="2678974" y="120287"/>
+                  <a:pt x="2667000" y="114300"/>
+                </a:cubicBezTo>
+                <a:cubicBezTo>
+                  <a:pt x="2583898" y="72749"/>
+                  <a:pt x="2675062" y="106975"/>
+                  <a:pt x="2590800" y="50800"/>
+                </a:cubicBezTo>
+                <a:cubicBezTo>
+                  <a:pt x="2579661" y="43374"/>
+                  <a:pt x="2564674" y="44087"/>
+                  <a:pt x="2552700" y="38100"/>
+                </a:cubicBezTo>
+                <a:cubicBezTo>
+                  <a:pt x="2464995" y="-5753"/>
+                  <a:pt x="2569526" y="26431"/>
+                  <a:pt x="2463800" y="0"/>
+                </a:cubicBezTo>
+                <a:cubicBezTo>
+                  <a:pt x="2427377" y="3642"/>
+                  <a:pt x="2344469" y="2515"/>
+                  <a:pt x="2298700" y="25400"/>
+                </a:cubicBezTo>
+                <a:cubicBezTo>
+                  <a:pt x="2285048" y="32226"/>
+                  <a:pt x="2274252" y="43974"/>
+                  <a:pt x="2260600" y="50800"/>
+                </a:cubicBezTo>
+                <a:cubicBezTo>
+                  <a:pt x="2248626" y="56787"/>
+                  <a:pt x="2234474" y="57513"/>
+                  <a:pt x="2222500" y="63500"/>
+                </a:cubicBezTo>
+                <a:cubicBezTo>
+                  <a:pt x="2208848" y="70326"/>
+                  <a:pt x="2198052" y="82074"/>
+                  <a:pt x="2184400" y="88900"/>
+                </a:cubicBezTo>
+                <a:cubicBezTo>
+                  <a:pt x="2172426" y="94887"/>
+                  <a:pt x="2158274" y="95613"/>
+                  <a:pt x="2146300" y="101600"/>
+                </a:cubicBezTo>
+                <a:cubicBezTo>
+                  <a:pt x="2132648" y="108426"/>
+                  <a:pt x="2122148" y="120801"/>
+                  <a:pt x="2108200" y="127000"/>
+                </a:cubicBezTo>
+                <a:cubicBezTo>
+                  <a:pt x="2042014" y="156416"/>
+                  <a:pt x="2048309" y="152400"/>
+                  <a:pt x="1968500" y="139700"/>
+                </a:cubicBezTo>
+                <a:close/>
+              </a:path>
+            </a:pathLst>
+          </a:custGeom>
+          <a:solidFill>
+            <a:schemeClr val="accent1">
+              <a:alpha val="70000"/>
+            </a:schemeClr>
+          </a:solidFill>
+        </p:spPr>
+        <p:style>
+          <a:lnRef idx="2">
+            <a:schemeClr val="accent1">
+              <a:shade val="50000"/>
+            </a:schemeClr>
+          </a:lnRef>
+          <a:fillRef idx="1">
+            <a:schemeClr val="accent1"/>
+          </a:fillRef>
+          <a:effectRef idx="0">
+            <a:schemeClr val="accent1"/>
+          </a:effectRef>
+          <a:fontRef idx="minor">
+            <a:schemeClr val="lt1"/>
+          </a:fontRef>
+        </p:style>
+        <p:txBody>
+          <a:bodyPr rtlCol="0" anchor="ctr"/>
+          <a:lstStyle/>
+          <a:p>
+            <a:pPr algn="ctr"/>
+            <a:endParaRPr lang="en-SG"/>
+          </a:p>
+        </p:txBody>
+      </p:sp>
+    </p:spTree>
+    <p:extLst>
+      <p:ext uri="{BB962C8B-B14F-4D97-AF65-F5344CB8AC3E}">
+        <p14:creationId xmlns:p14="http://schemas.microsoft.com/office/powerpoint/2010/main" val="2218722897"/>
+      </p:ext>
+    </p:extLst>
+  </p:cSld>
+  <p:clrMapOvr>
+    <a:masterClrMapping/>
+  </p:clrMapOvr>
+</p:sld>
+</file>
+
+<file path=ppt/slides/slide11.xml><?xml version="1.0" encoding="utf-8"?>
+<p:sld xmlns:a="http://schemas.openxmlformats.org/drawingml/2006/main" xmlns:r="http://schemas.openxmlformats.org/officeDocument/2006/relationships" xmlns:p="http://schemas.openxmlformats.org/presentationml/2006/main">
+  <p:cSld>
+    <p:spTree>
+      <p:nvGrpSpPr>
+        <p:cNvPr id="1" name=""/>
+        <p:cNvGrpSpPr/>
+        <p:nvPr/>
+      </p:nvGrpSpPr>
+      <p:grpSpPr>
+        <a:xfrm>
+          <a:off x="0" y="0"/>
+          <a:ext cx="0" cy="0"/>
+          <a:chOff x="0" y="0"/>
+          <a:chExt cx="0" cy="0"/>
+        </a:xfrm>
+      </p:grpSpPr>
+      <p:sp>
+        <p:nvSpPr>
+          <p:cNvPr id="5" name="text 3"/>
+          <p:cNvSpPr txBox="1"/>
+          <p:nvPr/>
+        </p:nvSpPr>
+        <p:spPr>
+          <a:xfrm>
+            <a:off x="3365631" y="6019800"/>
+            <a:ext cx="2693814" cy="523220"/>
+          </a:xfrm>
+          <a:prstGeom prst="rect">
+            <a:avLst/>
+          </a:prstGeom>
+          <a:noFill/>
+        </p:spPr>
+        <p:txBody>
+          <a:bodyPr wrap="none" rtlCol="0">
+            <a:spAutoFit/>
+          </a:bodyPr>
+          <a:lstStyle/>
+          <a:p>
+            <a:r>
+              <a:rPr lang="en-US" sz="2800" b="1" dirty="0" smtClean="0">
+                <a:solidFill>
+                  <a:schemeClr val="accent1"/>
+                </a:solidFill>
+              </a:rPr>
+              <a:t>Expected Output</a:t>
+            </a:r>
+            <a:endParaRPr lang="en-SG" sz="2800" b="1" dirty="0">
+              <a:solidFill>
+                <a:schemeClr val="accent1"/>
+              </a:solidFill>
+            </a:endParaRPr>
+          </a:p>
+        </p:txBody>
+      </p:sp>
+      <p:pic>
+        <p:nvPicPr>
+          <p:cNvPr id="4" name="pic"/>
+          <p:cNvPicPr>
+            <a:picLocks noGrp="1" noChangeAspect="1"/>
+          </p:cNvPicPr>
+          <p:nvPr>
+            <p:ph idx="1"/>
+          </p:nvPr>
+        </p:nvPicPr>
+        <p:blipFill>
+          <a:blip r:embed="rId2">
+            <a:extLst>
+              <a:ext uri="{28A0092B-C50C-407E-A947-70E740481C1C}">
+                <a14:useLocalDpi xmlns:a14="http://schemas.microsoft.com/office/drawing/2010/main" val="0"/>
+              </a:ext>
+            </a:extLst>
+          </a:blip>
+          <a:stretch>
+            <a:fillRect/>
+          </a:stretch>
+        </p:blipFill>
+        <p:spPr>
+          <a:xfrm>
+            <a:off x="2514600" y="1219200"/>
+            <a:ext cx="4395876" cy="4351338"/>
+          </a:xfrm>
+        </p:spPr>
+      </p:pic>
+      <p:sp>
+        <p:nvSpPr>
+          <p:cNvPr id="7" name="selectMe639536c9-cfd6-46e0-87f5-7e22fb457cef"/>
+          <p:cNvSpPr/>
+          <p:nvPr/>
+        </p:nvSpPr>
+        <p:spPr>
+          <a:xfrm rot="705292">
+            <a:off x="2667000" y="1371600"/>
+            <a:ext cx="4094440" cy="4254500"/>
+          </a:xfrm>
+          <a:custGeom>
+            <a:avLst/>
+            <a:gdLst>
+              <a:gd name="connsiteX0" fmla="*/ 1968500 w 4094440"/>
+              <a:gd name="connsiteY0" fmla="*/ 139700 h 4254500"/>
+              <a:gd name="connsiteX1" fmla="*/ 1968500 w 4094440"/>
+              <a:gd name="connsiteY1" fmla="*/ 139700 h 4254500"/>
+              <a:gd name="connsiteX2" fmla="*/ 1854200 w 4094440"/>
+              <a:gd name="connsiteY2" fmla="*/ 152400 h 4254500"/>
+              <a:gd name="connsiteX3" fmla="*/ 1714500 w 4094440"/>
+              <a:gd name="connsiteY3" fmla="*/ 177800 h 4254500"/>
+              <a:gd name="connsiteX4" fmla="*/ 1638300 w 4094440"/>
+              <a:gd name="connsiteY4" fmla="*/ 203200 h 4254500"/>
+              <a:gd name="connsiteX5" fmla="*/ 1600200 w 4094440"/>
+              <a:gd name="connsiteY5" fmla="*/ 215900 h 4254500"/>
+              <a:gd name="connsiteX6" fmla="*/ 1524000 w 4094440"/>
+              <a:gd name="connsiteY6" fmla="*/ 254000 h 4254500"/>
+              <a:gd name="connsiteX7" fmla="*/ 1409700 w 4094440"/>
+              <a:gd name="connsiteY7" fmla="*/ 304800 h 4254500"/>
+              <a:gd name="connsiteX8" fmla="*/ 1282700 w 4094440"/>
+              <a:gd name="connsiteY8" fmla="*/ 330200 h 4254500"/>
+              <a:gd name="connsiteX9" fmla="*/ 1168400 w 4094440"/>
+              <a:gd name="connsiteY9" fmla="*/ 355600 h 4254500"/>
+              <a:gd name="connsiteX10" fmla="*/ 1079500 w 4094440"/>
+              <a:gd name="connsiteY10" fmla="*/ 368300 h 4254500"/>
+              <a:gd name="connsiteX11" fmla="*/ 1003300 w 4094440"/>
+              <a:gd name="connsiteY11" fmla="*/ 406400 h 4254500"/>
+              <a:gd name="connsiteX12" fmla="*/ 965200 w 4094440"/>
+              <a:gd name="connsiteY12" fmla="*/ 444500 h 4254500"/>
+              <a:gd name="connsiteX13" fmla="*/ 889000 w 4094440"/>
+              <a:gd name="connsiteY13" fmla="*/ 508000 h 4254500"/>
+              <a:gd name="connsiteX14" fmla="*/ 863600 w 4094440"/>
+              <a:gd name="connsiteY14" fmla="*/ 546100 h 4254500"/>
+              <a:gd name="connsiteX15" fmla="*/ 787400 w 4094440"/>
+              <a:gd name="connsiteY15" fmla="*/ 622300 h 4254500"/>
+              <a:gd name="connsiteX16" fmla="*/ 711200 w 4094440"/>
+              <a:gd name="connsiteY16" fmla="*/ 673100 h 4254500"/>
+              <a:gd name="connsiteX17" fmla="*/ 685800 w 4094440"/>
+              <a:gd name="connsiteY17" fmla="*/ 723900 h 4254500"/>
+              <a:gd name="connsiteX18" fmla="*/ 635000 w 4094440"/>
+              <a:gd name="connsiteY18" fmla="*/ 800100 h 4254500"/>
+              <a:gd name="connsiteX19" fmla="*/ 584200 w 4094440"/>
+              <a:gd name="connsiteY19" fmla="*/ 876300 h 4254500"/>
+              <a:gd name="connsiteX20" fmla="*/ 520700 w 4094440"/>
+              <a:gd name="connsiteY20" fmla="*/ 990600 h 4254500"/>
+              <a:gd name="connsiteX21" fmla="*/ 482600 w 4094440"/>
+              <a:gd name="connsiteY21" fmla="*/ 1016000 h 4254500"/>
+              <a:gd name="connsiteX22" fmla="*/ 457200 w 4094440"/>
+              <a:gd name="connsiteY22" fmla="*/ 1092200 h 4254500"/>
+              <a:gd name="connsiteX23" fmla="*/ 431800 w 4094440"/>
+              <a:gd name="connsiteY23" fmla="*/ 1130300 h 4254500"/>
+              <a:gd name="connsiteX24" fmla="*/ 419100 w 4094440"/>
+              <a:gd name="connsiteY24" fmla="*/ 1168400 h 4254500"/>
+              <a:gd name="connsiteX25" fmla="*/ 368300 w 4094440"/>
+              <a:gd name="connsiteY25" fmla="*/ 1244600 h 4254500"/>
+              <a:gd name="connsiteX26" fmla="*/ 342900 w 4094440"/>
+              <a:gd name="connsiteY26" fmla="*/ 1282700 h 4254500"/>
+              <a:gd name="connsiteX27" fmla="*/ 292100 w 4094440"/>
+              <a:gd name="connsiteY27" fmla="*/ 1397000 h 4254500"/>
+              <a:gd name="connsiteX28" fmla="*/ 266700 w 4094440"/>
+              <a:gd name="connsiteY28" fmla="*/ 1485900 h 4254500"/>
+              <a:gd name="connsiteX29" fmla="*/ 215900 w 4094440"/>
+              <a:gd name="connsiteY29" fmla="*/ 1574800 h 4254500"/>
+              <a:gd name="connsiteX30" fmla="*/ 177800 w 4094440"/>
+              <a:gd name="connsiteY30" fmla="*/ 1701800 h 4254500"/>
+              <a:gd name="connsiteX31" fmla="*/ 165100 w 4094440"/>
+              <a:gd name="connsiteY31" fmla="*/ 1739900 h 4254500"/>
+              <a:gd name="connsiteX32" fmla="*/ 152400 w 4094440"/>
+              <a:gd name="connsiteY32" fmla="*/ 1803400 h 4254500"/>
+              <a:gd name="connsiteX33" fmla="*/ 127000 w 4094440"/>
+              <a:gd name="connsiteY33" fmla="*/ 1854200 h 4254500"/>
+              <a:gd name="connsiteX34" fmla="*/ 114300 w 4094440"/>
+              <a:gd name="connsiteY34" fmla="*/ 1905000 h 4254500"/>
+              <a:gd name="connsiteX35" fmla="*/ 88900 w 4094440"/>
+              <a:gd name="connsiteY35" fmla="*/ 1993900 h 4254500"/>
+              <a:gd name="connsiteX36" fmla="*/ 76200 w 4094440"/>
+              <a:gd name="connsiteY36" fmla="*/ 2057400 h 4254500"/>
+              <a:gd name="connsiteX37" fmla="*/ 38100 w 4094440"/>
+              <a:gd name="connsiteY37" fmla="*/ 2197100 h 4254500"/>
+              <a:gd name="connsiteX38" fmla="*/ 25400 w 4094440"/>
+              <a:gd name="connsiteY38" fmla="*/ 2298700 h 4254500"/>
+              <a:gd name="connsiteX39" fmla="*/ 12700 w 4094440"/>
+              <a:gd name="connsiteY39" fmla="*/ 2527300 h 4254500"/>
+              <a:gd name="connsiteX40" fmla="*/ 0 w 4094440"/>
+              <a:gd name="connsiteY40" fmla="*/ 2705100 h 4254500"/>
+              <a:gd name="connsiteX41" fmla="*/ 12700 w 4094440"/>
+              <a:gd name="connsiteY41" fmla="*/ 3086100 h 4254500"/>
+              <a:gd name="connsiteX42" fmla="*/ 50800 w 4094440"/>
+              <a:gd name="connsiteY42" fmla="*/ 3225800 h 4254500"/>
+              <a:gd name="connsiteX43" fmla="*/ 88900 w 4094440"/>
+              <a:gd name="connsiteY43" fmla="*/ 3352800 h 4254500"/>
+              <a:gd name="connsiteX44" fmla="*/ 114300 w 4094440"/>
+              <a:gd name="connsiteY44" fmla="*/ 3390900 h 4254500"/>
+              <a:gd name="connsiteX45" fmla="*/ 139700 w 4094440"/>
+              <a:gd name="connsiteY45" fmla="*/ 3479800 h 4254500"/>
+              <a:gd name="connsiteX46" fmla="*/ 190500 w 4094440"/>
+              <a:gd name="connsiteY46" fmla="*/ 3606800 h 4254500"/>
+              <a:gd name="connsiteX47" fmla="*/ 215900 w 4094440"/>
+              <a:gd name="connsiteY47" fmla="*/ 3708400 h 4254500"/>
+              <a:gd name="connsiteX48" fmla="*/ 241300 w 4094440"/>
+              <a:gd name="connsiteY48" fmla="*/ 3797300 h 4254500"/>
+              <a:gd name="connsiteX49" fmla="*/ 266700 w 4094440"/>
+              <a:gd name="connsiteY49" fmla="*/ 3835400 h 4254500"/>
+              <a:gd name="connsiteX50" fmla="*/ 292100 w 4094440"/>
+              <a:gd name="connsiteY50" fmla="*/ 3911600 h 4254500"/>
+              <a:gd name="connsiteX51" fmla="*/ 342900 w 4094440"/>
+              <a:gd name="connsiteY51" fmla="*/ 3987800 h 4254500"/>
+              <a:gd name="connsiteX52" fmla="*/ 381000 w 4094440"/>
+              <a:gd name="connsiteY52" fmla="*/ 4064000 h 4254500"/>
+              <a:gd name="connsiteX53" fmla="*/ 419100 w 4094440"/>
+              <a:gd name="connsiteY53" fmla="*/ 4076700 h 4254500"/>
+              <a:gd name="connsiteX54" fmla="*/ 457200 w 4094440"/>
+              <a:gd name="connsiteY54" fmla="*/ 4102100 h 4254500"/>
+              <a:gd name="connsiteX55" fmla="*/ 1155700 w 4094440"/>
+              <a:gd name="connsiteY55" fmla="*/ 4127500 h 4254500"/>
+              <a:gd name="connsiteX56" fmla="*/ 1219200 w 4094440"/>
+              <a:gd name="connsiteY56" fmla="*/ 4140200 h 4254500"/>
+              <a:gd name="connsiteX57" fmla="*/ 1295400 w 4094440"/>
+              <a:gd name="connsiteY57" fmla="*/ 4152900 h 4254500"/>
+              <a:gd name="connsiteX58" fmla="*/ 1422400 w 4094440"/>
+              <a:gd name="connsiteY58" fmla="*/ 4203700 h 4254500"/>
+              <a:gd name="connsiteX59" fmla="*/ 1562100 w 4094440"/>
+              <a:gd name="connsiteY59" fmla="*/ 4229100 h 4254500"/>
+              <a:gd name="connsiteX60" fmla="*/ 2273300 w 4094440"/>
+              <a:gd name="connsiteY60" fmla="*/ 4229100 h 4254500"/>
+              <a:gd name="connsiteX61" fmla="*/ 2311400 w 4094440"/>
+              <a:gd name="connsiteY61" fmla="*/ 4241800 h 4254500"/>
+              <a:gd name="connsiteX62" fmla="*/ 2387600 w 4094440"/>
+              <a:gd name="connsiteY62" fmla="*/ 4254500 h 4254500"/>
+              <a:gd name="connsiteX63" fmla="*/ 2971800 w 4094440"/>
+              <a:gd name="connsiteY63" fmla="*/ 4241800 h 4254500"/>
+              <a:gd name="connsiteX64" fmla="*/ 3022600 w 4094440"/>
+              <a:gd name="connsiteY64" fmla="*/ 4229100 h 4254500"/>
+              <a:gd name="connsiteX65" fmla="*/ 3441700 w 4094440"/>
+              <a:gd name="connsiteY65" fmla="*/ 4216400 h 4254500"/>
+              <a:gd name="connsiteX66" fmla="*/ 3530600 w 4094440"/>
+              <a:gd name="connsiteY66" fmla="*/ 4140200 h 4254500"/>
+              <a:gd name="connsiteX67" fmla="*/ 3568700 w 4094440"/>
+              <a:gd name="connsiteY67" fmla="*/ 4076700 h 4254500"/>
+              <a:gd name="connsiteX68" fmla="*/ 3619500 w 4094440"/>
+              <a:gd name="connsiteY68" fmla="*/ 4000500 h 4254500"/>
+              <a:gd name="connsiteX69" fmla="*/ 3695700 w 4094440"/>
+              <a:gd name="connsiteY69" fmla="*/ 3860800 h 4254500"/>
+              <a:gd name="connsiteX70" fmla="*/ 3708400 w 4094440"/>
+              <a:gd name="connsiteY70" fmla="*/ 3810000 h 4254500"/>
+              <a:gd name="connsiteX71" fmla="*/ 3733800 w 4094440"/>
+              <a:gd name="connsiteY71" fmla="*/ 3771900 h 4254500"/>
+              <a:gd name="connsiteX72" fmla="*/ 3746500 w 4094440"/>
+              <a:gd name="connsiteY72" fmla="*/ 3695700 h 4254500"/>
+              <a:gd name="connsiteX73" fmla="*/ 3771900 w 4094440"/>
+              <a:gd name="connsiteY73" fmla="*/ 3644900 h 4254500"/>
+              <a:gd name="connsiteX74" fmla="*/ 3784600 w 4094440"/>
+              <a:gd name="connsiteY74" fmla="*/ 3606800 h 4254500"/>
+              <a:gd name="connsiteX75" fmla="*/ 3810000 w 4094440"/>
+              <a:gd name="connsiteY75" fmla="*/ 3556000 h 4254500"/>
+              <a:gd name="connsiteX76" fmla="*/ 3835400 w 4094440"/>
+              <a:gd name="connsiteY76" fmla="*/ 3479800 h 4254500"/>
+              <a:gd name="connsiteX77" fmla="*/ 3898900 w 4094440"/>
+              <a:gd name="connsiteY77" fmla="*/ 3365500 h 4254500"/>
+              <a:gd name="connsiteX78" fmla="*/ 3937000 w 4094440"/>
+              <a:gd name="connsiteY78" fmla="*/ 3314700 h 4254500"/>
+              <a:gd name="connsiteX79" fmla="*/ 3975100 w 4094440"/>
+              <a:gd name="connsiteY79" fmla="*/ 3238500 h 4254500"/>
+              <a:gd name="connsiteX80" fmla="*/ 4013200 w 4094440"/>
+              <a:gd name="connsiteY80" fmla="*/ 3124200 h 4254500"/>
+              <a:gd name="connsiteX81" fmla="*/ 4064000 w 4094440"/>
+              <a:gd name="connsiteY81" fmla="*/ 3009900 h 4254500"/>
+              <a:gd name="connsiteX82" fmla="*/ 4076700 w 4094440"/>
+              <a:gd name="connsiteY82" fmla="*/ 2603500 h 4254500"/>
+              <a:gd name="connsiteX83" fmla="*/ 4064000 w 4094440"/>
+              <a:gd name="connsiteY83" fmla="*/ 2260600 h 4254500"/>
+              <a:gd name="connsiteX84" fmla="*/ 4038600 w 4094440"/>
+              <a:gd name="connsiteY84" fmla="*/ 2222500 h 4254500"/>
+              <a:gd name="connsiteX85" fmla="*/ 4013200 w 4094440"/>
+              <a:gd name="connsiteY85" fmla="*/ 2146300 h 4254500"/>
+              <a:gd name="connsiteX86" fmla="*/ 4000500 w 4094440"/>
+              <a:gd name="connsiteY86" fmla="*/ 2095500 h 4254500"/>
+              <a:gd name="connsiteX87" fmla="*/ 3949700 w 4094440"/>
+              <a:gd name="connsiteY87" fmla="*/ 2019300 h 4254500"/>
+              <a:gd name="connsiteX88" fmla="*/ 3924300 w 4094440"/>
+              <a:gd name="connsiteY88" fmla="*/ 1943100 h 4254500"/>
+              <a:gd name="connsiteX89" fmla="*/ 3898900 w 4094440"/>
+              <a:gd name="connsiteY89" fmla="*/ 1905000 h 4254500"/>
+              <a:gd name="connsiteX90" fmla="*/ 3873500 w 4094440"/>
+              <a:gd name="connsiteY90" fmla="*/ 1828800 h 4254500"/>
+              <a:gd name="connsiteX91" fmla="*/ 3835400 w 4094440"/>
+              <a:gd name="connsiteY91" fmla="*/ 1727200 h 4254500"/>
+              <a:gd name="connsiteX92" fmla="*/ 3822700 w 4094440"/>
+              <a:gd name="connsiteY92" fmla="*/ 1689100 h 4254500"/>
+              <a:gd name="connsiteX93" fmla="*/ 3797300 w 4094440"/>
+              <a:gd name="connsiteY93" fmla="*/ 1625600 h 4254500"/>
+              <a:gd name="connsiteX94" fmla="*/ 3784600 w 4094440"/>
+              <a:gd name="connsiteY94" fmla="*/ 1587500 h 4254500"/>
+              <a:gd name="connsiteX95" fmla="*/ 3759200 w 4094440"/>
+              <a:gd name="connsiteY95" fmla="*/ 1549400 h 4254500"/>
+              <a:gd name="connsiteX96" fmla="*/ 3721100 w 4094440"/>
+              <a:gd name="connsiteY96" fmla="*/ 1447800 h 4254500"/>
+              <a:gd name="connsiteX97" fmla="*/ 3695700 w 4094440"/>
+              <a:gd name="connsiteY97" fmla="*/ 1371600 h 4254500"/>
+              <a:gd name="connsiteX98" fmla="*/ 3683000 w 4094440"/>
+              <a:gd name="connsiteY98" fmla="*/ 1333500 h 4254500"/>
+              <a:gd name="connsiteX99" fmla="*/ 3657600 w 4094440"/>
+              <a:gd name="connsiteY99" fmla="*/ 1295400 h 4254500"/>
+              <a:gd name="connsiteX100" fmla="*/ 3632200 w 4094440"/>
+              <a:gd name="connsiteY100" fmla="*/ 1231900 h 4254500"/>
+              <a:gd name="connsiteX101" fmla="*/ 3619500 w 4094440"/>
+              <a:gd name="connsiteY101" fmla="*/ 1181100 h 4254500"/>
+              <a:gd name="connsiteX102" fmla="*/ 3594100 w 4094440"/>
+              <a:gd name="connsiteY102" fmla="*/ 1143000 h 4254500"/>
+              <a:gd name="connsiteX103" fmla="*/ 3530600 w 4094440"/>
+              <a:gd name="connsiteY103" fmla="*/ 1016000 h 4254500"/>
+              <a:gd name="connsiteX104" fmla="*/ 3505200 w 4094440"/>
+              <a:gd name="connsiteY104" fmla="*/ 901700 h 4254500"/>
+              <a:gd name="connsiteX105" fmla="*/ 3492500 w 4094440"/>
+              <a:gd name="connsiteY105" fmla="*/ 850900 h 4254500"/>
+              <a:gd name="connsiteX106" fmla="*/ 3467100 w 4094440"/>
+              <a:gd name="connsiteY106" fmla="*/ 812800 h 4254500"/>
+              <a:gd name="connsiteX107" fmla="*/ 3429000 w 4094440"/>
+              <a:gd name="connsiteY107" fmla="*/ 723900 h 4254500"/>
+              <a:gd name="connsiteX108" fmla="*/ 3416300 w 4094440"/>
+              <a:gd name="connsiteY108" fmla="*/ 685800 h 4254500"/>
+              <a:gd name="connsiteX109" fmla="*/ 3340100 w 4094440"/>
+              <a:gd name="connsiteY109" fmla="*/ 584200 h 4254500"/>
+              <a:gd name="connsiteX110" fmla="*/ 3225800 w 4094440"/>
+              <a:gd name="connsiteY110" fmla="*/ 495300 h 4254500"/>
+              <a:gd name="connsiteX111" fmla="*/ 3162300 w 4094440"/>
+              <a:gd name="connsiteY111" fmla="*/ 431800 h 4254500"/>
+              <a:gd name="connsiteX112" fmla="*/ 3111500 w 4094440"/>
+              <a:gd name="connsiteY112" fmla="*/ 406400 h 4254500"/>
+              <a:gd name="connsiteX113" fmla="*/ 3060700 w 4094440"/>
+              <a:gd name="connsiteY113" fmla="*/ 355600 h 4254500"/>
+              <a:gd name="connsiteX114" fmla="*/ 2946400 w 4094440"/>
+              <a:gd name="connsiteY114" fmla="*/ 279400 h 4254500"/>
+              <a:gd name="connsiteX115" fmla="*/ 2857500 w 4094440"/>
+              <a:gd name="connsiteY115" fmla="*/ 215900 h 4254500"/>
+              <a:gd name="connsiteX116" fmla="*/ 2781300 w 4094440"/>
+              <a:gd name="connsiteY116" fmla="*/ 190500 h 4254500"/>
+              <a:gd name="connsiteX117" fmla="*/ 2743200 w 4094440"/>
+              <a:gd name="connsiteY117" fmla="*/ 165100 h 4254500"/>
+              <a:gd name="connsiteX118" fmla="*/ 2705100 w 4094440"/>
+              <a:gd name="connsiteY118" fmla="*/ 127000 h 4254500"/>
+              <a:gd name="connsiteX119" fmla="*/ 2667000 w 4094440"/>
+              <a:gd name="connsiteY119" fmla="*/ 114300 h 4254500"/>
+              <a:gd name="connsiteX120" fmla="*/ 2590800 w 4094440"/>
+              <a:gd name="connsiteY120" fmla="*/ 50800 h 4254500"/>
+              <a:gd name="connsiteX121" fmla="*/ 2552700 w 4094440"/>
+              <a:gd name="connsiteY121" fmla="*/ 38100 h 4254500"/>
+              <a:gd name="connsiteX122" fmla="*/ 2463800 w 4094440"/>
+              <a:gd name="connsiteY122" fmla="*/ 0 h 4254500"/>
+              <a:gd name="connsiteX123" fmla="*/ 2298700 w 4094440"/>
+              <a:gd name="connsiteY123" fmla="*/ 25400 h 4254500"/>
+              <a:gd name="connsiteX124" fmla="*/ 2260600 w 4094440"/>
+              <a:gd name="connsiteY124" fmla="*/ 50800 h 4254500"/>
+              <a:gd name="connsiteX125" fmla="*/ 2222500 w 4094440"/>
+              <a:gd name="connsiteY125" fmla="*/ 63500 h 4254500"/>
+              <a:gd name="connsiteX126" fmla="*/ 2184400 w 4094440"/>
+              <a:gd name="connsiteY126" fmla="*/ 88900 h 4254500"/>
+              <a:gd name="connsiteX127" fmla="*/ 2146300 w 4094440"/>
+              <a:gd name="connsiteY127" fmla="*/ 101600 h 4254500"/>
+              <a:gd name="connsiteX128" fmla="*/ 2108200 w 4094440"/>
+              <a:gd name="connsiteY128" fmla="*/ 127000 h 4254500"/>
+              <a:gd name="connsiteX129" fmla="*/ 1968500 w 4094440"/>
+              <a:gd name="connsiteY129" fmla="*/ 139700 h 4254500"/>
+            </a:gdLst>
+            <a:ahLst/>
+            <a:cxnLst>
+              <a:cxn ang="0">
+                <a:pos x="connsiteX0" y="connsiteY0"/>
+              </a:cxn>
+              <a:cxn ang="0">
+                <a:pos x="connsiteX1" y="connsiteY1"/>
+              </a:cxn>
+              <a:cxn ang="0">
+                <a:pos x="connsiteX2" y="connsiteY2"/>
+              </a:cxn>
+              <a:cxn ang="0">
+                <a:pos x="connsiteX3" y="connsiteY3"/>
+              </a:cxn>
+              <a:cxn ang="0">
+                <a:pos x="connsiteX4" y="connsiteY4"/>
+              </a:cxn>
+              <a:cxn ang="0">
+                <a:pos x="connsiteX5" y="connsiteY5"/>
+              </a:cxn>
+              <a:cxn ang="0">
+                <a:pos x="connsiteX6" y="connsiteY6"/>
+              </a:cxn>
+              <a:cxn ang="0">
+                <a:pos x="connsiteX7" y="connsiteY7"/>
+              </a:cxn>
+              <a:cxn ang="0">
+                <a:pos x="connsiteX8" y="connsiteY8"/>
+              </a:cxn>
+              <a:cxn ang="0">
+                <a:pos x="connsiteX9" y="connsiteY9"/>
+              </a:cxn>
+              <a:cxn ang="0">
+                <a:pos x="connsiteX10" y="connsiteY10"/>
+              </a:cxn>
+              <a:cxn ang="0">
+                <a:pos x="connsiteX11" y="connsiteY11"/>
+              </a:cxn>
+              <a:cxn ang="0">
+                <a:pos x="connsiteX12" y="connsiteY12"/>
+              </a:cxn>
+              <a:cxn ang="0">
+                <a:pos x="connsiteX13" y="connsiteY13"/>
+              </a:cxn>
+              <a:cxn ang="0">
+                <a:pos x="connsiteX14" y="connsiteY14"/>
+              </a:cxn>
+              <a:cxn ang="0">
+                <a:pos x="connsiteX15" y="connsiteY15"/>
+              </a:cxn>
+              <a:cxn ang="0">
+                <a:pos x="connsiteX16" y="connsiteY16"/>
+              </a:cxn>
+              <a:cxn ang="0">
+                <a:pos x="connsiteX17" y="connsiteY17"/>
+              </a:cxn>
+              <a:cxn ang="0">
+                <a:pos x="connsiteX18" y="connsiteY18"/>
+              </a:cxn>
+              <a:cxn ang="0">
+                <a:pos x="connsiteX19" y="connsiteY19"/>
+              </a:cxn>
+              <a:cxn ang="0">
+                <a:pos x="connsiteX20" y="connsiteY20"/>
+              </a:cxn>
+              <a:cxn ang="0">
+                <a:pos x="connsiteX21" y="connsiteY21"/>
+              </a:cxn>
+              <a:cxn ang="0">
+                <a:pos x="connsiteX22" y="connsiteY22"/>
+              </a:cxn>
+              <a:cxn ang="0">
+                <a:pos x="connsiteX23" y="connsiteY23"/>
+              </a:cxn>
+              <a:cxn ang="0">
+                <a:pos x="connsiteX24" y="connsiteY24"/>
+              </a:cxn>
+              <a:cxn ang="0">
+                <a:pos x="connsiteX25" y="connsiteY25"/>
+              </a:cxn>
+              <a:cxn ang="0">
+                <a:pos x="connsiteX26" y="connsiteY26"/>
+              </a:cxn>
+              <a:cxn ang="0">
+                <a:pos x="connsiteX27" y="connsiteY27"/>
+              </a:cxn>
+              <a:cxn ang="0">
+                <a:pos x="connsiteX28" y="connsiteY28"/>
+              </a:cxn>
+              <a:cxn ang="0">
+                <a:pos x="connsiteX29" y="connsiteY29"/>
+              </a:cxn>
+              <a:cxn ang="0">
+                <a:pos x="connsiteX30" y="connsiteY30"/>
+              </a:cxn>
+              <a:cxn ang="0">
+                <a:pos x="connsiteX31" y="connsiteY31"/>
+              </a:cxn>
+              <a:cxn ang="0">
+                <a:pos x="connsiteX32" y="connsiteY32"/>
+              </a:cxn>
+              <a:cxn ang="0">
+                <a:pos x="connsiteX33" y="connsiteY33"/>
+              </a:cxn>
+              <a:cxn ang="0">
+                <a:pos x="connsiteX34" y="connsiteY34"/>
+              </a:cxn>
+              <a:cxn ang="0">
+                <a:pos x="connsiteX35" y="connsiteY35"/>
+              </a:cxn>
+              <a:cxn ang="0">
+                <a:pos x="connsiteX36" y="connsiteY36"/>
+              </a:cxn>
+              <a:cxn ang="0">
+                <a:pos x="connsiteX37" y="connsiteY37"/>
+              </a:cxn>
+              <a:cxn ang="0">
+                <a:pos x="connsiteX38" y="connsiteY38"/>
+              </a:cxn>
+              <a:cxn ang="0">
+                <a:pos x="connsiteX39" y="connsiteY39"/>
+              </a:cxn>
+              <a:cxn ang="0">
+                <a:pos x="connsiteX40" y="connsiteY40"/>
+              </a:cxn>
+              <a:cxn ang="0">
+                <a:pos x="connsiteX41" y="connsiteY41"/>
+              </a:cxn>
+              <a:cxn ang="0">
+                <a:pos x="connsiteX42" y="connsiteY42"/>
+              </a:cxn>
+              <a:cxn ang="0">
+                <a:pos x="connsiteX43" y="connsiteY43"/>
+              </a:cxn>
+              <a:cxn ang="0">
+                <a:pos x="connsiteX44" y="connsiteY44"/>
+              </a:cxn>
+              <a:cxn ang="0">
+                <a:pos x="connsiteX45" y="connsiteY45"/>
+              </a:cxn>
+              <a:cxn ang="0">
+                <a:pos x="connsiteX46" y="connsiteY46"/>
+              </a:cxn>
+              <a:cxn ang="0">
+                <a:pos x="connsiteX47" y="connsiteY47"/>
+              </a:cxn>
+              <a:cxn ang="0">
+                <a:pos x="connsiteX48" y="connsiteY48"/>
+              </a:cxn>
+              <a:cxn ang="0">
+                <a:pos x="connsiteX49" y="connsiteY49"/>
+              </a:cxn>
+              <a:cxn ang="0">
+                <a:pos x="connsiteX50" y="connsiteY50"/>
+              </a:cxn>
+              <a:cxn ang="0">
+                <a:pos x="connsiteX51" y="connsiteY51"/>
+              </a:cxn>
+              <a:cxn ang="0">
+                <a:pos x="connsiteX52" y="connsiteY52"/>
+              </a:cxn>
+              <a:cxn ang="0">
+                <a:pos x="connsiteX53" y="connsiteY53"/>
+              </a:cxn>
+              <a:cxn ang="0">
+                <a:pos x="connsiteX54" y="connsiteY54"/>
+              </a:cxn>
+              <a:cxn ang="0">
+                <a:pos x="connsiteX55" y="connsiteY55"/>
+              </a:cxn>
+              <a:cxn ang="0">
+                <a:pos x="connsiteX56" y="connsiteY56"/>
+              </a:cxn>
+              <a:cxn ang="0">
+                <a:pos x="connsiteX57" y="connsiteY57"/>
+              </a:cxn>
+              <a:cxn ang="0">
+                <a:pos x="connsiteX58" y="connsiteY58"/>
+              </a:cxn>
+              <a:cxn ang="0">
+                <a:pos x="connsiteX59" y="connsiteY59"/>
+              </a:cxn>
+              <a:cxn ang="0">
+                <a:pos x="connsiteX60" y="connsiteY60"/>
+              </a:cxn>
+              <a:cxn ang="0">
+                <a:pos x="connsiteX61" y="connsiteY61"/>
+              </a:cxn>
+              <a:cxn ang="0">
+                <a:pos x="connsiteX62" y="connsiteY62"/>
+              </a:cxn>
+              <a:cxn ang="0">
+                <a:pos x="connsiteX63" y="connsiteY63"/>
+              </a:cxn>
+              <a:cxn ang="0">
+                <a:pos x="connsiteX64" y="connsiteY64"/>
+              </a:cxn>
+              <a:cxn ang="0">
+                <a:pos x="connsiteX65" y="connsiteY65"/>
+              </a:cxn>
+              <a:cxn ang="0">
+                <a:pos x="connsiteX66" y="connsiteY66"/>
+              </a:cxn>
+              <a:cxn ang="0">
+                <a:pos x="connsiteX67" y="connsiteY67"/>
+              </a:cxn>
+              <a:cxn ang="0">
+                <a:pos x="connsiteX68" y="connsiteY68"/>
+              </a:cxn>
+              <a:cxn ang="0">
+                <a:pos x="connsiteX69" y="connsiteY69"/>
+              </a:cxn>
+              <a:cxn ang="0">
+                <a:pos x="connsiteX70" y="connsiteY70"/>
+              </a:cxn>
+              <a:cxn ang="0">
+                <a:pos x="connsiteX71" y="connsiteY71"/>
+              </a:cxn>
+              <a:cxn ang="0">
+                <a:pos x="connsiteX72" y="connsiteY72"/>
+              </a:cxn>
+              <a:cxn ang="0">
+                <a:pos x="connsiteX73" y="connsiteY73"/>
+              </a:cxn>
+              <a:cxn ang="0">
+                <a:pos x="connsiteX74" y="connsiteY74"/>
+              </a:cxn>
+              <a:cxn ang="0">
+                <a:pos x="connsiteX75" y="connsiteY75"/>
+              </a:cxn>
+              <a:cxn ang="0">
+                <a:pos x="connsiteX76" y="connsiteY76"/>
+              </a:cxn>
+              <a:cxn ang="0">
+                <a:pos x="connsiteX77" y="connsiteY77"/>
+              </a:cxn>
+              <a:cxn ang="0">
+                <a:pos x="connsiteX78" y="connsiteY78"/>
+              </a:cxn>
+              <a:cxn ang="0">
+                <a:pos x="connsiteX79" y="connsiteY79"/>
+              </a:cxn>
+              <a:cxn ang="0">
+                <a:pos x="connsiteX80" y="connsiteY80"/>
+              </a:cxn>
+              <a:cxn ang="0">
+                <a:pos x="connsiteX81" y="connsiteY81"/>
+              </a:cxn>
+              <a:cxn ang="0">
+                <a:pos x="connsiteX82" y="connsiteY82"/>
+              </a:cxn>
+              <a:cxn ang="0">
+                <a:pos x="connsiteX83" y="connsiteY83"/>
+              </a:cxn>
+              <a:cxn ang="0">
+                <a:pos x="connsiteX84" y="connsiteY84"/>
+              </a:cxn>
+              <a:cxn ang="0">
+                <a:pos x="connsiteX85" y="connsiteY85"/>
+              </a:cxn>
+              <a:cxn ang="0">
+                <a:pos x="connsiteX86" y="connsiteY86"/>
+              </a:cxn>
+              <a:cxn ang="0">
+                <a:pos x="connsiteX87" y="connsiteY87"/>
+              </a:cxn>
+              <a:cxn ang="0">
+                <a:pos x="connsiteX88" y="connsiteY88"/>
+              </a:cxn>
+              <a:cxn ang="0">
+                <a:pos x="connsiteX89" y="connsiteY89"/>
+              </a:cxn>
+              <a:cxn ang="0">
+                <a:pos x="connsiteX90" y="connsiteY90"/>
+              </a:cxn>
+              <a:cxn ang="0">
+                <a:pos x="connsiteX91" y="connsiteY91"/>
+              </a:cxn>
+              <a:cxn ang="0">
+                <a:pos x="connsiteX92" y="connsiteY92"/>
+              </a:cxn>
+              <a:cxn ang="0">
+                <a:pos x="connsiteX93" y="connsiteY93"/>
+              </a:cxn>
+              <a:cxn ang="0">
+                <a:pos x="connsiteX94" y="connsiteY94"/>
+              </a:cxn>
+              <a:cxn ang="0">
+                <a:pos x="connsiteX95" y="connsiteY95"/>
+              </a:cxn>
+              <a:cxn ang="0">
+                <a:pos x="connsiteX96" y="connsiteY96"/>
+              </a:cxn>
+              <a:cxn ang="0">
+                <a:pos x="connsiteX97" y="connsiteY97"/>
+              </a:cxn>
+              <a:cxn ang="0">
+                <a:pos x="connsiteX98" y="connsiteY98"/>
+              </a:cxn>
+              <a:cxn ang="0">
+                <a:pos x="connsiteX99" y="connsiteY99"/>
+              </a:cxn>
+              <a:cxn ang="0">
+                <a:pos x="connsiteX100" y="connsiteY100"/>
+              </a:cxn>
+              <a:cxn ang="0">
+                <a:pos x="connsiteX101" y="connsiteY101"/>
+              </a:cxn>
+              <a:cxn ang="0">
+                <a:pos x="connsiteX102" y="connsiteY102"/>
+              </a:cxn>
+              <a:cxn ang="0">
+                <a:pos x="connsiteX103" y="connsiteY103"/>
+              </a:cxn>
+              <a:cxn ang="0">
+                <a:pos x="connsiteX104" y="connsiteY104"/>
+              </a:cxn>
+              <a:cxn ang="0">
+                <a:pos x="connsiteX105" y="connsiteY105"/>
+              </a:cxn>
+              <a:cxn ang="0">
+                <a:pos x="connsiteX106" y="connsiteY106"/>
+              </a:cxn>
+              <a:cxn ang="0">
+                <a:pos x="connsiteX107" y="connsiteY107"/>
+              </a:cxn>
+              <a:cxn ang="0">
+                <a:pos x="connsiteX108" y="connsiteY108"/>
+              </a:cxn>
+              <a:cxn ang="0">
+                <a:pos x="connsiteX109" y="connsiteY109"/>
+              </a:cxn>
+              <a:cxn ang="0">
+                <a:pos x="connsiteX110" y="connsiteY110"/>
+              </a:cxn>
+              <a:cxn ang="0">
+                <a:pos x="connsiteX111" y="connsiteY111"/>
+              </a:cxn>
+              <a:cxn ang="0">
+                <a:pos x="connsiteX112" y="connsiteY112"/>
+              </a:cxn>
+              <a:cxn ang="0">
+                <a:pos x="connsiteX113" y="connsiteY113"/>
+              </a:cxn>
+              <a:cxn ang="0">
+                <a:pos x="connsiteX114" y="connsiteY114"/>
+              </a:cxn>
+              <a:cxn ang="0">
+                <a:pos x="connsiteX115" y="connsiteY115"/>
+              </a:cxn>
+              <a:cxn ang="0">
+                <a:pos x="connsiteX116" y="connsiteY116"/>
+              </a:cxn>
+              <a:cxn ang="0">
+                <a:pos x="connsiteX117" y="connsiteY117"/>
+              </a:cxn>
+              <a:cxn ang="0">
+                <a:pos x="connsiteX118" y="connsiteY118"/>
+              </a:cxn>
+              <a:cxn ang="0">
+                <a:pos x="connsiteX119" y="connsiteY119"/>
+              </a:cxn>
+              <a:cxn ang="0">
+                <a:pos x="connsiteX120" y="connsiteY120"/>
+              </a:cxn>
+              <a:cxn ang="0">
+                <a:pos x="connsiteX121" y="connsiteY121"/>
+              </a:cxn>
+              <a:cxn ang="0">
+                <a:pos x="connsiteX122" y="connsiteY122"/>
+              </a:cxn>
+              <a:cxn ang="0">
+                <a:pos x="connsiteX123" y="connsiteY123"/>
+              </a:cxn>
+              <a:cxn ang="0">
+                <a:pos x="connsiteX124" y="connsiteY124"/>
+              </a:cxn>
+              <a:cxn ang="0">
+                <a:pos x="connsiteX125" y="connsiteY125"/>
+              </a:cxn>
+              <a:cxn ang="0">
+                <a:pos x="connsiteX126" y="connsiteY126"/>
+              </a:cxn>
+              <a:cxn ang="0">
+                <a:pos x="connsiteX127" y="connsiteY127"/>
+              </a:cxn>
+              <a:cxn ang="0">
+                <a:pos x="connsiteX128" y="connsiteY128"/>
+              </a:cxn>
+              <a:cxn ang="0">
+                <a:pos x="connsiteX129" y="connsiteY129"/>
+              </a:cxn>
+            </a:cxnLst>
+            <a:rect l="l" t="t" r="r" b="b"/>
+            <a:pathLst>
+              <a:path w="4094440" h="4254500">
+                <a:moveTo>
+                  <a:pt x="1968500" y="139700"/>
+                </a:moveTo>
+                <a:lnTo>
+                  <a:pt x="1968500" y="139700"/>
+                </a:lnTo>
+                <a:lnTo>
+                  <a:pt x="1854200" y="152400"/>
+                </a:lnTo>
+                <a:cubicBezTo>
+                  <a:pt x="1797977" y="159428"/>
+                  <a:pt x="1765211" y="162587"/>
+                  <a:pt x="1714500" y="177800"/>
+                </a:cubicBezTo>
+                <a:cubicBezTo>
+                  <a:pt x="1688855" y="185493"/>
+                  <a:pt x="1663700" y="194733"/>
+                  <a:pt x="1638300" y="203200"/>
+                </a:cubicBezTo>
+                <a:cubicBezTo>
+                  <a:pt x="1625600" y="207433"/>
+                  <a:pt x="1611339" y="208474"/>
+                  <a:pt x="1600200" y="215900"/>
+                </a:cubicBezTo>
+                <a:cubicBezTo>
+                  <a:pt x="1491011" y="288693"/>
+                  <a:pt x="1629160" y="201420"/>
+                  <a:pt x="1524000" y="254000"/>
+                </a:cubicBezTo>
+                <a:cubicBezTo>
+                  <a:pt x="1440603" y="295698"/>
+                  <a:pt x="1540759" y="272035"/>
+                  <a:pt x="1409700" y="304800"/>
+                </a:cubicBezTo>
+                <a:cubicBezTo>
+                  <a:pt x="1291704" y="334299"/>
+                  <a:pt x="1438395" y="299061"/>
+                  <a:pt x="1282700" y="330200"/>
+                </a:cubicBezTo>
+                <a:cubicBezTo>
+                  <a:pt x="1168533" y="353033"/>
+                  <a:pt x="1301483" y="333419"/>
+                  <a:pt x="1168400" y="355600"/>
+                </a:cubicBezTo>
+                <a:cubicBezTo>
+                  <a:pt x="1138873" y="360521"/>
+                  <a:pt x="1109133" y="364067"/>
+                  <a:pt x="1079500" y="368300"/>
+                </a:cubicBezTo>
+                <a:cubicBezTo>
+                  <a:pt x="1041315" y="381028"/>
+                  <a:pt x="1036126" y="379045"/>
+                  <a:pt x="1003300" y="406400"/>
+                </a:cubicBezTo>
+                <a:cubicBezTo>
+                  <a:pt x="989502" y="417898"/>
+                  <a:pt x="978998" y="433002"/>
+                  <a:pt x="965200" y="444500"/>
+                </a:cubicBezTo>
+                <a:cubicBezTo>
+                  <a:pt x="910709" y="489909"/>
+                  <a:pt x="939595" y="447286"/>
+                  <a:pt x="889000" y="508000"/>
+                </a:cubicBezTo>
+                <a:cubicBezTo>
+                  <a:pt x="879229" y="519726"/>
+                  <a:pt x="873741" y="534692"/>
+                  <a:pt x="863600" y="546100"/>
+                </a:cubicBezTo>
+                <a:cubicBezTo>
+                  <a:pt x="839735" y="572948"/>
+                  <a:pt x="817288" y="602375"/>
+                  <a:pt x="787400" y="622300"/>
+                </a:cubicBezTo>
+                <a:lnTo>
+                  <a:pt x="711200" y="673100"/>
+                </a:lnTo>
+                <a:cubicBezTo>
+                  <a:pt x="702733" y="690033"/>
+                  <a:pt x="695540" y="707666"/>
+                  <a:pt x="685800" y="723900"/>
+                </a:cubicBezTo>
+                <a:cubicBezTo>
+                  <a:pt x="670094" y="750077"/>
+                  <a:pt x="644653" y="771140"/>
+                  <a:pt x="635000" y="800100"/>
+                </a:cubicBezTo>
+                <a:cubicBezTo>
+                  <a:pt x="616620" y="855239"/>
+                  <a:pt x="631766" y="828734"/>
+                  <a:pt x="584200" y="876300"/>
+                </a:cubicBezTo>
+                <a:cubicBezTo>
+                  <a:pt x="570966" y="916003"/>
+                  <a:pt x="558131" y="965646"/>
+                  <a:pt x="520700" y="990600"/>
+                </a:cubicBezTo>
+                <a:lnTo>
+                  <a:pt x="482600" y="1016000"/>
+                </a:lnTo>
+                <a:cubicBezTo>
+                  <a:pt x="474133" y="1041400"/>
+                  <a:pt x="472052" y="1069923"/>
+                  <a:pt x="457200" y="1092200"/>
+                </a:cubicBezTo>
+                <a:cubicBezTo>
+                  <a:pt x="448733" y="1104900"/>
+                  <a:pt x="438626" y="1116648"/>
+                  <a:pt x="431800" y="1130300"/>
+                </a:cubicBezTo>
+                <a:cubicBezTo>
+                  <a:pt x="425813" y="1142274"/>
+                  <a:pt x="425601" y="1156698"/>
+                  <a:pt x="419100" y="1168400"/>
+                </a:cubicBezTo>
+                <a:cubicBezTo>
+                  <a:pt x="404275" y="1195085"/>
+                  <a:pt x="385233" y="1219200"/>
+                  <a:pt x="368300" y="1244600"/>
+                </a:cubicBezTo>
+                <a:cubicBezTo>
+                  <a:pt x="359833" y="1257300"/>
+                  <a:pt x="347727" y="1268220"/>
+                  <a:pt x="342900" y="1282700"/>
+                </a:cubicBezTo>
+                <a:cubicBezTo>
+                  <a:pt x="312673" y="1373380"/>
+                  <a:pt x="332352" y="1336623"/>
+                  <a:pt x="292100" y="1397000"/>
+                </a:cubicBezTo>
+                <a:cubicBezTo>
+                  <a:pt x="285655" y="1422779"/>
+                  <a:pt x="277632" y="1460393"/>
+                  <a:pt x="266700" y="1485900"/>
+                </a:cubicBezTo>
+                <a:cubicBezTo>
+                  <a:pt x="247364" y="1531016"/>
+                  <a:pt x="241409" y="1536536"/>
+                  <a:pt x="215900" y="1574800"/>
+                </a:cubicBezTo>
+                <a:cubicBezTo>
+                  <a:pt x="196706" y="1651575"/>
+                  <a:pt x="208720" y="1609041"/>
+                  <a:pt x="177800" y="1701800"/>
+                </a:cubicBezTo>
+                <a:cubicBezTo>
+                  <a:pt x="173567" y="1714500"/>
+                  <a:pt x="167725" y="1726773"/>
+                  <a:pt x="165100" y="1739900"/>
+                </a:cubicBezTo>
+                <a:cubicBezTo>
+                  <a:pt x="160867" y="1761067"/>
+                  <a:pt x="159226" y="1782922"/>
+                  <a:pt x="152400" y="1803400"/>
+                </a:cubicBezTo>
+                <a:cubicBezTo>
+                  <a:pt x="146413" y="1821361"/>
+                  <a:pt x="133647" y="1836473"/>
+                  <a:pt x="127000" y="1854200"/>
+                </a:cubicBezTo>
+                <a:cubicBezTo>
+                  <a:pt x="120871" y="1870543"/>
+                  <a:pt x="119095" y="1888217"/>
+                  <a:pt x="114300" y="1905000"/>
+                </a:cubicBezTo>
+                <a:cubicBezTo>
+                  <a:pt x="93086" y="1979249"/>
+                  <a:pt x="108751" y="1904570"/>
+                  <a:pt x="88900" y="1993900"/>
+                </a:cubicBezTo>
+                <a:cubicBezTo>
+                  <a:pt x="84217" y="2014972"/>
+                  <a:pt x="81435" y="2036459"/>
+                  <a:pt x="76200" y="2057400"/>
+                </a:cubicBezTo>
+                <a:cubicBezTo>
+                  <a:pt x="57512" y="2132154"/>
+                  <a:pt x="53576" y="2073292"/>
+                  <a:pt x="38100" y="2197100"/>
+                </a:cubicBezTo>
+                <a:lnTo>
+                  <a:pt x="25400" y="2298700"/>
+                </a:lnTo>
+                <a:cubicBezTo>
+                  <a:pt x="21167" y="2374900"/>
+                  <a:pt x="17461" y="2451131"/>
+                  <a:pt x="12700" y="2527300"/>
+                </a:cubicBezTo>
+                <a:cubicBezTo>
+                  <a:pt x="8994" y="2586602"/>
+                  <a:pt x="0" y="2645682"/>
+                  <a:pt x="0" y="2705100"/>
+                </a:cubicBezTo>
+                <a:cubicBezTo>
+                  <a:pt x="0" y="2832171"/>
+                  <a:pt x="2699" y="2959424"/>
+                  <a:pt x="12700" y="3086100"/>
+                </a:cubicBezTo>
+                <a:cubicBezTo>
+                  <a:pt x="17639" y="3148663"/>
+                  <a:pt x="36152" y="3174533"/>
+                  <a:pt x="50800" y="3225800"/>
+                </a:cubicBezTo>
+                <a:cubicBezTo>
+                  <a:pt x="59674" y="3256860"/>
+                  <a:pt x="73810" y="3330165"/>
+                  <a:pt x="88900" y="3352800"/>
+                </a:cubicBezTo>
+                <a:lnTo>
+                  <a:pt x="114300" y="3390900"/>
+                </a:lnTo>
+                <a:cubicBezTo>
+                  <a:pt x="120745" y="3416679"/>
+                  <a:pt x="128768" y="3454293"/>
+                  <a:pt x="139700" y="3479800"/>
+                </a:cubicBezTo>
+                <a:cubicBezTo>
+                  <a:pt x="165100" y="3539067"/>
+                  <a:pt x="176046" y="3534532"/>
+                  <a:pt x="190500" y="3606800"/>
+                </a:cubicBezTo>
+                <a:cubicBezTo>
+                  <a:pt x="216320" y="3735902"/>
+                  <a:pt x="189865" y="3617278"/>
+                  <a:pt x="215900" y="3708400"/>
+                </a:cubicBezTo>
+                <a:cubicBezTo>
+                  <a:pt x="221325" y="3727389"/>
+                  <a:pt x="231150" y="3777000"/>
+                  <a:pt x="241300" y="3797300"/>
+                </a:cubicBezTo>
+                <a:cubicBezTo>
+                  <a:pt x="248126" y="3810952"/>
+                  <a:pt x="260501" y="3821452"/>
+                  <a:pt x="266700" y="3835400"/>
+                </a:cubicBezTo>
+                <a:cubicBezTo>
+                  <a:pt x="277574" y="3859866"/>
+                  <a:pt x="277248" y="3889323"/>
+                  <a:pt x="292100" y="3911600"/>
+                </a:cubicBezTo>
+                <a:cubicBezTo>
+                  <a:pt x="309033" y="3937000"/>
+                  <a:pt x="333247" y="3958840"/>
+                  <a:pt x="342900" y="3987800"/>
+                </a:cubicBezTo>
+                <a:cubicBezTo>
+                  <a:pt x="351266" y="4012899"/>
+                  <a:pt x="358619" y="4046095"/>
+                  <a:pt x="381000" y="4064000"/>
+                </a:cubicBezTo>
+                <a:cubicBezTo>
+                  <a:pt x="391453" y="4072363"/>
+                  <a:pt x="407126" y="4070713"/>
+                  <a:pt x="419100" y="4076700"/>
+                </a:cubicBezTo>
+                <a:cubicBezTo>
+                  <a:pt x="432752" y="4083526"/>
+                  <a:pt x="441973" y="4101050"/>
+                  <a:pt x="457200" y="4102100"/>
+                </a:cubicBezTo>
+                <a:cubicBezTo>
+                  <a:pt x="689635" y="4118130"/>
+                  <a:pt x="1155700" y="4127500"/>
+                  <a:pt x="1155700" y="4127500"/>
+                </a:cubicBezTo>
+                <a:lnTo>
+                  <a:pt x="1219200" y="4140200"/>
+                </a:lnTo>
+                <a:cubicBezTo>
+                  <a:pt x="1244535" y="4144806"/>
+                  <a:pt x="1270418" y="4146655"/>
+                  <a:pt x="1295400" y="4152900"/>
+                </a:cubicBezTo>
+                <a:cubicBezTo>
+                  <a:pt x="1506817" y="4205754"/>
+                  <a:pt x="1264739" y="4151146"/>
+                  <a:pt x="1422400" y="4203700"/>
+                </a:cubicBezTo>
+                <a:cubicBezTo>
+                  <a:pt x="1440150" y="4209617"/>
+                  <a:pt x="1549306" y="4226968"/>
+                  <a:pt x="1562100" y="4229100"/>
+                </a:cubicBezTo>
+                <a:cubicBezTo>
+                  <a:pt x="1853026" y="4221444"/>
+                  <a:pt x="2011108" y="4204129"/>
+                  <a:pt x="2273300" y="4229100"/>
+                </a:cubicBezTo>
+                <a:cubicBezTo>
+                  <a:pt x="2286627" y="4230369"/>
+                  <a:pt x="2298332" y="4238896"/>
+                  <a:pt x="2311400" y="4241800"/>
+                </a:cubicBezTo>
+                <a:cubicBezTo>
+                  <a:pt x="2336537" y="4247386"/>
+                  <a:pt x="2362200" y="4250267"/>
+                  <a:pt x="2387600" y="4254500"/>
+                </a:cubicBezTo>
+                <a:lnTo>
+                  <a:pt x="2971800" y="4241800"/>
+                </a:lnTo>
+                <a:cubicBezTo>
+                  <a:pt x="2989241" y="4241102"/>
+                  <a:pt x="3005171" y="4230042"/>
+                  <a:pt x="3022600" y="4229100"/>
+                </a:cubicBezTo>
+                <a:cubicBezTo>
+                  <a:pt x="3162160" y="4221556"/>
+                  <a:pt x="3302000" y="4220633"/>
+                  <a:pt x="3441700" y="4216400"/>
+                </a:cubicBezTo>
+                <a:cubicBezTo>
+                  <a:pt x="3471131" y="4194327"/>
+                  <a:pt x="3507857" y="4170524"/>
+                  <a:pt x="3530600" y="4140200"/>
+                </a:cubicBezTo>
+                <a:cubicBezTo>
+                  <a:pt x="3545411" y="4120453"/>
+                  <a:pt x="3555448" y="4097525"/>
+                  <a:pt x="3568700" y="4076700"/>
+                </a:cubicBezTo>
+                <a:cubicBezTo>
+                  <a:pt x="3585089" y="4050946"/>
+                  <a:pt x="3605848" y="4027804"/>
+                  <a:pt x="3619500" y="4000500"/>
+                </a:cubicBezTo>
+                <a:cubicBezTo>
+                  <a:pt x="3677126" y="3885248"/>
+                  <a:pt x="3649297" y="3930405"/>
+                  <a:pt x="3695700" y="3860800"/>
+                </a:cubicBezTo>
+                <a:cubicBezTo>
+                  <a:pt x="3699933" y="3843867"/>
+                  <a:pt x="3701524" y="3826043"/>
+                  <a:pt x="3708400" y="3810000"/>
+                </a:cubicBezTo>
+                <a:cubicBezTo>
+                  <a:pt x="3714413" y="3795971"/>
+                  <a:pt x="3728973" y="3786380"/>
+                  <a:pt x="3733800" y="3771900"/>
+                </a:cubicBezTo>
+                <a:cubicBezTo>
+                  <a:pt x="3741943" y="3747471"/>
+                  <a:pt x="3739101" y="3720364"/>
+                  <a:pt x="3746500" y="3695700"/>
+                </a:cubicBezTo>
+                <a:cubicBezTo>
+                  <a:pt x="3751940" y="3677566"/>
+                  <a:pt x="3764442" y="3662301"/>
+                  <a:pt x="3771900" y="3644900"/>
+                </a:cubicBezTo>
+                <a:cubicBezTo>
+                  <a:pt x="3777173" y="3632595"/>
+                  <a:pt x="3779327" y="3619105"/>
+                  <a:pt x="3784600" y="3606800"/>
+                </a:cubicBezTo>
+                <a:cubicBezTo>
+                  <a:pt x="3792058" y="3589399"/>
+                  <a:pt x="3802969" y="3573578"/>
+                  <a:pt x="3810000" y="3556000"/>
+                </a:cubicBezTo>
+                <a:cubicBezTo>
+                  <a:pt x="3819944" y="3531141"/>
+                  <a:pt x="3819336" y="3501219"/>
+                  <a:pt x="3835400" y="3479800"/>
+                </a:cubicBezTo>
+                <a:cubicBezTo>
+                  <a:pt x="3933502" y="3348998"/>
+                  <a:pt x="3815747" y="3515175"/>
+                  <a:pt x="3898900" y="3365500"/>
+                </a:cubicBezTo>
+                <a:cubicBezTo>
+                  <a:pt x="3909179" y="3346997"/>
+                  <a:pt x="3926110" y="3332850"/>
+                  <a:pt x="3937000" y="3314700"/>
+                </a:cubicBezTo>
+                <a:cubicBezTo>
+                  <a:pt x="3951611" y="3290349"/>
+                  <a:pt x="3962400" y="3263900"/>
+                  <a:pt x="3975100" y="3238500"/>
+                </a:cubicBezTo>
+                <a:cubicBezTo>
+                  <a:pt x="3999506" y="3116468"/>
+                  <a:pt x="3971136" y="3229360"/>
+                  <a:pt x="4013200" y="3124200"/>
+                </a:cubicBezTo>
+                <a:cubicBezTo>
+                  <a:pt x="4058540" y="3010850"/>
+                  <a:pt x="4015133" y="3083201"/>
+                  <a:pt x="4064000" y="3009900"/>
+                </a:cubicBezTo>
+                <a:cubicBezTo>
+                  <a:pt x="4114310" y="2808660"/>
+                  <a:pt x="4090134" y="2946057"/>
+                  <a:pt x="4076700" y="2603500"/>
+                </a:cubicBezTo>
+                <a:cubicBezTo>
+                  <a:pt x="4072218" y="2489209"/>
+                  <a:pt x="4075381" y="2374411"/>
+                  <a:pt x="4064000" y="2260600"/>
+                </a:cubicBezTo>
+                <a:cubicBezTo>
+                  <a:pt x="4062481" y="2245412"/>
+                  <a:pt x="4044799" y="2236448"/>
+                  <a:pt x="4038600" y="2222500"/>
+                </a:cubicBezTo>
+                <a:cubicBezTo>
+                  <a:pt x="4027726" y="2198034"/>
+                  <a:pt x="4020893" y="2171945"/>
+                  <a:pt x="4013200" y="2146300"/>
+                </a:cubicBezTo>
+                <a:cubicBezTo>
+                  <a:pt x="4008184" y="2129582"/>
+                  <a:pt x="4008306" y="2111112"/>
+                  <a:pt x="4000500" y="2095500"/>
+                </a:cubicBezTo>
+                <a:cubicBezTo>
+                  <a:pt x="3986848" y="2068196"/>
+                  <a:pt x="3959353" y="2048260"/>
+                  <a:pt x="3949700" y="2019300"/>
+                </a:cubicBezTo>
+                <a:cubicBezTo>
+                  <a:pt x="3941233" y="1993900"/>
+                  <a:pt x="3939152" y="1965377"/>
+                  <a:pt x="3924300" y="1943100"/>
+                </a:cubicBezTo>
+                <a:cubicBezTo>
+                  <a:pt x="3915833" y="1930400"/>
+                  <a:pt x="3905099" y="1918948"/>
+                  <a:pt x="3898900" y="1905000"/>
+                </a:cubicBezTo>
+                <a:cubicBezTo>
+                  <a:pt x="3888026" y="1880534"/>
+                  <a:pt x="3881967" y="1854200"/>
+                  <a:pt x="3873500" y="1828800"/>
+                </a:cubicBezTo>
+                <a:cubicBezTo>
+                  <a:pt x="3844673" y="1742320"/>
+                  <a:pt x="3880958" y="1848687"/>
+                  <a:pt x="3835400" y="1727200"/>
+                </a:cubicBezTo>
+                <a:cubicBezTo>
+                  <a:pt x="3830700" y="1714665"/>
+                  <a:pt x="3827400" y="1701635"/>
+                  <a:pt x="3822700" y="1689100"/>
+                </a:cubicBezTo>
+                <a:cubicBezTo>
+                  <a:pt x="3814695" y="1667754"/>
+                  <a:pt x="3805305" y="1646946"/>
+                  <a:pt x="3797300" y="1625600"/>
+                </a:cubicBezTo>
+                <a:cubicBezTo>
+                  <a:pt x="3792600" y="1613065"/>
+                  <a:pt x="3790587" y="1599474"/>
+                  <a:pt x="3784600" y="1587500"/>
+                </a:cubicBezTo>
+                <a:cubicBezTo>
+                  <a:pt x="3777774" y="1573848"/>
+                  <a:pt x="3767667" y="1562100"/>
+                  <a:pt x="3759200" y="1549400"/>
+                </a:cubicBezTo>
+                <a:cubicBezTo>
+                  <a:pt x="3731704" y="1439414"/>
+                  <a:pt x="3765375" y="1558486"/>
+                  <a:pt x="3721100" y="1447800"/>
+                </a:cubicBezTo>
+                <a:cubicBezTo>
+                  <a:pt x="3711156" y="1422941"/>
+                  <a:pt x="3704167" y="1397000"/>
+                  <a:pt x="3695700" y="1371600"/>
+                </a:cubicBezTo>
+                <a:cubicBezTo>
+                  <a:pt x="3691467" y="1358900"/>
+                  <a:pt x="3690426" y="1344639"/>
+                  <a:pt x="3683000" y="1333500"/>
+                </a:cubicBezTo>
+                <a:cubicBezTo>
+                  <a:pt x="3674533" y="1320800"/>
+                  <a:pt x="3664426" y="1309052"/>
+                  <a:pt x="3657600" y="1295400"/>
+                </a:cubicBezTo>
+                <a:cubicBezTo>
+                  <a:pt x="3647405" y="1275010"/>
+                  <a:pt x="3639409" y="1253527"/>
+                  <a:pt x="3632200" y="1231900"/>
+                </a:cubicBezTo>
+                <a:cubicBezTo>
+                  <a:pt x="3626680" y="1215341"/>
+                  <a:pt x="3626376" y="1197143"/>
+                  <a:pt x="3619500" y="1181100"/>
+                </a:cubicBezTo>
+                <a:cubicBezTo>
+                  <a:pt x="3613487" y="1167071"/>
+                  <a:pt x="3600299" y="1156948"/>
+                  <a:pt x="3594100" y="1143000"/>
+                </a:cubicBezTo>
+                <a:cubicBezTo>
+                  <a:pt x="3535748" y="1011708"/>
+                  <a:pt x="3605523" y="1115898"/>
+                  <a:pt x="3530600" y="1016000"/>
+                </a:cubicBezTo>
+                <a:cubicBezTo>
+                  <a:pt x="3522133" y="977900"/>
+                  <a:pt x="3513976" y="939730"/>
+                  <a:pt x="3505200" y="901700"/>
+                </a:cubicBezTo>
+                <a:cubicBezTo>
+                  <a:pt x="3501275" y="884693"/>
+                  <a:pt x="3499376" y="866943"/>
+                  <a:pt x="3492500" y="850900"/>
+                </a:cubicBezTo>
+                <a:cubicBezTo>
+                  <a:pt x="3486487" y="836871"/>
+                  <a:pt x="3475567" y="825500"/>
+                  <a:pt x="3467100" y="812800"/>
+                </a:cubicBezTo>
+                <a:cubicBezTo>
+                  <a:pt x="3440669" y="707074"/>
+                  <a:pt x="3472853" y="811605"/>
+                  <a:pt x="3429000" y="723900"/>
+                </a:cubicBezTo>
+                <a:cubicBezTo>
+                  <a:pt x="3423013" y="711926"/>
+                  <a:pt x="3422287" y="697774"/>
+                  <a:pt x="3416300" y="685800"/>
+                </a:cubicBezTo>
+                <a:cubicBezTo>
+                  <a:pt x="3404951" y="663103"/>
+                  <a:pt x="3348778" y="592211"/>
+                  <a:pt x="3340100" y="584200"/>
+                </a:cubicBezTo>
+                <a:cubicBezTo>
+                  <a:pt x="3304633" y="551461"/>
+                  <a:pt x="3259930" y="529430"/>
+                  <a:pt x="3225800" y="495300"/>
+                </a:cubicBezTo>
+                <a:cubicBezTo>
+                  <a:pt x="3204633" y="474133"/>
+                  <a:pt x="3185929" y="450178"/>
+                  <a:pt x="3162300" y="431800"/>
+                </a:cubicBezTo>
+                <a:cubicBezTo>
+                  <a:pt x="3147356" y="420177"/>
+                  <a:pt x="3126646" y="417759"/>
+                  <a:pt x="3111500" y="406400"/>
+                </a:cubicBezTo>
+                <a:cubicBezTo>
+                  <a:pt x="3092342" y="392032"/>
+                  <a:pt x="3078722" y="371369"/>
+                  <a:pt x="3060700" y="355600"/>
+                </a:cubicBezTo>
+                <a:cubicBezTo>
+                  <a:pt x="3010076" y="311304"/>
+                  <a:pt x="3004815" y="318344"/>
+                  <a:pt x="2946400" y="279400"/>
+                </a:cubicBezTo>
+                <a:cubicBezTo>
+                  <a:pt x="2937018" y="273146"/>
+                  <a:pt x="2874539" y="223473"/>
+                  <a:pt x="2857500" y="215900"/>
+                </a:cubicBezTo>
+                <a:cubicBezTo>
+                  <a:pt x="2833034" y="205026"/>
+                  <a:pt x="2803577" y="205352"/>
+                  <a:pt x="2781300" y="190500"/>
+                </a:cubicBezTo>
+                <a:cubicBezTo>
+                  <a:pt x="2768600" y="182033"/>
+                  <a:pt x="2754926" y="174871"/>
+                  <a:pt x="2743200" y="165100"/>
+                </a:cubicBezTo>
+                <a:cubicBezTo>
+                  <a:pt x="2729402" y="153602"/>
+                  <a:pt x="2720044" y="136963"/>
+                  <a:pt x="2705100" y="127000"/>
+                </a:cubicBezTo>
+                <a:cubicBezTo>
+                  <a:pt x="2693961" y="119574"/>
+                  <a:pt x="2678974" y="120287"/>
+                  <a:pt x="2667000" y="114300"/>
+                </a:cubicBezTo>
+                <a:cubicBezTo>
+                  <a:pt x="2583898" y="72749"/>
+                  <a:pt x="2675062" y="106975"/>
+                  <a:pt x="2590800" y="50800"/>
+                </a:cubicBezTo>
+                <a:cubicBezTo>
+                  <a:pt x="2579661" y="43374"/>
+                  <a:pt x="2564674" y="44087"/>
+                  <a:pt x="2552700" y="38100"/>
+                </a:cubicBezTo>
+                <a:cubicBezTo>
+                  <a:pt x="2464995" y="-5753"/>
+                  <a:pt x="2569526" y="26431"/>
+                  <a:pt x="2463800" y="0"/>
+                </a:cubicBezTo>
+                <a:cubicBezTo>
+                  <a:pt x="2427377" y="3642"/>
+                  <a:pt x="2344469" y="2515"/>
+                  <a:pt x="2298700" y="25400"/>
+                </a:cubicBezTo>
+                <a:cubicBezTo>
+                  <a:pt x="2285048" y="32226"/>
+                  <a:pt x="2274252" y="43974"/>
+                  <a:pt x="2260600" y="50800"/>
+                </a:cubicBezTo>
+                <a:cubicBezTo>
+                  <a:pt x="2248626" y="56787"/>
+                  <a:pt x="2234474" y="57513"/>
+                  <a:pt x="2222500" y="63500"/>
+                </a:cubicBezTo>
+                <a:cubicBezTo>
+                  <a:pt x="2208848" y="70326"/>
+                  <a:pt x="2198052" y="82074"/>
+                  <a:pt x="2184400" y="88900"/>
+                </a:cubicBezTo>
+                <a:cubicBezTo>
+                  <a:pt x="2172426" y="94887"/>
+                  <a:pt x="2158274" y="95613"/>
+                  <a:pt x="2146300" y="101600"/>
+                </a:cubicBezTo>
+                <a:cubicBezTo>
+                  <a:pt x="2132648" y="108426"/>
+                  <a:pt x="2122148" y="120801"/>
+                  <a:pt x="2108200" y="127000"/>
+                </a:cubicBezTo>
+                <a:cubicBezTo>
+                  <a:pt x="2042014" y="156416"/>
+                  <a:pt x="2048309" y="152400"/>
+                  <a:pt x="1968500" y="139700"/>
+                </a:cubicBezTo>
+                <a:close/>
+              </a:path>
+            </a:pathLst>
+          </a:custGeom>
+          <a:blipFill>
+            <a:blip r:embed="rId3"/>
+            <a:stretch>
+              <a:fillRect/>
+            </a:stretch>
+          </a:blipFill>
+          <a:ln w="25400" cap="flat" cmpd="sng" algn="ctr">
+            <a:noFill/>
+            <a:prstDash val="solid"/>
+          </a:ln>
+          <a:effectLst/>
+          <a:extLst>
+            <a:ext uri="{91240B29-F687-4F45-9708-019B960494DF}">
+              <a14:hiddenLine xmlns:a14="http://schemas.microsoft.com/office/drawing/2010/main" w="25400" cap="flat" cmpd="sng" algn="ctr">
+                <a:solidFill>
+                  <a:schemeClr val="accent1">
+                    <a:shade val="50000"/>
+                  </a:schemeClr>
+                </a:solidFill>
+                <a:prstDash val="solid"/>
+              </a14:hiddenLine>
+            </a:ext>
+          </a:extLst>
+        </p:spPr>
+        <p:style>
+          <a:lnRef idx="2">
+            <a:schemeClr val="accent1">
+              <a:shade val="50000"/>
+            </a:schemeClr>
+          </a:lnRef>
+          <a:fillRef idx="1">
+            <a:schemeClr val="accent1"/>
+          </a:fillRef>
+          <a:effectRef idx="0">
+            <a:schemeClr val="accent1"/>
+          </a:effectRef>
+          <a:fontRef idx="minor">
+            <a:schemeClr val="lt1"/>
+          </a:fontRef>
+        </p:style>
+        <p:txBody>
+          <a:bodyPr rtlCol="0" anchor="ctr"/>
+          <a:lstStyle/>
+          <a:p>
+            <a:pPr algn="ctr"/>
+            <a:endParaRPr lang="en-SG"/>
+          </a:p>
+        </p:txBody>
+      </p:sp>
+    </p:spTree>
+    <p:extLst>
+      <p:ext uri="{BB962C8B-B14F-4D97-AF65-F5344CB8AC3E}">
+        <p14:creationId xmlns:p14="http://schemas.microsoft.com/office/powerpoint/2010/main" val="3515373495"/>
+      </p:ext>
+    </p:extLst>
+  </p:cSld>
+  <p:clrMapOvr>
+    <a:masterClrMapping/>
+  </p:clrMapOvr>
+</p:sld>
+</file>
+
+<file path=ppt/slides/slide12.xml><?xml version="1.0" encoding="utf-8"?>
+<p:sld xmlns:a="http://schemas.openxmlformats.org/drawingml/2006/main" xmlns:r="http://schemas.openxmlformats.org/officeDocument/2006/relationships" xmlns:p="http://schemas.openxmlformats.org/presentationml/2006/main" show="0">
+  <p:cSld name="PPAck201403240026082737">
+    <p:spTree>
+      <p:nvGrpSpPr>
+        <p:cNvPr id="1" name=""/>
+        <p:cNvGrpSpPr/>
+        <p:nvPr/>
+      </p:nvGrpSpPr>
+      <p:grpSpPr>
+        <a:xfrm>
+          <a:off x="0" y="0"/>
+          <a:ext cx="0" cy="0"/>
+          <a:chOff x="0" y="0"/>
+          <a:chExt cx="0" cy="0"/>
+        </a:xfrm>
+      </p:grpSpPr>
+      <p:sp>
+        <p:nvSpPr>
+          <p:cNvPr id="2" name="标题 1"/>
+          <p:cNvSpPr>
+            <a:spLocks noGrp="1"/>
+          </p:cNvSpPr>
+          <p:nvPr>
+            <p:ph type="title"/>
+          </p:nvPr>
+        </p:nvSpPr>
+        <p:spPr/>
+        <p:txBody>
+          <a:bodyPr/>
+          <a:lstStyle/>
+          <a:p>
+            <a:endParaRPr lang="en-SG"/>
+          </a:p>
+        </p:txBody>
+      </p:sp>
+      <p:pic>
+        <p:nvPicPr>
+          <p:cNvPr id="4" name="内容占位符 3"/>
+          <p:cNvPicPr>
+            <a:picLocks noGrp="1"/>
+          </p:cNvPicPr>
+          <p:nvPr>
+            <p:ph idx="1"/>
+          </p:nvPr>
+        </p:nvPicPr>
+        <p:blipFill>
+          <a:blip r:embed="rId2">
+            <a:extLst>
+              <a:ext uri="{28A0092B-C50C-407E-A947-70E740481C1C}">
+                <a14:useLocalDpi xmlns:a14="http://schemas.microsoft.com/office/drawing/2010/main" val="0"/>
+              </a:ext>
+            </a:extLst>
+          </a:blip>
+          <a:stretch>
+            <a:fillRect/>
+          </a:stretch>
+        </p:blipFill>
+        <p:spPr>
+          <a:xfrm>
+            <a:off x="1074665" y="1600200"/>
+            <a:ext cx="6994670" cy="4525963"/>
+          </a:xfrm>
+        </p:spPr>
+      </p:pic>
+    </p:spTree>
+    <p:extLst>
+      <p:ext uri="{BB962C8B-B14F-4D97-AF65-F5344CB8AC3E}">
+        <p14:creationId xmlns:p14="http://schemas.microsoft.com/office/powerpoint/2010/main" val="2306293579"/>
+      </p:ext>
+    </p:extLst>
+  </p:cSld>
+  <p:clrMapOvr>
+    <a:masterClrMapping/>
+  </p:clrMapOvr>
+  <mc:AlternateContent xmlns:mc="http://schemas.openxmlformats.org/markup-compatibility/2006" xmlns:p14="http://schemas.microsoft.com/office/powerpoint/2010/main">
+    <mc:Choice Requires="p14">
+      <p:transition spd="slow" p14:dur="2000"/>
+    </mc:Choice>
+    <mc:Fallback xmlns="">
+      <p:transition spd="slow"/>
+    </mc:Fallback>
+  </mc:AlternateContent>
+  <p:timing>
+    <p:tnLst>
+      <p:par>
+        <p:cTn id="1" dur="indefinite" restart="never" nodeType="tmRoot"/>
+      </p:par>
+    </p:tnLst>
+  </p:timing>
 </p:sld>
 </file>
 
@@ -14201,8 +17150,8 @@
 </file>
 
 <file path=ppt/slides/slide9.xml><?xml version="1.0" encoding="utf-8"?>
-<p:sld xmlns:a="http://schemas.openxmlformats.org/drawingml/2006/main" xmlns:r="http://schemas.openxmlformats.org/officeDocument/2006/relationships" xmlns:p="http://schemas.openxmlformats.org/presentationml/2006/main" show="0">
-  <p:cSld name="PPAck201403240026082737">
+<p:sld xmlns:a="http://schemas.openxmlformats.org/drawingml/2006/main" xmlns:r="http://schemas.openxmlformats.org/officeDocument/2006/relationships" xmlns:p="http://schemas.openxmlformats.org/presentationml/2006/main">
+  <p:cSld>
     <p:spTree>
       <p:nvGrpSpPr>
         <p:cNvPr id="1" name=""/>
@@ -14219,7 +17168,7 @@
       </p:grpSpPr>
       <p:sp>
         <p:nvSpPr>
-          <p:cNvPr id="2" name="标题 1"/>
+          <p:cNvPr id="2" name="Title 1"/>
           <p:cNvSpPr>
             <a:spLocks noGrp="1"/>
           </p:cNvSpPr>
@@ -14232,64 +17181,43 @@
           <a:bodyPr/>
           <a:lstStyle/>
           <a:p>
-            <a:endParaRPr lang="en-SG"/>
-          </a:p>
-        </p:txBody>
-      </p:sp>
-      <p:pic>
-        <p:nvPicPr>
-          <p:cNvPr id="4" name="内容占位符 3"/>
-          <p:cNvPicPr>
-            <a:picLocks noGrp="1"/>
-          </p:cNvPicPr>
+            <a:r>
+              <a:rPr lang="en-US" dirty="0" smtClean="0"/>
+              <a:t>Auto Crop:: rotated shape</a:t>
+            </a:r>
+            <a:endParaRPr lang="en-SG" dirty="0"/>
+          </a:p>
+        </p:txBody>
+      </p:sp>
+      <p:sp>
+        <p:nvSpPr>
+          <p:cNvPr id="3" name="Content Placeholder 2"/>
+          <p:cNvSpPr>
+            <a:spLocks noGrp="1"/>
+          </p:cNvSpPr>
           <p:nvPr>
             <p:ph idx="1"/>
           </p:nvPr>
-        </p:nvPicPr>
-        <p:blipFill>
-          <a:blip r:embed="rId2">
-            <a:extLst>
-              <a:ext uri="{28A0092B-C50C-407E-A947-70E740481C1C}">
-                <a14:useLocalDpi xmlns:a14="http://schemas.microsoft.com/office/drawing/2010/main" val="0"/>
-              </a:ext>
-            </a:extLst>
-          </a:blip>
-          <a:stretch>
-            <a:fillRect/>
-          </a:stretch>
-        </p:blipFill>
-        <p:spPr>
-          <a:xfrm>
-            <a:off x="1074665" y="1600200"/>
-            <a:ext cx="6994670" cy="4525963"/>
-          </a:xfrm>
-        </p:spPr>
-      </p:pic>
+        </p:nvSpPr>
+        <p:spPr/>
+        <p:txBody>
+          <a:bodyPr/>
+          <a:lstStyle/>
+          <a:p>
+            <a:endParaRPr lang="en-SG" dirty="0"/>
+          </a:p>
+        </p:txBody>
+      </p:sp>
     </p:spTree>
     <p:extLst>
       <p:ext uri="{BB962C8B-B14F-4D97-AF65-F5344CB8AC3E}">
-        <p14:creationId xmlns:p14="http://schemas.microsoft.com/office/powerpoint/2010/main" val="2306293579"/>
+        <p14:creationId xmlns:p14="http://schemas.microsoft.com/office/powerpoint/2010/main" val="4026306467"/>
       </p:ext>
     </p:extLst>
   </p:cSld>
   <p:clrMapOvr>
     <a:masterClrMapping/>
   </p:clrMapOvr>
-  <mc:AlternateContent xmlns:mc="http://schemas.openxmlformats.org/markup-compatibility/2006" xmlns:p14="http://schemas.microsoft.com/office/powerpoint/2010/main">
-    <mc:Choice Requires="p14">
-      <p:transition spd="slow" p14:dur="2000"/>
-    </mc:Choice>
-    <mc:Fallback xmlns="">
-      <p:transition spd="slow"/>
-    </mc:Fallback>
-  </mc:AlternateContent>
-  <p:timing>
-    <p:tnLst>
-      <p:par>
-        <p:cTn id="1" dur="indefinite" restart="never" nodeType="tmRoot"/>
-      </p:par>
-    </p:tnLst>
-  </p:timing>
 </p:sld>
 </file>
 

</xml_diff>